<commit_message>
making mini game & add overall
</commit_message>
<xml_diff>
--- a/2DGP_PROJECT.pptx
+++ b/2DGP_PROJECT.pptx
@@ -10,6 +10,9 @@
     <p:sldId id="258" r:id="rId4"/>
     <p:sldId id="259" r:id="rId5"/>
     <p:sldId id="261" r:id="rId6"/>
+    <p:sldId id="262" r:id="rId7"/>
+    <p:sldId id="263" r:id="rId8"/>
+    <p:sldId id="264" r:id="rId9"/>
   </p:sldIdLst>
   <p:sldSz cx="12192000" cy="6858000"/>
   <p:notesSz cx="6858000" cy="9144000"/>
@@ -263,7 +266,7 @@
           <a:p>
             <a:fld id="{B80D4DF6-D09F-4C30-B8A7-231A25FC117A}" type="datetimeFigureOut">
               <a:rPr lang="ko-KR" altLang="en-US" smtClean="0"/>
-              <a:t>2024-10-13</a:t>
+              <a:t>2024-11-18</a:t>
             </a:fld>
             <a:endParaRPr lang="ko-KR" altLang="en-US"/>
           </a:p>
@@ -461,7 +464,7 @@
           <a:p>
             <a:fld id="{B80D4DF6-D09F-4C30-B8A7-231A25FC117A}" type="datetimeFigureOut">
               <a:rPr lang="ko-KR" altLang="en-US" smtClean="0"/>
-              <a:t>2024-10-13</a:t>
+              <a:t>2024-11-18</a:t>
             </a:fld>
             <a:endParaRPr lang="ko-KR" altLang="en-US"/>
           </a:p>
@@ -669,7 +672,7 @@
           <a:p>
             <a:fld id="{B80D4DF6-D09F-4C30-B8A7-231A25FC117A}" type="datetimeFigureOut">
               <a:rPr lang="ko-KR" altLang="en-US" smtClean="0"/>
-              <a:t>2024-10-13</a:t>
+              <a:t>2024-11-18</a:t>
             </a:fld>
             <a:endParaRPr lang="ko-KR" altLang="en-US"/>
           </a:p>
@@ -867,7 +870,7 @@
           <a:p>
             <a:fld id="{B80D4DF6-D09F-4C30-B8A7-231A25FC117A}" type="datetimeFigureOut">
               <a:rPr lang="ko-KR" altLang="en-US" smtClean="0"/>
-              <a:t>2024-10-13</a:t>
+              <a:t>2024-11-18</a:t>
             </a:fld>
             <a:endParaRPr lang="ko-KR" altLang="en-US"/>
           </a:p>
@@ -1142,7 +1145,7 @@
           <a:p>
             <a:fld id="{B80D4DF6-D09F-4C30-B8A7-231A25FC117A}" type="datetimeFigureOut">
               <a:rPr lang="ko-KR" altLang="en-US" smtClean="0"/>
-              <a:t>2024-10-13</a:t>
+              <a:t>2024-11-18</a:t>
             </a:fld>
             <a:endParaRPr lang="ko-KR" altLang="en-US"/>
           </a:p>
@@ -1407,7 +1410,7 @@
           <a:p>
             <a:fld id="{B80D4DF6-D09F-4C30-B8A7-231A25FC117A}" type="datetimeFigureOut">
               <a:rPr lang="ko-KR" altLang="en-US" smtClean="0"/>
-              <a:t>2024-10-13</a:t>
+              <a:t>2024-11-18</a:t>
             </a:fld>
             <a:endParaRPr lang="ko-KR" altLang="en-US"/>
           </a:p>
@@ -1819,7 +1822,7 @@
           <a:p>
             <a:fld id="{B80D4DF6-D09F-4C30-B8A7-231A25FC117A}" type="datetimeFigureOut">
               <a:rPr lang="ko-KR" altLang="en-US" smtClean="0"/>
-              <a:t>2024-10-13</a:t>
+              <a:t>2024-11-18</a:t>
             </a:fld>
             <a:endParaRPr lang="ko-KR" altLang="en-US"/>
           </a:p>
@@ -1960,7 +1963,7 @@
           <a:p>
             <a:fld id="{B80D4DF6-D09F-4C30-B8A7-231A25FC117A}" type="datetimeFigureOut">
               <a:rPr lang="ko-KR" altLang="en-US" smtClean="0"/>
-              <a:t>2024-10-13</a:t>
+              <a:t>2024-11-18</a:t>
             </a:fld>
             <a:endParaRPr lang="ko-KR" altLang="en-US"/>
           </a:p>
@@ -2073,7 +2076,7 @@
           <a:p>
             <a:fld id="{B80D4DF6-D09F-4C30-B8A7-231A25FC117A}" type="datetimeFigureOut">
               <a:rPr lang="ko-KR" altLang="en-US" smtClean="0"/>
-              <a:t>2024-10-13</a:t>
+              <a:t>2024-11-18</a:t>
             </a:fld>
             <a:endParaRPr lang="ko-KR" altLang="en-US"/>
           </a:p>
@@ -2384,7 +2387,7 @@
           <a:p>
             <a:fld id="{B80D4DF6-D09F-4C30-B8A7-231A25FC117A}" type="datetimeFigureOut">
               <a:rPr lang="ko-KR" altLang="en-US" smtClean="0"/>
-              <a:t>2024-10-13</a:t>
+              <a:t>2024-11-18</a:t>
             </a:fld>
             <a:endParaRPr lang="ko-KR" altLang="en-US"/>
           </a:p>
@@ -2672,7 +2675,7 @@
           <a:p>
             <a:fld id="{B80D4DF6-D09F-4C30-B8A7-231A25FC117A}" type="datetimeFigureOut">
               <a:rPr lang="ko-KR" altLang="en-US" smtClean="0"/>
-              <a:t>2024-10-13</a:t>
+              <a:t>2024-11-18</a:t>
             </a:fld>
             <a:endParaRPr lang="ko-KR" altLang="en-US"/>
           </a:p>
@@ -2923,7 +2926,7 @@
           <a:p>
             <a:fld id="{B80D4DF6-D09F-4C30-B8A7-231A25FC117A}" type="datetimeFigureOut">
               <a:rPr lang="ko-KR" altLang="en-US" smtClean="0"/>
-              <a:t>2024-10-13</a:t>
+              <a:t>2024-11-18</a:t>
             </a:fld>
             <a:endParaRPr lang="ko-KR" altLang="en-US"/>
           </a:p>
@@ -5845,6 +5848,1490 @@
     <p:extLst>
       <p:ext uri="{BB962C8B-B14F-4D97-AF65-F5344CB8AC3E}">
         <p14:creationId xmlns:p14="http://schemas.microsoft.com/office/powerpoint/2010/main" val="1802055334"/>
+      </p:ext>
+    </p:extLst>
+  </p:cSld>
+  <p:clrMapOvr>
+    <a:masterClrMapping/>
+  </p:clrMapOvr>
+</p:sld>
+</file>
+
+<file path=ppt/slides/slide6.xml><?xml version="1.0" encoding="utf-8"?>
+<p:sld xmlns:a="http://schemas.openxmlformats.org/drawingml/2006/main" xmlns:r="http://schemas.openxmlformats.org/officeDocument/2006/relationships" xmlns:p="http://schemas.openxmlformats.org/presentationml/2006/main">
+  <p:cSld>
+    <p:spTree>
+      <p:nvGrpSpPr>
+        <p:cNvPr id="1" name=""/>
+        <p:cNvGrpSpPr/>
+        <p:nvPr/>
+      </p:nvGrpSpPr>
+      <p:grpSpPr>
+        <a:xfrm>
+          <a:off x="0" y="0"/>
+          <a:ext cx="0" cy="0"/>
+          <a:chOff x="0" y="0"/>
+          <a:chExt cx="0" cy="0"/>
+        </a:xfrm>
+      </p:grpSpPr>
+      <p:graphicFrame>
+        <p:nvGraphicFramePr>
+          <p:cNvPr id="6" name="표 5">
+            <a:extLst>
+              <a:ext uri="{FF2B5EF4-FFF2-40B4-BE49-F238E27FC236}">
+                <a16:creationId xmlns:a16="http://schemas.microsoft.com/office/drawing/2014/main" id="{E9C69AAB-CACD-4E72-CBFC-D2F19AC5DE67}"/>
+              </a:ext>
+            </a:extLst>
+          </p:cNvPr>
+          <p:cNvGraphicFramePr>
+            <a:graphicFrameLocks noGrp="1"/>
+          </p:cNvGraphicFramePr>
+          <p:nvPr>
+            <p:extLst>
+              <p:ext uri="{D42A27DB-BD31-4B8C-83A1-F6EECF244321}">
+                <p14:modId xmlns:p14="http://schemas.microsoft.com/office/powerpoint/2010/main" val="1549514045"/>
+              </p:ext>
+            </p:extLst>
+          </p:nvPr>
+        </p:nvGraphicFramePr>
+        <p:xfrm>
+          <a:off x="698090" y="98323"/>
+          <a:ext cx="10884311" cy="6607275"/>
+        </p:xfrm>
+        <a:graphic>
+          <a:graphicData uri="http://schemas.openxmlformats.org/drawingml/2006/table">
+            <a:tbl>
+              <a:tblPr firstRow="1" bandRow="1">
+                <a:tableStyleId>{F5AB1C69-6EDB-4FF4-983F-18BD219EF322}</a:tableStyleId>
+              </a:tblPr>
+              <a:tblGrid>
+                <a:gridCol w="2005698">
+                  <a:extLst>
+                    <a:ext uri="{9D8B030D-6E8A-4147-A177-3AD203B41FA5}">
+                      <a16:colId xmlns:a16="http://schemas.microsoft.com/office/drawing/2014/main" val="2077610663"/>
+                    </a:ext>
+                  </a:extLst>
+                </a:gridCol>
+                <a:gridCol w="7403665">
+                  <a:extLst>
+                    <a:ext uri="{9D8B030D-6E8A-4147-A177-3AD203B41FA5}">
+                      <a16:colId xmlns:a16="http://schemas.microsoft.com/office/drawing/2014/main" val="3591744664"/>
+                    </a:ext>
+                  </a:extLst>
+                </a:gridCol>
+                <a:gridCol w="1474948">
+                  <a:extLst>
+                    <a:ext uri="{9D8B030D-6E8A-4147-A177-3AD203B41FA5}">
+                      <a16:colId xmlns:a16="http://schemas.microsoft.com/office/drawing/2014/main" val="2033044438"/>
+                    </a:ext>
+                  </a:extLst>
+                </a:gridCol>
+              </a:tblGrid>
+              <a:tr h="483459">
+                <a:tc>
+                  <a:txBody>
+                    <a:bodyPr/>
+                    <a:lstStyle/>
+                    <a:p>
+                      <a:pPr algn="ctr" latinLnBrk="1"/>
+                      <a:r>
+                        <a:rPr lang="en-US" altLang="ko-KR" dirty="0"/>
+                        <a:t>WEEK</a:t>
+                      </a:r>
+                      <a:endParaRPr lang="ko-KR" altLang="en-US" dirty="0"/>
+                    </a:p>
+                  </a:txBody>
+                  <a:tcPr/>
+                </a:tc>
+                <a:tc gridSpan="2">
+                  <a:txBody>
+                    <a:bodyPr/>
+                    <a:lstStyle/>
+                    <a:p>
+                      <a:pPr algn="ctr" latinLnBrk="1"/>
+                      <a:r>
+                        <a:rPr lang="en-US" altLang="ko-KR" dirty="0"/>
+                        <a:t>CONTENTS</a:t>
+                      </a:r>
+                      <a:endParaRPr lang="ko-KR" altLang="en-US" dirty="0"/>
+                    </a:p>
+                  </a:txBody>
+                  <a:tcPr/>
+                </a:tc>
+                <a:tc hMerge="1">
+                  <a:txBody>
+                    <a:bodyPr/>
+                    <a:lstStyle/>
+                    <a:p>
+                      <a:pPr latinLnBrk="1"/>
+                      <a:endParaRPr lang="ko-KR" altLang="en-US"/>
+                    </a:p>
+                  </a:txBody>
+                  <a:tcPr/>
+                </a:tc>
+                <a:extLst>
+                  <a:ext uri="{0D108BD9-81ED-4DB2-BD59-A6C34878D82A}">
+                    <a16:rowId xmlns:a16="http://schemas.microsoft.com/office/drawing/2014/main" val="1560695971"/>
+                  </a:ext>
+                </a:extLst>
+              </a:tr>
+              <a:tr h="765477">
+                <a:tc>
+                  <a:txBody>
+                    <a:bodyPr/>
+                    <a:lstStyle/>
+                    <a:p>
+                      <a:pPr algn="ctr" latinLnBrk="1"/>
+                      <a:r>
+                        <a:rPr lang="en-US" altLang="ko-KR" dirty="0">
+                          <a:latin typeface="Stencil" panose="040409050D0802020404" pitchFamily="82" charset="0"/>
+                        </a:rPr>
+                        <a:t>1</a:t>
+                      </a:r>
+                      <a:r>
+                        <a:rPr lang="ko-KR" altLang="en-US" dirty="0">
+                          <a:latin typeface="Stencil" panose="040409050D0802020404" pitchFamily="82" charset="0"/>
+                        </a:rPr>
+                        <a:t>주차</a:t>
+                      </a:r>
+                      <a:endParaRPr lang="en-US" altLang="ko-KR" dirty="0">
+                        <a:latin typeface="Stencil" panose="040409050D0802020404" pitchFamily="82" charset="0"/>
+                      </a:endParaRPr>
+                    </a:p>
+                    <a:p>
+                      <a:pPr algn="ctr" latinLnBrk="1"/>
+                      <a:r>
+                        <a:rPr lang="en-US" altLang="ko-KR" sz="1400" dirty="0">
+                          <a:latin typeface="Stencil" panose="040409050D0802020404" pitchFamily="82" charset="0"/>
+                        </a:rPr>
+                        <a:t>(10.14)</a:t>
+                      </a:r>
+                    </a:p>
+                  </a:txBody>
+                  <a:tcPr/>
+                </a:tc>
+                <a:tc>
+                  <a:txBody>
+                    <a:bodyPr/>
+                    <a:lstStyle/>
+                    <a:p>
+                      <a:pPr latinLnBrk="1"/>
+                      <a:r>
+                        <a:rPr lang="ko-KR" altLang="en-US" b="0" dirty="0">
+                          <a:effectLst>
+                            <a:outerShdw blurRad="38100" dist="38100" dir="2700000" algn="tl">
+                              <a:srgbClr val="000000">
+                                <a:alpha val="43137"/>
+                              </a:srgbClr>
+                            </a:outerShdw>
+                          </a:effectLst>
+                          <a:latin typeface="굴림" panose="020B0600000101010101" pitchFamily="50" charset="-127"/>
+                          <a:ea typeface="굴림" panose="020B0600000101010101" pitchFamily="50" charset="-127"/>
+                        </a:rPr>
+                        <a:t>캐릭터</a:t>
+                      </a:r>
+                      <a:r>
+                        <a:rPr lang="en-US" altLang="ko-KR" b="0" dirty="0">
+                          <a:effectLst>
+                            <a:outerShdw blurRad="38100" dist="38100" dir="2700000" algn="tl">
+                              <a:srgbClr val="000000">
+                                <a:alpha val="43137"/>
+                              </a:srgbClr>
+                            </a:outerShdw>
+                          </a:effectLst>
+                          <a:latin typeface="굴림" panose="020B0600000101010101" pitchFamily="50" charset="-127"/>
+                          <a:ea typeface="굴림" panose="020B0600000101010101" pitchFamily="50" charset="-127"/>
+                        </a:rPr>
+                        <a:t>, </a:t>
+                      </a:r>
+                      <a:r>
+                        <a:rPr lang="ko-KR" altLang="en-US" b="0" dirty="0">
+                          <a:effectLst>
+                            <a:outerShdw blurRad="38100" dist="38100" dir="2700000" algn="tl">
+                              <a:srgbClr val="000000">
+                                <a:alpha val="43137"/>
+                              </a:srgbClr>
+                            </a:outerShdw>
+                          </a:effectLst>
+                          <a:latin typeface="굴림" panose="020B0600000101010101" pitchFamily="50" charset="-127"/>
+                          <a:ea typeface="굴림" panose="020B0600000101010101" pitchFamily="50" charset="-127"/>
+                        </a:rPr>
+                        <a:t>맵 리소스 적용 및 캐릭터 이동 구현</a:t>
+                      </a:r>
+                    </a:p>
+                  </a:txBody>
+                  <a:tcPr/>
+                </a:tc>
+                <a:tc>
+                  <a:txBody>
+                    <a:bodyPr/>
+                    <a:lstStyle/>
+                    <a:p>
+                      <a:pPr algn="ctr" latinLnBrk="1"/>
+                      <a:r>
+                        <a:rPr lang="en-US" altLang="ko-KR" b="0" dirty="0">
+                          <a:effectLst>
+                            <a:outerShdw blurRad="38100" dist="38100" dir="2700000" algn="tl">
+                              <a:srgbClr val="000000">
+                                <a:alpha val="43137"/>
+                              </a:srgbClr>
+                            </a:outerShdw>
+                          </a:effectLst>
+                          <a:latin typeface="굴림" panose="020B0600000101010101" pitchFamily="50" charset="-127"/>
+                          <a:ea typeface="굴림" panose="020B0600000101010101" pitchFamily="50" charset="-127"/>
+                        </a:rPr>
+                        <a:t>100%</a:t>
+                      </a:r>
+                      <a:endParaRPr lang="ko-KR" altLang="en-US" b="0" dirty="0">
+                        <a:effectLst>
+                          <a:outerShdw blurRad="38100" dist="38100" dir="2700000" algn="tl">
+                            <a:srgbClr val="000000">
+                              <a:alpha val="43137"/>
+                            </a:srgbClr>
+                          </a:outerShdw>
+                        </a:effectLst>
+                        <a:latin typeface="굴림" panose="020B0600000101010101" pitchFamily="50" charset="-127"/>
+                        <a:ea typeface="굴림" panose="020B0600000101010101" pitchFamily="50" charset="-127"/>
+                      </a:endParaRPr>
+                    </a:p>
+                  </a:txBody>
+                  <a:tcPr/>
+                </a:tc>
+                <a:extLst>
+                  <a:ext uri="{0D108BD9-81ED-4DB2-BD59-A6C34878D82A}">
+                    <a16:rowId xmlns:a16="http://schemas.microsoft.com/office/drawing/2014/main" val="960025325"/>
+                  </a:ext>
+                </a:extLst>
+              </a:tr>
+              <a:tr h="765477">
+                <a:tc>
+                  <a:txBody>
+                    <a:bodyPr/>
+                    <a:lstStyle/>
+                    <a:p>
+                      <a:pPr marL="0" marR="0" lvl="0" indent="0" algn="ctr" defTabSz="914400" rtl="0" eaLnBrk="1" fontAlgn="auto" latinLnBrk="1" hangingPunct="1">
+                        <a:lnSpc>
+                          <a:spcPct val="100000"/>
+                        </a:lnSpc>
+                        <a:spcBef>
+                          <a:spcPts val="0"/>
+                        </a:spcBef>
+                        <a:spcAft>
+                          <a:spcPts val="0"/>
+                        </a:spcAft>
+                        <a:buClrTx/>
+                        <a:buSzTx/>
+                        <a:buFontTx/>
+                        <a:buNone/>
+                        <a:tabLst/>
+                        <a:defRPr/>
+                      </a:pPr>
+                      <a:r>
+                        <a:rPr lang="en-US" altLang="ko-KR" dirty="0">
+                          <a:latin typeface="Stencil" panose="040409050D0802020404" pitchFamily="82" charset="0"/>
+                        </a:rPr>
+                        <a:t>2</a:t>
+                      </a:r>
+                      <a:r>
+                        <a:rPr lang="ko-KR" altLang="en-US" dirty="0">
+                          <a:latin typeface="Stencil" panose="040409050D0802020404" pitchFamily="82" charset="0"/>
+                        </a:rPr>
+                        <a:t>주차</a:t>
+                      </a:r>
+                      <a:endParaRPr lang="en-US" altLang="ko-KR" dirty="0">
+                        <a:latin typeface="Stencil" panose="040409050D0802020404" pitchFamily="82" charset="0"/>
+                      </a:endParaRPr>
+                    </a:p>
+                    <a:p>
+                      <a:pPr marL="0" marR="0" lvl="0" indent="0" algn="ctr" defTabSz="914400" rtl="0" eaLnBrk="1" fontAlgn="auto" latinLnBrk="1" hangingPunct="1">
+                        <a:lnSpc>
+                          <a:spcPct val="100000"/>
+                        </a:lnSpc>
+                        <a:spcBef>
+                          <a:spcPts val="0"/>
+                        </a:spcBef>
+                        <a:spcAft>
+                          <a:spcPts val="0"/>
+                        </a:spcAft>
+                        <a:buClrTx/>
+                        <a:buSzTx/>
+                        <a:buFontTx/>
+                        <a:buNone/>
+                        <a:tabLst/>
+                        <a:defRPr/>
+                      </a:pPr>
+                      <a:r>
+                        <a:rPr lang="en-US" altLang="ko-KR" sz="1400" dirty="0">
+                          <a:latin typeface="Stencil" panose="040409050D0802020404" pitchFamily="82" charset="0"/>
+                        </a:rPr>
+                        <a:t>(10.21)</a:t>
+                      </a:r>
+                    </a:p>
+                  </a:txBody>
+                  <a:tcPr/>
+                </a:tc>
+                <a:tc>
+                  <a:txBody>
+                    <a:bodyPr/>
+                    <a:lstStyle/>
+                    <a:p>
+                      <a:pPr latinLnBrk="1"/>
+                      <a:r>
+                        <a:rPr lang="ko-KR" altLang="en-US" b="0" dirty="0">
+                          <a:effectLst>
+                            <a:outerShdw blurRad="38100" dist="38100" dir="2700000" algn="tl">
+                              <a:srgbClr val="000000">
+                                <a:alpha val="43137"/>
+                              </a:srgbClr>
+                            </a:outerShdw>
+                          </a:effectLst>
+                          <a:latin typeface="굴림" panose="020B0600000101010101" pitchFamily="50" charset="-127"/>
+                          <a:ea typeface="굴림" panose="020B0600000101010101" pitchFamily="50" charset="-127"/>
+                        </a:rPr>
+                        <a:t>캐릭터 속성 추가 구현 </a:t>
+                      </a:r>
+                      <a:r>
+                        <a:rPr lang="en-US" altLang="ko-KR" b="0" dirty="0">
+                          <a:effectLst>
+                            <a:outerShdw blurRad="38100" dist="38100" dir="2700000" algn="tl">
+                              <a:srgbClr val="000000">
+                                <a:alpha val="43137"/>
+                              </a:srgbClr>
+                            </a:outerShdw>
+                          </a:effectLst>
+                          <a:latin typeface="굴림" panose="020B0600000101010101" pitchFamily="50" charset="-127"/>
+                          <a:ea typeface="굴림" panose="020B0600000101010101" pitchFamily="50" charset="-127"/>
+                        </a:rPr>
+                        <a:t>+</a:t>
+                      </a:r>
+                      <a:r>
+                        <a:rPr lang="ko-KR" altLang="en-US" b="0" dirty="0">
+                          <a:effectLst>
+                            <a:outerShdw blurRad="38100" dist="38100" dir="2700000" algn="tl">
+                              <a:srgbClr val="000000">
+                                <a:alpha val="43137"/>
+                              </a:srgbClr>
+                            </a:outerShdw>
+                          </a:effectLst>
+                          <a:latin typeface="굴림" panose="020B0600000101010101" pitchFamily="50" charset="-127"/>
+                          <a:ea typeface="굴림" panose="020B0600000101010101" pitchFamily="50" charset="-127"/>
+                        </a:rPr>
+                        <a:t> 화면 전환과 상호작용 대상들 구현</a:t>
+                      </a:r>
+                    </a:p>
+                  </a:txBody>
+                  <a:tcPr/>
+                </a:tc>
+                <a:tc>
+                  <a:txBody>
+                    <a:bodyPr/>
+                    <a:lstStyle/>
+                    <a:p>
+                      <a:pPr algn="ctr" latinLnBrk="1"/>
+                      <a:r>
+                        <a:rPr lang="en-US" altLang="ko-KR" b="0" dirty="0">
+                          <a:effectLst>
+                            <a:outerShdw blurRad="38100" dist="38100" dir="2700000" algn="tl">
+                              <a:srgbClr val="000000">
+                                <a:alpha val="43137"/>
+                              </a:srgbClr>
+                            </a:outerShdw>
+                          </a:effectLst>
+                          <a:latin typeface="굴림" panose="020B0600000101010101" pitchFamily="50" charset="-127"/>
+                          <a:ea typeface="굴림" panose="020B0600000101010101" pitchFamily="50" charset="-127"/>
+                        </a:rPr>
+                        <a:t>100%</a:t>
+                      </a:r>
+                      <a:endParaRPr lang="ko-KR" altLang="en-US" b="0" dirty="0">
+                        <a:effectLst>
+                          <a:outerShdw blurRad="38100" dist="38100" dir="2700000" algn="tl">
+                            <a:srgbClr val="000000">
+                              <a:alpha val="43137"/>
+                            </a:srgbClr>
+                          </a:outerShdw>
+                        </a:effectLst>
+                        <a:latin typeface="굴림" panose="020B0600000101010101" pitchFamily="50" charset="-127"/>
+                        <a:ea typeface="굴림" panose="020B0600000101010101" pitchFamily="50" charset="-127"/>
+                      </a:endParaRPr>
+                    </a:p>
+                  </a:txBody>
+                  <a:tcPr/>
+                </a:tc>
+                <a:extLst>
+                  <a:ext uri="{0D108BD9-81ED-4DB2-BD59-A6C34878D82A}">
+                    <a16:rowId xmlns:a16="http://schemas.microsoft.com/office/drawing/2014/main" val="1379970148"/>
+                  </a:ext>
+                </a:extLst>
+              </a:tr>
+              <a:tr h="765477">
+                <a:tc>
+                  <a:txBody>
+                    <a:bodyPr/>
+                    <a:lstStyle/>
+                    <a:p>
+                      <a:pPr marL="0" marR="0" lvl="0" indent="0" algn="ctr" defTabSz="914400" rtl="0" eaLnBrk="1" fontAlgn="auto" latinLnBrk="1" hangingPunct="1">
+                        <a:lnSpc>
+                          <a:spcPct val="100000"/>
+                        </a:lnSpc>
+                        <a:spcBef>
+                          <a:spcPts val="0"/>
+                        </a:spcBef>
+                        <a:spcAft>
+                          <a:spcPts val="0"/>
+                        </a:spcAft>
+                        <a:buClrTx/>
+                        <a:buSzTx/>
+                        <a:buFontTx/>
+                        <a:buNone/>
+                        <a:tabLst/>
+                        <a:defRPr/>
+                      </a:pPr>
+                      <a:r>
+                        <a:rPr lang="en-US" altLang="ko-KR" dirty="0">
+                          <a:latin typeface="Stencil" panose="040409050D0802020404" pitchFamily="82" charset="0"/>
+                        </a:rPr>
+                        <a:t>3</a:t>
+                      </a:r>
+                      <a:r>
+                        <a:rPr lang="ko-KR" altLang="en-US" dirty="0">
+                          <a:latin typeface="Stencil" panose="040409050D0802020404" pitchFamily="82" charset="0"/>
+                        </a:rPr>
+                        <a:t>주차</a:t>
+                      </a:r>
+                      <a:endParaRPr lang="en-US" altLang="ko-KR" dirty="0">
+                        <a:latin typeface="Stencil" panose="040409050D0802020404" pitchFamily="82" charset="0"/>
+                      </a:endParaRPr>
+                    </a:p>
+                    <a:p>
+                      <a:pPr algn="ctr" latinLnBrk="1"/>
+                      <a:r>
+                        <a:rPr lang="en-US" altLang="ko-KR" sz="1400" dirty="0">
+                          <a:latin typeface="Stencil" panose="040409050D0802020404" pitchFamily="82" charset="0"/>
+                        </a:rPr>
+                        <a:t>(10.28)</a:t>
+                      </a:r>
+                      <a:endParaRPr lang="ko-KR" altLang="en-US" sz="1400" dirty="0">
+                        <a:latin typeface="Stencil" panose="040409050D0802020404" pitchFamily="82" charset="0"/>
+                      </a:endParaRPr>
+                    </a:p>
+                  </a:txBody>
+                  <a:tcPr/>
+                </a:tc>
+                <a:tc>
+                  <a:txBody>
+                    <a:bodyPr/>
+                    <a:lstStyle/>
+                    <a:p>
+                      <a:pPr latinLnBrk="1"/>
+                      <a:r>
+                        <a:rPr lang="ko-KR" altLang="en-US" b="0" dirty="0">
+                          <a:effectLst>
+                            <a:outerShdw blurRad="38100" dist="38100" dir="2700000" algn="tl">
+                              <a:srgbClr val="000000">
+                                <a:alpha val="43137"/>
+                              </a:srgbClr>
+                            </a:outerShdw>
+                          </a:effectLst>
+                          <a:latin typeface="굴림" panose="020B0600000101010101" pitchFamily="50" charset="-127"/>
+                          <a:ea typeface="굴림" panose="020B0600000101010101" pitchFamily="50" charset="-127"/>
+                        </a:rPr>
+                        <a:t>캐릭터 숙소 구현 </a:t>
+                      </a:r>
+                      <a:r>
+                        <a:rPr lang="en-US" altLang="ko-KR" b="0" dirty="0">
+                          <a:effectLst>
+                            <a:outerShdw blurRad="38100" dist="38100" dir="2700000" algn="tl">
+                              <a:srgbClr val="000000">
+                                <a:alpha val="43137"/>
+                              </a:srgbClr>
+                            </a:outerShdw>
+                          </a:effectLst>
+                          <a:latin typeface="굴림" panose="020B0600000101010101" pitchFamily="50" charset="-127"/>
+                          <a:ea typeface="굴림" panose="020B0600000101010101" pitchFamily="50" charset="-127"/>
+                        </a:rPr>
+                        <a:t>(</a:t>
+                      </a:r>
+                      <a:r>
+                        <a:rPr lang="ko-KR" altLang="en-US" b="0" dirty="0">
+                          <a:effectLst>
+                            <a:outerShdw blurRad="38100" dist="38100" dir="2700000" algn="tl">
+                              <a:srgbClr val="000000">
+                                <a:alpha val="43137"/>
+                              </a:srgbClr>
+                            </a:outerShdw>
+                          </a:effectLst>
+                          <a:latin typeface="굴림" panose="020B0600000101010101" pitchFamily="50" charset="-127"/>
+                          <a:ea typeface="굴림" panose="020B0600000101010101" pitchFamily="50" charset="-127"/>
+                        </a:rPr>
+                        <a:t>캐릭터 </a:t>
+                      </a:r>
+                      <a:r>
+                        <a:rPr lang="en-US" altLang="ko-KR" b="0" dirty="0">
+                          <a:effectLst>
+                            <a:outerShdw blurRad="38100" dist="38100" dir="2700000" algn="tl">
+                              <a:srgbClr val="000000">
+                                <a:alpha val="43137"/>
+                              </a:srgbClr>
+                            </a:outerShdw>
+                          </a:effectLst>
+                          <a:latin typeface="굴림" panose="020B0600000101010101" pitchFamily="50" charset="-127"/>
+                          <a:ea typeface="굴림" panose="020B0600000101010101" pitchFamily="50" charset="-127"/>
+                        </a:rPr>
+                        <a:t>Condition, Hunger</a:t>
+                      </a:r>
+                      <a:r>
+                        <a:rPr lang="ko-KR" altLang="en-US" b="0" dirty="0">
+                          <a:effectLst>
+                            <a:outerShdw blurRad="38100" dist="38100" dir="2700000" algn="tl">
+                              <a:srgbClr val="000000">
+                                <a:alpha val="43137"/>
+                              </a:srgbClr>
+                            </a:outerShdw>
+                          </a:effectLst>
+                          <a:latin typeface="굴림" panose="020B0600000101010101" pitchFamily="50" charset="-127"/>
+                          <a:ea typeface="굴림" panose="020B0600000101010101" pitchFamily="50" charset="-127"/>
+                        </a:rPr>
+                        <a:t> 회복</a:t>
+                      </a:r>
+                      <a:r>
+                        <a:rPr lang="en-US" altLang="ko-KR" b="0" dirty="0">
+                          <a:effectLst>
+                            <a:outerShdw blurRad="38100" dist="38100" dir="2700000" algn="tl">
+                              <a:srgbClr val="000000">
+                                <a:alpha val="43137"/>
+                              </a:srgbClr>
+                            </a:outerShdw>
+                          </a:effectLst>
+                          <a:latin typeface="굴림" panose="020B0600000101010101" pitchFamily="50" charset="-127"/>
+                          <a:ea typeface="굴림" panose="020B0600000101010101" pitchFamily="50" charset="-127"/>
+                        </a:rPr>
+                        <a:t>)</a:t>
+                      </a:r>
+                    </a:p>
+                  </a:txBody>
+                  <a:tcPr/>
+                </a:tc>
+                <a:tc>
+                  <a:txBody>
+                    <a:bodyPr/>
+                    <a:lstStyle/>
+                    <a:p>
+                      <a:pPr algn="ctr" latinLnBrk="1"/>
+                      <a:r>
+                        <a:rPr lang="en-US" altLang="ko-KR" b="0" dirty="0">
+                          <a:effectLst>
+                            <a:outerShdw blurRad="38100" dist="38100" dir="2700000" algn="tl">
+                              <a:srgbClr val="000000">
+                                <a:alpha val="43137"/>
+                              </a:srgbClr>
+                            </a:outerShdw>
+                          </a:effectLst>
+                          <a:latin typeface="굴림" panose="020B0600000101010101" pitchFamily="50" charset="-127"/>
+                          <a:ea typeface="굴림" panose="020B0600000101010101" pitchFamily="50" charset="-127"/>
+                        </a:rPr>
+                        <a:t>100%</a:t>
+                      </a:r>
+                      <a:endParaRPr lang="ko-KR" altLang="en-US" b="0" dirty="0">
+                        <a:effectLst>
+                          <a:outerShdw blurRad="38100" dist="38100" dir="2700000" algn="tl">
+                            <a:srgbClr val="000000">
+                              <a:alpha val="43137"/>
+                            </a:srgbClr>
+                          </a:outerShdw>
+                        </a:effectLst>
+                        <a:latin typeface="굴림" panose="020B0600000101010101" pitchFamily="50" charset="-127"/>
+                        <a:ea typeface="굴림" panose="020B0600000101010101" pitchFamily="50" charset="-127"/>
+                      </a:endParaRPr>
+                    </a:p>
+                  </a:txBody>
+                  <a:tcPr/>
+                </a:tc>
+                <a:extLst>
+                  <a:ext uri="{0D108BD9-81ED-4DB2-BD59-A6C34878D82A}">
+                    <a16:rowId xmlns:a16="http://schemas.microsoft.com/office/drawing/2014/main" val="1242039006"/>
+                  </a:ext>
+                </a:extLst>
+              </a:tr>
+              <a:tr h="765477">
+                <a:tc>
+                  <a:txBody>
+                    <a:bodyPr/>
+                    <a:lstStyle/>
+                    <a:p>
+                      <a:pPr marL="0" marR="0" lvl="0" indent="0" algn="ctr" defTabSz="914400" rtl="0" eaLnBrk="1" fontAlgn="auto" latinLnBrk="1" hangingPunct="1">
+                        <a:lnSpc>
+                          <a:spcPct val="100000"/>
+                        </a:lnSpc>
+                        <a:spcBef>
+                          <a:spcPts val="0"/>
+                        </a:spcBef>
+                        <a:spcAft>
+                          <a:spcPts val="0"/>
+                        </a:spcAft>
+                        <a:buClrTx/>
+                        <a:buSzTx/>
+                        <a:buFontTx/>
+                        <a:buNone/>
+                        <a:tabLst/>
+                        <a:defRPr/>
+                      </a:pPr>
+                      <a:r>
+                        <a:rPr lang="en-US" altLang="ko-KR" dirty="0">
+                          <a:latin typeface="Stencil" panose="040409050D0802020404" pitchFamily="82" charset="0"/>
+                        </a:rPr>
+                        <a:t>4</a:t>
+                      </a:r>
+                      <a:r>
+                        <a:rPr lang="ko-KR" altLang="en-US" dirty="0">
+                          <a:latin typeface="Stencil" panose="040409050D0802020404" pitchFamily="82" charset="0"/>
+                        </a:rPr>
+                        <a:t>주차</a:t>
+                      </a:r>
+                      <a:endParaRPr lang="en-US" altLang="ko-KR" dirty="0">
+                        <a:latin typeface="Stencil" panose="040409050D0802020404" pitchFamily="82" charset="0"/>
+                      </a:endParaRPr>
+                    </a:p>
+                    <a:p>
+                      <a:pPr algn="ctr" latinLnBrk="1"/>
+                      <a:r>
+                        <a:rPr lang="en-US" altLang="ko-KR" sz="1400" dirty="0">
+                          <a:latin typeface="Stencil" panose="040409050D0802020404" pitchFamily="82" charset="0"/>
+                        </a:rPr>
+                        <a:t>(11.04)</a:t>
+                      </a:r>
+                      <a:endParaRPr lang="ko-KR" altLang="en-US" sz="1400" dirty="0">
+                        <a:latin typeface="Stencil" panose="040409050D0802020404" pitchFamily="82" charset="0"/>
+                      </a:endParaRPr>
+                    </a:p>
+                  </a:txBody>
+                  <a:tcPr/>
+                </a:tc>
+                <a:tc>
+                  <a:txBody>
+                    <a:bodyPr/>
+                    <a:lstStyle/>
+                    <a:p>
+                      <a:pPr latinLnBrk="1"/>
+                      <a:r>
+                        <a:rPr lang="ko-KR" altLang="en-US" b="0" dirty="0">
+                          <a:effectLst>
+                            <a:outerShdw blurRad="38100" dist="38100" dir="2700000" algn="tl">
+                              <a:srgbClr val="000000">
+                                <a:alpha val="43137"/>
+                              </a:srgbClr>
+                            </a:outerShdw>
+                          </a:effectLst>
+                          <a:latin typeface="굴림" panose="020B0600000101010101" pitchFamily="50" charset="-127"/>
+                          <a:ea typeface="굴림" panose="020B0600000101010101" pitchFamily="50" charset="-127"/>
+                        </a:rPr>
+                        <a:t>트레이닝 센터 컨텐츠 구현 </a:t>
+                      </a:r>
+                      <a:r>
+                        <a:rPr lang="en-US" altLang="ko-KR" b="0" dirty="0">
+                          <a:effectLst>
+                            <a:outerShdw blurRad="38100" dist="38100" dir="2700000" algn="tl">
+                              <a:srgbClr val="000000">
+                                <a:alpha val="43137"/>
+                              </a:srgbClr>
+                            </a:outerShdw>
+                          </a:effectLst>
+                          <a:latin typeface="굴림" panose="020B0600000101010101" pitchFamily="50" charset="-127"/>
+                          <a:ea typeface="굴림" panose="020B0600000101010101" pitchFamily="50" charset="-127"/>
+                        </a:rPr>
+                        <a:t>(</a:t>
+                      </a:r>
+                      <a:r>
+                        <a:rPr lang="ko-KR" altLang="en-US" b="0" dirty="0">
+                          <a:effectLst>
+                            <a:outerShdw blurRad="38100" dist="38100" dir="2700000" algn="tl">
+                              <a:srgbClr val="000000">
+                                <a:alpha val="43137"/>
+                              </a:srgbClr>
+                            </a:outerShdw>
+                          </a:effectLst>
+                          <a:latin typeface="굴림" panose="020B0600000101010101" pitchFamily="50" charset="-127"/>
+                          <a:ea typeface="굴림" panose="020B0600000101010101" pitchFamily="50" charset="-127"/>
+                        </a:rPr>
+                        <a:t>캐릭터 능력치 상승</a:t>
+                      </a:r>
+                      <a:r>
+                        <a:rPr lang="en-US" altLang="ko-KR" b="0" dirty="0">
+                          <a:effectLst>
+                            <a:outerShdw blurRad="38100" dist="38100" dir="2700000" algn="tl">
+                              <a:srgbClr val="000000">
+                                <a:alpha val="43137"/>
+                              </a:srgbClr>
+                            </a:outerShdw>
+                          </a:effectLst>
+                          <a:latin typeface="굴림" panose="020B0600000101010101" pitchFamily="50" charset="-127"/>
+                          <a:ea typeface="굴림" panose="020B0600000101010101" pitchFamily="50" charset="-127"/>
+                        </a:rPr>
+                        <a:t>)</a:t>
+                      </a:r>
+                      <a:endParaRPr lang="ko-KR" altLang="en-US" b="0" dirty="0">
+                        <a:effectLst>
+                          <a:outerShdw blurRad="38100" dist="38100" dir="2700000" algn="tl">
+                            <a:srgbClr val="000000">
+                              <a:alpha val="43137"/>
+                            </a:srgbClr>
+                          </a:outerShdw>
+                        </a:effectLst>
+                        <a:latin typeface="굴림" panose="020B0600000101010101" pitchFamily="50" charset="-127"/>
+                        <a:ea typeface="굴림" panose="020B0600000101010101" pitchFamily="50" charset="-127"/>
+                      </a:endParaRPr>
+                    </a:p>
+                  </a:txBody>
+                  <a:tcPr/>
+                </a:tc>
+                <a:tc>
+                  <a:txBody>
+                    <a:bodyPr/>
+                    <a:lstStyle/>
+                    <a:p>
+                      <a:pPr algn="ctr" latinLnBrk="1"/>
+                      <a:endParaRPr lang="ko-KR" altLang="en-US" b="0" dirty="0">
+                        <a:effectLst>
+                          <a:outerShdw blurRad="38100" dist="38100" dir="2700000" algn="tl">
+                            <a:srgbClr val="000000">
+                              <a:alpha val="43137"/>
+                            </a:srgbClr>
+                          </a:outerShdw>
+                        </a:effectLst>
+                        <a:latin typeface="굴림" panose="020B0600000101010101" pitchFamily="50" charset="-127"/>
+                        <a:ea typeface="굴림" panose="020B0600000101010101" pitchFamily="50" charset="-127"/>
+                      </a:endParaRPr>
+                    </a:p>
+                  </a:txBody>
+                  <a:tcPr/>
+                </a:tc>
+                <a:extLst>
+                  <a:ext uri="{0D108BD9-81ED-4DB2-BD59-A6C34878D82A}">
+                    <a16:rowId xmlns:a16="http://schemas.microsoft.com/office/drawing/2014/main" val="749856164"/>
+                  </a:ext>
+                </a:extLst>
+              </a:tr>
+              <a:tr h="765477">
+                <a:tc>
+                  <a:txBody>
+                    <a:bodyPr/>
+                    <a:lstStyle/>
+                    <a:p>
+                      <a:pPr marL="0" marR="0" lvl="0" indent="0" algn="ctr" defTabSz="914400" rtl="0" eaLnBrk="1" fontAlgn="auto" latinLnBrk="1" hangingPunct="1">
+                        <a:lnSpc>
+                          <a:spcPct val="100000"/>
+                        </a:lnSpc>
+                        <a:spcBef>
+                          <a:spcPts val="0"/>
+                        </a:spcBef>
+                        <a:spcAft>
+                          <a:spcPts val="0"/>
+                        </a:spcAft>
+                        <a:buClrTx/>
+                        <a:buSzTx/>
+                        <a:buFontTx/>
+                        <a:buNone/>
+                        <a:tabLst/>
+                        <a:defRPr/>
+                      </a:pPr>
+                      <a:r>
+                        <a:rPr lang="en-US" altLang="ko-KR" dirty="0">
+                          <a:latin typeface="Stencil" panose="040409050D0802020404" pitchFamily="82" charset="0"/>
+                        </a:rPr>
+                        <a:t>5</a:t>
+                      </a:r>
+                      <a:r>
+                        <a:rPr lang="ko-KR" altLang="en-US" dirty="0">
+                          <a:latin typeface="Stencil" panose="040409050D0802020404" pitchFamily="82" charset="0"/>
+                        </a:rPr>
+                        <a:t>주차</a:t>
+                      </a:r>
+                      <a:endParaRPr lang="en-US" altLang="ko-KR" dirty="0">
+                        <a:latin typeface="Stencil" panose="040409050D0802020404" pitchFamily="82" charset="0"/>
+                      </a:endParaRPr>
+                    </a:p>
+                    <a:p>
+                      <a:pPr algn="ctr" latinLnBrk="1"/>
+                      <a:r>
+                        <a:rPr lang="en-US" altLang="ko-KR" sz="1400" dirty="0">
+                          <a:latin typeface="Stencil" panose="040409050D0802020404" pitchFamily="82" charset="0"/>
+                        </a:rPr>
+                        <a:t>(11.11)</a:t>
+                      </a:r>
+                      <a:endParaRPr lang="ko-KR" altLang="en-US" sz="1400" dirty="0">
+                        <a:latin typeface="Stencil" panose="040409050D0802020404" pitchFamily="82" charset="0"/>
+                      </a:endParaRPr>
+                    </a:p>
+                  </a:txBody>
+                  <a:tcPr/>
+                </a:tc>
+                <a:tc>
+                  <a:txBody>
+                    <a:bodyPr/>
+                    <a:lstStyle/>
+                    <a:p>
+                      <a:pPr latinLnBrk="1"/>
+                      <a:r>
+                        <a:rPr lang="ko-KR" altLang="en-US" b="0" dirty="0">
+                          <a:effectLst>
+                            <a:outerShdw blurRad="38100" dist="38100" dir="2700000" algn="tl">
+                              <a:srgbClr val="000000">
+                                <a:alpha val="43137"/>
+                              </a:srgbClr>
+                            </a:outerShdw>
+                          </a:effectLst>
+                          <a:latin typeface="굴림" panose="020B0600000101010101" pitchFamily="50" charset="-127"/>
+                          <a:ea typeface="굴림" panose="020B0600000101010101" pitchFamily="50" charset="-127"/>
+                        </a:rPr>
+                        <a:t>경기장 컨텐츠 구현 </a:t>
+                      </a:r>
+                      <a:r>
+                        <a:rPr lang="en-US" altLang="ko-KR" b="0" dirty="0">
+                          <a:effectLst>
+                            <a:outerShdw blurRad="38100" dist="38100" dir="2700000" algn="tl">
+                              <a:srgbClr val="000000">
+                                <a:alpha val="43137"/>
+                              </a:srgbClr>
+                            </a:outerShdw>
+                          </a:effectLst>
+                          <a:latin typeface="굴림" panose="020B0600000101010101" pitchFamily="50" charset="-127"/>
+                          <a:ea typeface="굴림" panose="020B0600000101010101" pitchFamily="50" charset="-127"/>
+                        </a:rPr>
+                        <a:t>(</a:t>
+                      </a:r>
+                      <a:r>
+                        <a:rPr lang="ko-KR" altLang="en-US" b="0" dirty="0">
+                          <a:effectLst>
+                            <a:outerShdw blurRad="38100" dist="38100" dir="2700000" algn="tl">
+                              <a:srgbClr val="000000">
+                                <a:alpha val="43137"/>
+                              </a:srgbClr>
+                            </a:outerShdw>
+                          </a:effectLst>
+                          <a:latin typeface="굴림" panose="020B0600000101010101" pitchFamily="50" charset="-127"/>
+                          <a:ea typeface="굴림" panose="020B0600000101010101" pitchFamily="50" charset="-127"/>
+                        </a:rPr>
+                        <a:t>미니게임 구현</a:t>
+                      </a:r>
+                      <a:r>
+                        <a:rPr lang="en-US" altLang="ko-KR" b="0" dirty="0">
+                          <a:effectLst>
+                            <a:outerShdw blurRad="38100" dist="38100" dir="2700000" algn="tl">
+                              <a:srgbClr val="000000">
+                                <a:alpha val="43137"/>
+                              </a:srgbClr>
+                            </a:outerShdw>
+                          </a:effectLst>
+                          <a:latin typeface="굴림" panose="020B0600000101010101" pitchFamily="50" charset="-127"/>
+                          <a:ea typeface="굴림" panose="020B0600000101010101" pitchFamily="50" charset="-127"/>
+                        </a:rPr>
+                        <a:t>)</a:t>
+                      </a:r>
+                      <a:endParaRPr lang="ko-KR" altLang="en-US" b="0" dirty="0">
+                        <a:effectLst>
+                          <a:outerShdw blurRad="38100" dist="38100" dir="2700000" algn="tl">
+                            <a:srgbClr val="000000">
+                              <a:alpha val="43137"/>
+                            </a:srgbClr>
+                          </a:outerShdw>
+                        </a:effectLst>
+                        <a:latin typeface="굴림" panose="020B0600000101010101" pitchFamily="50" charset="-127"/>
+                        <a:ea typeface="굴림" panose="020B0600000101010101" pitchFamily="50" charset="-127"/>
+                      </a:endParaRPr>
+                    </a:p>
+                  </a:txBody>
+                  <a:tcPr/>
+                </a:tc>
+                <a:tc>
+                  <a:txBody>
+                    <a:bodyPr/>
+                    <a:lstStyle/>
+                    <a:p>
+                      <a:pPr algn="ctr" latinLnBrk="1"/>
+                      <a:endParaRPr lang="ko-KR" altLang="en-US" b="0" dirty="0">
+                        <a:effectLst>
+                          <a:outerShdw blurRad="38100" dist="38100" dir="2700000" algn="tl">
+                            <a:srgbClr val="000000">
+                              <a:alpha val="43137"/>
+                            </a:srgbClr>
+                          </a:outerShdw>
+                        </a:effectLst>
+                        <a:latin typeface="굴림" panose="020B0600000101010101" pitchFamily="50" charset="-127"/>
+                        <a:ea typeface="굴림" panose="020B0600000101010101" pitchFamily="50" charset="-127"/>
+                      </a:endParaRPr>
+                    </a:p>
+                  </a:txBody>
+                  <a:tcPr/>
+                </a:tc>
+                <a:extLst>
+                  <a:ext uri="{0D108BD9-81ED-4DB2-BD59-A6C34878D82A}">
+                    <a16:rowId xmlns:a16="http://schemas.microsoft.com/office/drawing/2014/main" val="402811064"/>
+                  </a:ext>
+                </a:extLst>
+              </a:tr>
+              <a:tr h="765477">
+                <a:tc>
+                  <a:txBody>
+                    <a:bodyPr/>
+                    <a:lstStyle/>
+                    <a:p>
+                      <a:pPr marL="0" marR="0" lvl="0" indent="0" algn="ctr" defTabSz="914400" rtl="0" eaLnBrk="1" fontAlgn="auto" latinLnBrk="1" hangingPunct="1">
+                        <a:lnSpc>
+                          <a:spcPct val="100000"/>
+                        </a:lnSpc>
+                        <a:spcBef>
+                          <a:spcPts val="0"/>
+                        </a:spcBef>
+                        <a:spcAft>
+                          <a:spcPts val="0"/>
+                        </a:spcAft>
+                        <a:buClrTx/>
+                        <a:buSzTx/>
+                        <a:buFontTx/>
+                        <a:buNone/>
+                        <a:tabLst/>
+                        <a:defRPr/>
+                      </a:pPr>
+                      <a:r>
+                        <a:rPr lang="en-US" altLang="ko-KR" dirty="0">
+                          <a:latin typeface="Stencil" panose="040409050D0802020404" pitchFamily="82" charset="0"/>
+                        </a:rPr>
+                        <a:t>6</a:t>
+                      </a:r>
+                      <a:r>
+                        <a:rPr lang="ko-KR" altLang="en-US" dirty="0">
+                          <a:latin typeface="Stencil" panose="040409050D0802020404" pitchFamily="82" charset="0"/>
+                        </a:rPr>
+                        <a:t>주차</a:t>
+                      </a:r>
+                      <a:endParaRPr lang="en-US" altLang="ko-KR" dirty="0">
+                        <a:latin typeface="Stencil" panose="040409050D0802020404" pitchFamily="82" charset="0"/>
+                      </a:endParaRPr>
+                    </a:p>
+                    <a:p>
+                      <a:pPr algn="ctr" latinLnBrk="1"/>
+                      <a:r>
+                        <a:rPr lang="en-US" altLang="ko-KR" sz="1400" dirty="0">
+                          <a:latin typeface="Stencil" panose="040409050D0802020404" pitchFamily="82" charset="0"/>
+                        </a:rPr>
+                        <a:t>(11.18)</a:t>
+                      </a:r>
+                      <a:endParaRPr lang="ko-KR" altLang="en-US" sz="1400" dirty="0">
+                        <a:latin typeface="Stencil" panose="040409050D0802020404" pitchFamily="82" charset="0"/>
+                      </a:endParaRPr>
+                    </a:p>
+                  </a:txBody>
+                  <a:tcPr/>
+                </a:tc>
+                <a:tc>
+                  <a:txBody>
+                    <a:bodyPr/>
+                    <a:lstStyle/>
+                    <a:p>
+                      <a:pPr latinLnBrk="1"/>
+                      <a:r>
+                        <a:rPr lang="ko-KR" altLang="en-US" b="0" dirty="0">
+                          <a:effectLst>
+                            <a:outerShdw blurRad="38100" dist="38100" dir="2700000" algn="tl">
+                              <a:srgbClr val="000000">
+                                <a:alpha val="43137"/>
+                              </a:srgbClr>
+                            </a:outerShdw>
+                          </a:effectLst>
+                          <a:latin typeface="굴림" panose="020B0600000101010101" pitchFamily="50" charset="-127"/>
+                          <a:ea typeface="굴림" panose="020B0600000101010101" pitchFamily="50" charset="-127"/>
+                        </a:rPr>
+                        <a:t>기자회견 컨텐츠 구현 </a:t>
+                      </a:r>
+                      <a:r>
+                        <a:rPr lang="en-US" altLang="ko-KR" b="0" dirty="0">
+                          <a:effectLst>
+                            <a:outerShdw blurRad="38100" dist="38100" dir="2700000" algn="tl">
+                              <a:srgbClr val="000000">
+                                <a:alpha val="43137"/>
+                              </a:srgbClr>
+                            </a:outerShdw>
+                          </a:effectLst>
+                          <a:latin typeface="굴림" panose="020B0600000101010101" pitchFamily="50" charset="-127"/>
+                          <a:ea typeface="굴림" panose="020B0600000101010101" pitchFamily="50" charset="-127"/>
+                        </a:rPr>
+                        <a:t>(Ex.</a:t>
+                      </a:r>
+                      <a:r>
+                        <a:rPr lang="ko-KR" altLang="en-US" b="0" dirty="0">
+                          <a:effectLst>
+                            <a:outerShdw blurRad="38100" dist="38100" dir="2700000" algn="tl">
+                              <a:srgbClr val="000000">
+                                <a:alpha val="43137"/>
+                              </a:srgbClr>
+                            </a:outerShdw>
+                          </a:effectLst>
+                          <a:latin typeface="굴림" panose="020B0600000101010101" pitchFamily="50" charset="-127"/>
+                          <a:ea typeface="굴림" panose="020B0600000101010101" pitchFamily="50" charset="-127"/>
+                        </a:rPr>
+                        <a:t> 퀴즈와 같은 객관식 </a:t>
+                      </a:r>
+                      <a:r>
+                        <a:rPr lang="en-US" altLang="ko-KR" b="0" dirty="0">
+                          <a:effectLst>
+                            <a:outerShdw blurRad="38100" dist="38100" dir="2700000" algn="tl">
+                              <a:srgbClr val="000000">
+                                <a:alpha val="43137"/>
+                              </a:srgbClr>
+                            </a:outerShdw>
+                          </a:effectLst>
+                          <a:latin typeface="굴림" panose="020B0600000101010101" pitchFamily="50" charset="-127"/>
+                          <a:ea typeface="굴림" panose="020B0600000101010101" pitchFamily="50" charset="-127"/>
+                        </a:rPr>
+                        <a:t>/ </a:t>
+                      </a:r>
+                      <a:r>
+                        <a:rPr lang="ko-KR" altLang="en-US" b="0" dirty="0">
+                          <a:effectLst>
+                            <a:outerShdw blurRad="38100" dist="38100" dir="2700000" algn="tl">
+                              <a:srgbClr val="000000">
+                                <a:alpha val="43137"/>
+                              </a:srgbClr>
+                            </a:outerShdw>
+                          </a:effectLst>
+                          <a:latin typeface="굴림" panose="020B0600000101010101" pitchFamily="50" charset="-127"/>
+                          <a:ea typeface="굴림" panose="020B0600000101010101" pitchFamily="50" charset="-127"/>
+                        </a:rPr>
+                        <a:t>주관식</a:t>
+                      </a:r>
+                      <a:r>
+                        <a:rPr lang="en-US" altLang="ko-KR" b="0" dirty="0">
+                          <a:effectLst>
+                            <a:outerShdw blurRad="38100" dist="38100" dir="2700000" algn="tl">
+                              <a:srgbClr val="000000">
+                                <a:alpha val="43137"/>
+                              </a:srgbClr>
+                            </a:outerShdw>
+                          </a:effectLst>
+                          <a:latin typeface="굴림" panose="020B0600000101010101" pitchFamily="50" charset="-127"/>
+                          <a:ea typeface="굴림" panose="020B0600000101010101" pitchFamily="50" charset="-127"/>
+                        </a:rPr>
+                        <a:t>)</a:t>
+                      </a:r>
+                      <a:endParaRPr lang="ko-KR" altLang="en-US" b="0" dirty="0">
+                        <a:effectLst>
+                          <a:outerShdw blurRad="38100" dist="38100" dir="2700000" algn="tl">
+                            <a:srgbClr val="000000">
+                              <a:alpha val="43137"/>
+                            </a:srgbClr>
+                          </a:outerShdw>
+                        </a:effectLst>
+                        <a:latin typeface="굴림" panose="020B0600000101010101" pitchFamily="50" charset="-127"/>
+                        <a:ea typeface="굴림" panose="020B0600000101010101" pitchFamily="50" charset="-127"/>
+                      </a:endParaRPr>
+                    </a:p>
+                  </a:txBody>
+                  <a:tcPr/>
+                </a:tc>
+                <a:tc>
+                  <a:txBody>
+                    <a:bodyPr/>
+                    <a:lstStyle/>
+                    <a:p>
+                      <a:pPr algn="ctr" latinLnBrk="1"/>
+                      <a:endParaRPr lang="ko-KR" altLang="en-US" b="0" dirty="0">
+                        <a:effectLst>
+                          <a:outerShdw blurRad="38100" dist="38100" dir="2700000" algn="tl">
+                            <a:srgbClr val="000000">
+                              <a:alpha val="43137"/>
+                            </a:srgbClr>
+                          </a:outerShdw>
+                        </a:effectLst>
+                        <a:latin typeface="굴림" panose="020B0600000101010101" pitchFamily="50" charset="-127"/>
+                        <a:ea typeface="굴림" panose="020B0600000101010101" pitchFamily="50" charset="-127"/>
+                      </a:endParaRPr>
+                    </a:p>
+                  </a:txBody>
+                  <a:tcPr/>
+                </a:tc>
+                <a:extLst>
+                  <a:ext uri="{0D108BD9-81ED-4DB2-BD59-A6C34878D82A}">
+                    <a16:rowId xmlns:a16="http://schemas.microsoft.com/office/drawing/2014/main" val="3365505821"/>
+                  </a:ext>
+                </a:extLst>
+              </a:tr>
+              <a:tr h="765477">
+                <a:tc>
+                  <a:txBody>
+                    <a:bodyPr/>
+                    <a:lstStyle/>
+                    <a:p>
+                      <a:pPr marL="0" marR="0" lvl="0" indent="0" algn="ctr" defTabSz="914400" rtl="0" eaLnBrk="1" fontAlgn="auto" latinLnBrk="1" hangingPunct="1">
+                        <a:lnSpc>
+                          <a:spcPct val="100000"/>
+                        </a:lnSpc>
+                        <a:spcBef>
+                          <a:spcPts val="0"/>
+                        </a:spcBef>
+                        <a:spcAft>
+                          <a:spcPts val="0"/>
+                        </a:spcAft>
+                        <a:buClrTx/>
+                        <a:buSzTx/>
+                        <a:buFontTx/>
+                        <a:buNone/>
+                        <a:tabLst/>
+                        <a:defRPr/>
+                      </a:pPr>
+                      <a:r>
+                        <a:rPr lang="en-US" altLang="ko-KR" dirty="0">
+                          <a:latin typeface="Stencil" panose="040409050D0802020404" pitchFamily="82" charset="0"/>
+                        </a:rPr>
+                        <a:t>7</a:t>
+                      </a:r>
+                      <a:r>
+                        <a:rPr lang="ko-KR" altLang="en-US" dirty="0">
+                          <a:latin typeface="Stencil" panose="040409050D0802020404" pitchFamily="82" charset="0"/>
+                        </a:rPr>
+                        <a:t>주차</a:t>
+                      </a:r>
+                      <a:endParaRPr lang="en-US" altLang="ko-KR" dirty="0">
+                        <a:latin typeface="Stencil" panose="040409050D0802020404" pitchFamily="82" charset="0"/>
+                      </a:endParaRPr>
+                    </a:p>
+                    <a:p>
+                      <a:pPr algn="ctr" latinLnBrk="1"/>
+                      <a:r>
+                        <a:rPr lang="en-US" altLang="ko-KR" sz="1400" dirty="0">
+                          <a:latin typeface="Stencil" panose="040409050D0802020404" pitchFamily="82" charset="0"/>
+                        </a:rPr>
+                        <a:t>(11.25)</a:t>
+                      </a:r>
+                      <a:endParaRPr lang="ko-KR" altLang="en-US" sz="1400" dirty="0">
+                        <a:latin typeface="Stencil" panose="040409050D0802020404" pitchFamily="82" charset="0"/>
+                      </a:endParaRPr>
+                    </a:p>
+                  </a:txBody>
+                  <a:tcPr/>
+                </a:tc>
+                <a:tc>
+                  <a:txBody>
+                    <a:bodyPr/>
+                    <a:lstStyle/>
+                    <a:p>
+                      <a:pPr latinLnBrk="1"/>
+                      <a:r>
+                        <a:rPr lang="ko-KR" altLang="en-US" b="0" dirty="0">
+                          <a:effectLst>
+                            <a:outerShdw blurRad="38100" dist="38100" dir="2700000" algn="tl">
+                              <a:srgbClr val="000000">
+                                <a:alpha val="43137"/>
+                              </a:srgbClr>
+                            </a:outerShdw>
+                          </a:effectLst>
+                          <a:latin typeface="굴림" panose="020B0600000101010101" pitchFamily="50" charset="-127"/>
+                          <a:ea typeface="굴림" panose="020B0600000101010101" pitchFamily="50" charset="-127"/>
+                        </a:rPr>
+                        <a:t>상호작용 컨텐츠 추가 여부 결정 및 점검</a:t>
+                      </a:r>
+                    </a:p>
+                  </a:txBody>
+                  <a:tcPr/>
+                </a:tc>
+                <a:tc>
+                  <a:txBody>
+                    <a:bodyPr/>
+                    <a:lstStyle/>
+                    <a:p>
+                      <a:pPr algn="ctr" latinLnBrk="1"/>
+                      <a:endParaRPr lang="ko-KR" altLang="en-US" b="0" dirty="0">
+                        <a:effectLst>
+                          <a:outerShdw blurRad="38100" dist="38100" dir="2700000" algn="tl">
+                            <a:srgbClr val="000000">
+                              <a:alpha val="43137"/>
+                            </a:srgbClr>
+                          </a:outerShdw>
+                        </a:effectLst>
+                        <a:latin typeface="굴림" panose="020B0600000101010101" pitchFamily="50" charset="-127"/>
+                        <a:ea typeface="굴림" panose="020B0600000101010101" pitchFamily="50" charset="-127"/>
+                      </a:endParaRPr>
+                    </a:p>
+                  </a:txBody>
+                  <a:tcPr/>
+                </a:tc>
+                <a:extLst>
+                  <a:ext uri="{0D108BD9-81ED-4DB2-BD59-A6C34878D82A}">
+                    <a16:rowId xmlns:a16="http://schemas.microsoft.com/office/drawing/2014/main" val="1465247700"/>
+                  </a:ext>
+                </a:extLst>
+              </a:tr>
+              <a:tr h="765477">
+                <a:tc>
+                  <a:txBody>
+                    <a:bodyPr/>
+                    <a:lstStyle/>
+                    <a:p>
+                      <a:pPr marL="0" marR="0" lvl="0" indent="0" algn="ctr" defTabSz="914400" rtl="0" eaLnBrk="1" fontAlgn="auto" latinLnBrk="1" hangingPunct="1">
+                        <a:lnSpc>
+                          <a:spcPct val="100000"/>
+                        </a:lnSpc>
+                        <a:spcBef>
+                          <a:spcPts val="0"/>
+                        </a:spcBef>
+                        <a:spcAft>
+                          <a:spcPts val="0"/>
+                        </a:spcAft>
+                        <a:buClrTx/>
+                        <a:buSzTx/>
+                        <a:buFontTx/>
+                        <a:buNone/>
+                        <a:tabLst/>
+                        <a:defRPr/>
+                      </a:pPr>
+                      <a:r>
+                        <a:rPr lang="en-US" altLang="ko-KR" dirty="0">
+                          <a:latin typeface="Stencil" panose="040409050D0802020404" pitchFamily="82" charset="0"/>
+                        </a:rPr>
+                        <a:t>8</a:t>
+                      </a:r>
+                      <a:r>
+                        <a:rPr lang="ko-KR" altLang="en-US" dirty="0">
+                          <a:latin typeface="Stencil" panose="040409050D0802020404" pitchFamily="82" charset="0"/>
+                        </a:rPr>
+                        <a:t>주차</a:t>
+                      </a:r>
+                      <a:endParaRPr lang="en-US" altLang="ko-KR" dirty="0">
+                        <a:latin typeface="Stencil" panose="040409050D0802020404" pitchFamily="82" charset="0"/>
+                      </a:endParaRPr>
+                    </a:p>
+                    <a:p>
+                      <a:pPr algn="ctr" latinLnBrk="1"/>
+                      <a:r>
+                        <a:rPr lang="en-US" altLang="ko-KR" sz="1400" dirty="0">
+                          <a:latin typeface="Stencil" panose="040409050D0802020404" pitchFamily="82" charset="0"/>
+                        </a:rPr>
+                        <a:t>(12.02)</a:t>
+                      </a:r>
+                      <a:endParaRPr lang="ko-KR" altLang="en-US" sz="1400" dirty="0">
+                        <a:latin typeface="Stencil" panose="040409050D0802020404" pitchFamily="82" charset="0"/>
+                      </a:endParaRPr>
+                    </a:p>
+                  </a:txBody>
+                  <a:tcPr/>
+                </a:tc>
+                <a:tc>
+                  <a:txBody>
+                    <a:bodyPr/>
+                    <a:lstStyle/>
+                    <a:p>
+                      <a:pPr latinLnBrk="1"/>
+                      <a:r>
+                        <a:rPr lang="ko-KR" altLang="en-US" b="0" dirty="0">
+                          <a:effectLst>
+                            <a:outerShdw blurRad="38100" dist="38100" dir="2700000" algn="tl">
+                              <a:srgbClr val="000000">
+                                <a:alpha val="43137"/>
+                              </a:srgbClr>
+                            </a:outerShdw>
+                          </a:effectLst>
+                          <a:latin typeface="굴림" panose="020B0600000101010101" pitchFamily="50" charset="-127"/>
+                          <a:ea typeface="굴림" panose="020B0600000101010101" pitchFamily="50" charset="-127"/>
+                        </a:rPr>
+                        <a:t>구현 내용 다듬기 및 마무리</a:t>
+                      </a:r>
+                    </a:p>
+                  </a:txBody>
+                  <a:tcPr/>
+                </a:tc>
+                <a:tc>
+                  <a:txBody>
+                    <a:bodyPr/>
+                    <a:lstStyle/>
+                    <a:p>
+                      <a:pPr algn="ctr" latinLnBrk="1"/>
+                      <a:endParaRPr lang="ko-KR" altLang="en-US" b="0" dirty="0">
+                        <a:effectLst>
+                          <a:outerShdw blurRad="38100" dist="38100" dir="2700000" algn="tl">
+                            <a:srgbClr val="000000">
+                              <a:alpha val="43137"/>
+                            </a:srgbClr>
+                          </a:outerShdw>
+                        </a:effectLst>
+                        <a:latin typeface="굴림" panose="020B0600000101010101" pitchFamily="50" charset="-127"/>
+                        <a:ea typeface="굴림" panose="020B0600000101010101" pitchFamily="50" charset="-127"/>
+                      </a:endParaRPr>
+                    </a:p>
+                  </a:txBody>
+                  <a:tcPr/>
+                </a:tc>
+                <a:extLst>
+                  <a:ext uri="{0D108BD9-81ED-4DB2-BD59-A6C34878D82A}">
+                    <a16:rowId xmlns:a16="http://schemas.microsoft.com/office/drawing/2014/main" val="729768210"/>
+                  </a:ext>
+                </a:extLst>
+              </a:tr>
+            </a:tbl>
+          </a:graphicData>
+        </a:graphic>
+      </p:graphicFrame>
+    </p:spTree>
+    <p:extLst>
+      <p:ext uri="{BB962C8B-B14F-4D97-AF65-F5344CB8AC3E}">
+        <p14:creationId xmlns:p14="http://schemas.microsoft.com/office/powerpoint/2010/main" val="59131784"/>
+      </p:ext>
+    </p:extLst>
+  </p:cSld>
+  <p:clrMapOvr>
+    <a:masterClrMapping/>
+  </p:clrMapOvr>
+</p:sld>
+</file>
+
+<file path=ppt/slides/slide7.xml><?xml version="1.0" encoding="utf-8"?>
+<p:sld xmlns:a="http://schemas.openxmlformats.org/drawingml/2006/main" xmlns:r="http://schemas.openxmlformats.org/officeDocument/2006/relationships" xmlns:p="http://schemas.openxmlformats.org/presentationml/2006/main">
+  <p:cSld>
+    <p:spTree>
+      <p:nvGrpSpPr>
+        <p:cNvPr id="1" name=""/>
+        <p:cNvGrpSpPr/>
+        <p:nvPr/>
+      </p:nvGrpSpPr>
+      <p:grpSpPr>
+        <a:xfrm>
+          <a:off x="0" y="0"/>
+          <a:ext cx="0" cy="0"/>
+          <a:chOff x="0" y="0"/>
+          <a:chExt cx="0" cy="0"/>
+        </a:xfrm>
+      </p:grpSpPr>
+      <p:sp>
+        <p:nvSpPr>
+          <p:cNvPr id="2" name="제목 1">
+            <a:extLst>
+              <a:ext uri="{FF2B5EF4-FFF2-40B4-BE49-F238E27FC236}">
+                <a16:creationId xmlns:a16="http://schemas.microsoft.com/office/drawing/2014/main" id="{0DB78B94-7F99-0A3D-6DA9-B1B2D472FA16}"/>
+              </a:ext>
+            </a:extLst>
+          </p:cNvPr>
+          <p:cNvSpPr>
+            <a:spLocks noGrp="1"/>
+          </p:cNvSpPr>
+          <p:nvPr>
+            <p:ph type="title"/>
+          </p:nvPr>
+        </p:nvSpPr>
+        <p:spPr/>
+        <p:txBody>
+          <a:bodyPr/>
+          <a:lstStyle/>
+          <a:p>
+            <a:endParaRPr lang="ko-KR" altLang="en-US"/>
+          </a:p>
+        </p:txBody>
+      </p:sp>
+      <p:sp>
+        <p:nvSpPr>
+          <p:cNvPr id="3" name="내용 개체 틀 2">
+            <a:extLst>
+              <a:ext uri="{FF2B5EF4-FFF2-40B4-BE49-F238E27FC236}">
+                <a16:creationId xmlns:a16="http://schemas.microsoft.com/office/drawing/2014/main" id="{84A06CFA-17B6-7D63-C024-AA0B2AEDF5E1}"/>
+              </a:ext>
+            </a:extLst>
+          </p:cNvPr>
+          <p:cNvSpPr>
+            <a:spLocks noGrp="1"/>
+          </p:cNvSpPr>
+          <p:nvPr>
+            <p:ph idx="1"/>
+          </p:nvPr>
+        </p:nvSpPr>
+        <p:spPr/>
+        <p:txBody>
+          <a:bodyPr/>
+          <a:lstStyle/>
+          <a:p>
+            <a:endParaRPr lang="ko-KR" altLang="en-US"/>
+          </a:p>
+        </p:txBody>
+      </p:sp>
+    </p:spTree>
+    <p:extLst>
+      <p:ext uri="{BB962C8B-B14F-4D97-AF65-F5344CB8AC3E}">
+        <p14:creationId xmlns:p14="http://schemas.microsoft.com/office/powerpoint/2010/main" val="614397083"/>
+      </p:ext>
+    </p:extLst>
+  </p:cSld>
+  <p:clrMapOvr>
+    <a:masterClrMapping/>
+  </p:clrMapOvr>
+</p:sld>
+</file>
+
+<file path=ppt/slides/slide8.xml><?xml version="1.0" encoding="utf-8"?>
+<p:sld xmlns:a="http://schemas.openxmlformats.org/drawingml/2006/main" xmlns:r="http://schemas.openxmlformats.org/officeDocument/2006/relationships" xmlns:p="http://schemas.openxmlformats.org/presentationml/2006/main">
+  <p:cSld>
+    <p:spTree>
+      <p:nvGrpSpPr>
+        <p:cNvPr id="1" name=""/>
+        <p:cNvGrpSpPr/>
+        <p:nvPr/>
+      </p:nvGrpSpPr>
+      <p:grpSpPr>
+        <a:xfrm>
+          <a:off x="0" y="0"/>
+          <a:ext cx="0" cy="0"/>
+          <a:chOff x="0" y="0"/>
+          <a:chExt cx="0" cy="0"/>
+        </a:xfrm>
+      </p:grpSpPr>
+      <p:sp>
+        <p:nvSpPr>
+          <p:cNvPr id="2" name="제목 1">
+            <a:extLst>
+              <a:ext uri="{FF2B5EF4-FFF2-40B4-BE49-F238E27FC236}">
+                <a16:creationId xmlns:a16="http://schemas.microsoft.com/office/drawing/2014/main" id="{23230077-F2EB-0934-6A4E-4B1E0ECFB1DB}"/>
+              </a:ext>
+            </a:extLst>
+          </p:cNvPr>
+          <p:cNvSpPr>
+            <a:spLocks noGrp="1"/>
+          </p:cNvSpPr>
+          <p:nvPr>
+            <p:ph type="title"/>
+          </p:nvPr>
+        </p:nvSpPr>
+        <p:spPr/>
+        <p:txBody>
+          <a:bodyPr/>
+          <a:lstStyle/>
+          <a:p>
+            <a:endParaRPr lang="ko-KR" altLang="en-US"/>
+          </a:p>
+        </p:txBody>
+      </p:sp>
+      <p:sp>
+        <p:nvSpPr>
+          <p:cNvPr id="3" name="내용 개체 틀 2">
+            <a:extLst>
+              <a:ext uri="{FF2B5EF4-FFF2-40B4-BE49-F238E27FC236}">
+                <a16:creationId xmlns:a16="http://schemas.microsoft.com/office/drawing/2014/main" id="{E6368DD8-FF86-7BCB-A567-F84829E6E4AF}"/>
+              </a:ext>
+            </a:extLst>
+          </p:cNvPr>
+          <p:cNvSpPr>
+            <a:spLocks noGrp="1"/>
+          </p:cNvSpPr>
+          <p:nvPr>
+            <p:ph idx="1"/>
+          </p:nvPr>
+        </p:nvSpPr>
+        <p:spPr/>
+        <p:txBody>
+          <a:bodyPr/>
+          <a:lstStyle/>
+          <a:p>
+            <a:endParaRPr lang="ko-KR" altLang="en-US"/>
+          </a:p>
+        </p:txBody>
+      </p:sp>
+    </p:spTree>
+    <p:extLst>
+      <p:ext uri="{BB962C8B-B14F-4D97-AF65-F5344CB8AC3E}">
+        <p14:creationId xmlns:p14="http://schemas.microsoft.com/office/powerpoint/2010/main" val="1196722728"/>
       </p:ext>
     </p:extLst>
   </p:cSld>

</xml_diff>

<commit_message>
add mic in map_5
</commit_message>
<xml_diff>
--- a/2DGP_PROJECT.pptx
+++ b/2DGP_PROJECT.pptx
@@ -5,14 +5,10 @@
     <p:sldMasterId id="2147483648" r:id="rId1"/>
   </p:sldMasterIdLst>
   <p:sldIdLst>
-    <p:sldId id="256" r:id="rId2"/>
-    <p:sldId id="257" r:id="rId3"/>
-    <p:sldId id="258" r:id="rId4"/>
-    <p:sldId id="259" r:id="rId5"/>
-    <p:sldId id="261" r:id="rId6"/>
-    <p:sldId id="262" r:id="rId7"/>
-    <p:sldId id="263" r:id="rId8"/>
-    <p:sldId id="264" r:id="rId9"/>
+    <p:sldId id="261" r:id="rId2"/>
+    <p:sldId id="262" r:id="rId3"/>
+    <p:sldId id="263" r:id="rId4"/>
+    <p:sldId id="264" r:id="rId5"/>
   </p:sldIdLst>
   <p:sldSz cx="12192000" cy="6858000"/>
   <p:notesSz cx="6858000" cy="9144000"/>
@@ -3537,7 +3533,7 @@
     </p:spTree>
     <p:extLst>
       <p:ext uri="{BB962C8B-B14F-4D97-AF65-F5344CB8AC3E}">
-        <p14:creationId xmlns:p14="http://schemas.microsoft.com/office/powerpoint/2010/main" val="522389231"/>
+        <p14:creationId xmlns:p14="http://schemas.microsoft.com/office/powerpoint/2010/main" val="1802055334"/>
       </p:ext>
     </p:extLst>
   </p:cSld>
@@ -3564,982 +3560,12 @@
           <a:chExt cx="0" cy="0"/>
         </a:xfrm>
       </p:grpSpPr>
-      <p:sp>
-        <p:nvSpPr>
-          <p:cNvPr id="2" name="제목 1">
-            <a:extLst>
-              <a:ext uri="{FF2B5EF4-FFF2-40B4-BE49-F238E27FC236}">
-                <a16:creationId xmlns:a16="http://schemas.microsoft.com/office/drawing/2014/main" id="{C5FD2B72-9543-0C2A-25B2-3F479789E903}"/>
-              </a:ext>
-            </a:extLst>
-          </p:cNvPr>
-          <p:cNvSpPr>
-            <a:spLocks noGrp="1"/>
-          </p:cNvSpPr>
-          <p:nvPr>
-            <p:ph type="title"/>
-          </p:nvPr>
-        </p:nvSpPr>
-        <p:spPr/>
-        <p:txBody>
-          <a:bodyPr/>
-          <a:lstStyle/>
-          <a:p>
-            <a:r>
-              <a:rPr lang="en-US" altLang="ko-KR" dirty="0">
-                <a:latin typeface="Cambria" panose="02040503050406030204" pitchFamily="18" charset="0"/>
-                <a:ea typeface="Cambria" panose="02040503050406030204" pitchFamily="18" charset="0"/>
-              </a:rPr>
-              <a:t>IDEAs</a:t>
-            </a:r>
-            <a:endParaRPr lang="ko-KR" altLang="en-US" dirty="0">
-              <a:latin typeface="Cambria" panose="02040503050406030204" pitchFamily="18" charset="0"/>
-            </a:endParaRPr>
-          </a:p>
-        </p:txBody>
-      </p:sp>
-      <p:pic>
-        <p:nvPicPr>
-          <p:cNvPr id="2050" name="Picture 2" descr="스타듀 밸리' 멀티플레이에 개인 계좌가 생긴다">
-            <a:extLst>
-              <a:ext uri="{FF2B5EF4-FFF2-40B4-BE49-F238E27FC236}">
-                <a16:creationId xmlns:a16="http://schemas.microsoft.com/office/drawing/2014/main" id="{C6B8E51C-6B40-9E38-0AAF-91944D51413B}"/>
-              </a:ext>
-            </a:extLst>
-          </p:cNvPr>
-          <p:cNvPicPr>
-            <a:picLocks noChangeAspect="1" noChangeArrowheads="1"/>
-          </p:cNvPicPr>
-          <p:nvPr/>
-        </p:nvPicPr>
-        <p:blipFill>
-          <a:blip r:embed="rId2">
-            <a:extLst>
-              <a:ext uri="{28A0092B-C50C-407E-A947-70E740481C1C}">
-                <a14:useLocalDpi xmlns:a14="http://schemas.microsoft.com/office/drawing/2010/main" val="0"/>
-              </a:ext>
-            </a:extLst>
-          </a:blip>
-          <a:srcRect/>
-          <a:stretch>
-            <a:fillRect/>
-          </a:stretch>
-        </p:blipFill>
-        <p:spPr bwMode="auto">
-          <a:xfrm>
-            <a:off x="446820" y="1690688"/>
-            <a:ext cx="3684637" cy="2314730"/>
-          </a:xfrm>
-          <a:prstGeom prst="rect">
-            <a:avLst/>
-          </a:prstGeom>
-          <a:noFill/>
-          <a:extLst>
-            <a:ext uri="{909E8E84-426E-40DD-AFC4-6F175D3DCCD1}">
-              <a14:hiddenFill xmlns:a14="http://schemas.microsoft.com/office/drawing/2010/main">
-                <a:solidFill>
-                  <a:srgbClr val="FFFFFF"/>
-                </a:solidFill>
-              </a14:hiddenFill>
-            </a:ext>
-          </a:extLst>
-        </p:spPr>
-      </p:pic>
-      <p:pic>
-        <p:nvPicPr>
-          <p:cNvPr id="2056" name="Picture 8" descr="스타듀 밸리, 1.5버전 콘텐츠 스크린샷 공개">
-            <a:extLst>
-              <a:ext uri="{FF2B5EF4-FFF2-40B4-BE49-F238E27FC236}">
-                <a16:creationId xmlns:a16="http://schemas.microsoft.com/office/drawing/2014/main" id="{276F0B36-83F6-906B-E559-76781ECAB45E}"/>
-              </a:ext>
-            </a:extLst>
-          </p:cNvPr>
-          <p:cNvPicPr>
-            <a:picLocks noChangeAspect="1" noChangeArrowheads="1"/>
-          </p:cNvPicPr>
-          <p:nvPr/>
-        </p:nvPicPr>
-        <p:blipFill>
-          <a:blip r:embed="rId3">
-            <a:extLst>
-              <a:ext uri="{28A0092B-C50C-407E-A947-70E740481C1C}">
-                <a14:useLocalDpi xmlns:a14="http://schemas.microsoft.com/office/drawing/2010/main" val="0"/>
-              </a:ext>
-            </a:extLst>
-          </a:blip>
-          <a:srcRect/>
-          <a:stretch>
-            <a:fillRect/>
-          </a:stretch>
-        </p:blipFill>
-        <p:spPr bwMode="auto">
-          <a:xfrm>
-            <a:off x="4504149" y="1690688"/>
-            <a:ext cx="3183701" cy="2314730"/>
-          </a:xfrm>
-          <a:prstGeom prst="rect">
-            <a:avLst/>
-          </a:prstGeom>
-          <a:noFill/>
-          <a:extLst>
-            <a:ext uri="{909E8E84-426E-40DD-AFC4-6F175D3DCCD1}">
-              <a14:hiddenFill xmlns:a14="http://schemas.microsoft.com/office/drawing/2010/main">
-                <a:solidFill>
-                  <a:srgbClr val="FFFFFF"/>
-                </a:solidFill>
-              </a14:hiddenFill>
-            </a:ext>
-          </a:extLst>
-        </p:spPr>
-      </p:pic>
-      <p:pic>
-        <p:nvPicPr>
-          <p:cNvPr id="2058" name="Picture 10" descr="스타듀 밸리(Stardew Valley) 플레이4 : 네이버 블로그">
-            <a:extLst>
-              <a:ext uri="{FF2B5EF4-FFF2-40B4-BE49-F238E27FC236}">
-                <a16:creationId xmlns:a16="http://schemas.microsoft.com/office/drawing/2014/main" id="{C52CBB88-71F0-A781-E125-6DA103EDD7E8}"/>
-              </a:ext>
-            </a:extLst>
-          </p:cNvPr>
-          <p:cNvPicPr>
-            <a:picLocks noChangeAspect="1" noChangeArrowheads="1"/>
-          </p:cNvPicPr>
-          <p:nvPr/>
-        </p:nvPicPr>
-        <p:blipFill>
-          <a:blip r:embed="rId4">
-            <a:extLst>
-              <a:ext uri="{28A0092B-C50C-407E-A947-70E740481C1C}">
-                <a14:useLocalDpi xmlns:a14="http://schemas.microsoft.com/office/drawing/2010/main" val="0"/>
-              </a:ext>
-            </a:extLst>
-          </a:blip>
-          <a:srcRect/>
-          <a:stretch>
-            <a:fillRect/>
-          </a:stretch>
-        </p:blipFill>
-        <p:spPr bwMode="auto">
-          <a:xfrm>
-            <a:off x="8060542" y="1690688"/>
-            <a:ext cx="3736688" cy="2314730"/>
-          </a:xfrm>
-          <a:prstGeom prst="rect">
-            <a:avLst/>
-          </a:prstGeom>
-          <a:noFill/>
-          <a:extLst>
-            <a:ext uri="{909E8E84-426E-40DD-AFC4-6F175D3DCCD1}">
-              <a14:hiddenFill xmlns:a14="http://schemas.microsoft.com/office/drawing/2010/main">
-                <a:solidFill>
-                  <a:srgbClr val="FFFFFF"/>
-                </a:solidFill>
-              </a14:hiddenFill>
-            </a:ext>
-          </a:extLst>
-        </p:spPr>
-      </p:pic>
-      <p:sp>
-        <p:nvSpPr>
-          <p:cNvPr id="4" name="TextBox 3">
-            <a:extLst>
-              <a:ext uri="{FF2B5EF4-FFF2-40B4-BE49-F238E27FC236}">
-                <a16:creationId xmlns:a16="http://schemas.microsoft.com/office/drawing/2014/main" id="{2F82986C-DBBC-A8BB-F39D-108E8096A6AE}"/>
-              </a:ext>
-            </a:extLst>
-          </p:cNvPr>
-          <p:cNvSpPr txBox="1"/>
-          <p:nvPr/>
-        </p:nvSpPr>
-        <p:spPr>
-          <a:xfrm>
-            <a:off x="446820" y="4315318"/>
-            <a:ext cx="3398687" cy="2031325"/>
-          </a:xfrm>
-          <a:prstGeom prst="rect">
-            <a:avLst/>
-          </a:prstGeom>
-          <a:noFill/>
-        </p:spPr>
-        <p:txBody>
-          <a:bodyPr wrap="none" rtlCol="0">
-            <a:spAutoFit/>
-          </a:bodyPr>
-          <a:lstStyle/>
-          <a:p>
-            <a:pPr marL="285750" indent="-285750">
-              <a:buFont typeface="Wingdings" panose="05000000000000000000" pitchFamily="2" charset="2"/>
-              <a:buChar char="ü"/>
-            </a:pPr>
-            <a:r>
-              <a:rPr lang="en-US" altLang="ko-KR" dirty="0"/>
-              <a:t>Stardew Valley </a:t>
-            </a:r>
-          </a:p>
-          <a:p>
-            <a:pPr marL="285750" indent="-285750">
-              <a:buFont typeface="Wingdings" panose="05000000000000000000" pitchFamily="2" charset="2"/>
-              <a:buChar char="ü"/>
-            </a:pPr>
-            <a:endParaRPr lang="en-US" altLang="ko-KR" dirty="0"/>
-          </a:p>
-          <a:p>
-            <a:pPr marL="285750" indent="-285750">
-              <a:buFont typeface="Wingdings" panose="05000000000000000000" pitchFamily="2" charset="2"/>
-              <a:buChar char="ü"/>
-            </a:pPr>
-            <a:r>
-              <a:rPr lang="ko-KR" altLang="en-US" dirty="0"/>
-              <a:t>시뮬레이션 게임 </a:t>
-            </a:r>
-            <a:r>
-              <a:rPr lang="en-US" altLang="ko-KR" dirty="0"/>
-              <a:t>(</a:t>
-            </a:r>
-            <a:r>
-              <a:rPr lang="ko-KR" altLang="en-US" dirty="0" err="1"/>
-              <a:t>인디</a:t>
-            </a:r>
-            <a:r>
-              <a:rPr lang="ko-KR" altLang="en-US" dirty="0"/>
-              <a:t> 게임</a:t>
-            </a:r>
-            <a:r>
-              <a:rPr lang="en-US" altLang="ko-KR" dirty="0"/>
-              <a:t>)</a:t>
-            </a:r>
-          </a:p>
-          <a:p>
-            <a:pPr marL="285750" indent="-285750">
-              <a:buFont typeface="Wingdings" panose="05000000000000000000" pitchFamily="2" charset="2"/>
-              <a:buChar char="ü"/>
-            </a:pPr>
-            <a:endParaRPr lang="en-US" altLang="ko-KR" dirty="0"/>
-          </a:p>
-          <a:p>
-            <a:pPr marL="285750" indent="-285750">
-              <a:buFont typeface="Wingdings" panose="05000000000000000000" pitchFamily="2" charset="2"/>
-              <a:buChar char="ü"/>
-            </a:pPr>
-            <a:r>
-              <a:rPr lang="ko-KR" altLang="en-US" dirty="0"/>
-              <a:t>캐릭터의 기본적인 이동</a:t>
-            </a:r>
-            <a:endParaRPr lang="en-US" altLang="ko-KR" dirty="0"/>
-          </a:p>
-          <a:p>
-            <a:pPr marL="285750" indent="-285750">
-              <a:buFont typeface="Wingdings" panose="05000000000000000000" pitchFamily="2" charset="2"/>
-              <a:buChar char="ü"/>
-            </a:pPr>
-            <a:endParaRPr lang="en-US" altLang="ko-KR" dirty="0"/>
-          </a:p>
-          <a:p>
-            <a:pPr marL="285750" indent="-285750">
-              <a:buFont typeface="Wingdings" panose="05000000000000000000" pitchFamily="2" charset="2"/>
-              <a:buChar char="ü"/>
-            </a:pPr>
-            <a:r>
-              <a:rPr lang="ko-KR" altLang="en-US" dirty="0"/>
-              <a:t>농사</a:t>
-            </a:r>
-            <a:r>
-              <a:rPr lang="en-US" altLang="ko-KR" dirty="0"/>
-              <a:t>, </a:t>
-            </a:r>
-            <a:r>
-              <a:rPr lang="ko-KR" altLang="en-US" dirty="0"/>
-              <a:t>목축</a:t>
-            </a:r>
-            <a:r>
-              <a:rPr lang="en-US" altLang="ko-KR" dirty="0"/>
-              <a:t>, </a:t>
-            </a:r>
-            <a:r>
-              <a:rPr lang="ko-KR" altLang="en-US" dirty="0"/>
-              <a:t>채광</a:t>
-            </a:r>
-            <a:r>
-              <a:rPr lang="en-US" altLang="ko-KR" dirty="0"/>
-              <a:t>, </a:t>
-            </a:r>
-            <a:r>
-              <a:rPr lang="ko-KR" altLang="en-US" dirty="0"/>
-              <a:t>낚시 등</a:t>
-            </a:r>
-          </a:p>
-        </p:txBody>
-      </p:sp>
-      <p:sp>
-        <p:nvSpPr>
-          <p:cNvPr id="5" name="TextBox 4">
-            <a:extLst>
-              <a:ext uri="{FF2B5EF4-FFF2-40B4-BE49-F238E27FC236}">
-                <a16:creationId xmlns:a16="http://schemas.microsoft.com/office/drawing/2014/main" id="{4A0BAE5C-B0FF-4B5D-95E2-42F22065E165}"/>
-              </a:ext>
-            </a:extLst>
-          </p:cNvPr>
-          <p:cNvSpPr txBox="1"/>
-          <p:nvPr/>
-        </p:nvSpPr>
-        <p:spPr>
-          <a:xfrm>
-            <a:off x="4504149" y="4315318"/>
-            <a:ext cx="3199915" cy="1477328"/>
-          </a:xfrm>
-          <a:prstGeom prst="rect">
-            <a:avLst/>
-          </a:prstGeom>
-          <a:noFill/>
-        </p:spPr>
-        <p:txBody>
-          <a:bodyPr wrap="none" rtlCol="0">
-            <a:spAutoFit/>
-          </a:bodyPr>
-          <a:lstStyle/>
-          <a:p>
-            <a:pPr marL="285750" indent="-285750">
-              <a:buFont typeface="Wingdings" panose="05000000000000000000" pitchFamily="2" charset="2"/>
-              <a:buChar char="ü"/>
-            </a:pPr>
-            <a:r>
-              <a:rPr lang="en-US" altLang="ko-KR" dirty="0"/>
-              <a:t>In Place </a:t>
-            </a:r>
-            <a:r>
-              <a:rPr lang="ko-KR" altLang="en-US" dirty="0"/>
-              <a:t>화면 전환</a:t>
-            </a:r>
-            <a:endParaRPr lang="en-US" altLang="ko-KR" dirty="0"/>
-          </a:p>
-          <a:p>
-            <a:pPr marL="285750" indent="-285750">
-              <a:buFont typeface="Wingdings" panose="05000000000000000000" pitchFamily="2" charset="2"/>
-              <a:buChar char="ü"/>
-            </a:pPr>
-            <a:endParaRPr lang="en-US" altLang="ko-KR" dirty="0"/>
-          </a:p>
-          <a:p>
-            <a:pPr marL="285750" indent="-285750">
-              <a:buFont typeface="Wingdings" panose="05000000000000000000" pitchFamily="2" charset="2"/>
-              <a:buChar char="ü"/>
-            </a:pPr>
-            <a:r>
-              <a:rPr lang="ko-KR" altLang="en-US" dirty="0"/>
-              <a:t>다양한 공간 구성</a:t>
-            </a:r>
-            <a:endParaRPr lang="en-US" altLang="ko-KR" dirty="0"/>
-          </a:p>
-          <a:p>
-            <a:pPr marL="285750" indent="-285750">
-              <a:buFont typeface="Wingdings" panose="05000000000000000000" pitchFamily="2" charset="2"/>
-              <a:buChar char="ü"/>
-            </a:pPr>
-            <a:endParaRPr lang="en-US" altLang="ko-KR" dirty="0"/>
-          </a:p>
-          <a:p>
-            <a:pPr marL="285750" indent="-285750">
-              <a:buFont typeface="Wingdings" panose="05000000000000000000" pitchFamily="2" charset="2"/>
-              <a:buChar char="ü"/>
-            </a:pPr>
-            <a:r>
-              <a:rPr lang="ko-KR" altLang="en-US" dirty="0"/>
-              <a:t>퀘스트 </a:t>
-            </a:r>
-            <a:r>
-              <a:rPr lang="en-US" altLang="ko-KR" dirty="0"/>
-              <a:t>/ </a:t>
-            </a:r>
-            <a:r>
-              <a:rPr lang="ko-KR" altLang="en-US" dirty="0"/>
-              <a:t>다른 컨텐츠 구현</a:t>
-            </a:r>
-          </a:p>
-        </p:txBody>
-      </p:sp>
-      <p:sp>
-        <p:nvSpPr>
-          <p:cNvPr id="6" name="TextBox 5">
-            <a:extLst>
-              <a:ext uri="{FF2B5EF4-FFF2-40B4-BE49-F238E27FC236}">
-                <a16:creationId xmlns:a16="http://schemas.microsoft.com/office/drawing/2014/main" id="{16F355EA-5DF4-C635-1188-01A5A0314075}"/>
-              </a:ext>
-            </a:extLst>
-          </p:cNvPr>
-          <p:cNvSpPr txBox="1"/>
-          <p:nvPr/>
-        </p:nvSpPr>
-        <p:spPr>
-          <a:xfrm>
-            <a:off x="8060542" y="4315318"/>
-            <a:ext cx="3736688" cy="2031325"/>
-          </a:xfrm>
-          <a:prstGeom prst="rect">
-            <a:avLst/>
-          </a:prstGeom>
-          <a:noFill/>
-        </p:spPr>
-        <p:txBody>
-          <a:bodyPr wrap="square" rtlCol="0">
-            <a:spAutoFit/>
-          </a:bodyPr>
-          <a:lstStyle/>
-          <a:p>
-            <a:pPr marL="285750" indent="-285750">
-              <a:buFont typeface="Wingdings" panose="05000000000000000000" pitchFamily="2" charset="2"/>
-              <a:buChar char="ü"/>
-            </a:pPr>
-            <a:r>
-              <a:rPr lang="ko-KR" altLang="en-US" dirty="0"/>
-              <a:t>사람 </a:t>
-            </a:r>
-            <a:r>
-              <a:rPr lang="en-US" altLang="ko-KR" dirty="0"/>
-              <a:t>/ </a:t>
-            </a:r>
-            <a:r>
-              <a:rPr lang="ko-KR" altLang="en-US" dirty="0"/>
-              <a:t>사물과의 상호 작용</a:t>
-            </a:r>
-            <a:endParaRPr lang="en-US" altLang="ko-KR" dirty="0"/>
-          </a:p>
-          <a:p>
-            <a:pPr marL="285750" indent="-285750">
-              <a:buFont typeface="Wingdings" panose="05000000000000000000" pitchFamily="2" charset="2"/>
-              <a:buChar char="ü"/>
-            </a:pPr>
-            <a:endParaRPr lang="en-US" altLang="ko-KR" dirty="0"/>
-          </a:p>
-          <a:p>
-            <a:pPr marL="285750" indent="-285750">
-              <a:buFont typeface="Wingdings" panose="05000000000000000000" pitchFamily="2" charset="2"/>
-              <a:buChar char="ü"/>
-            </a:pPr>
-            <a:r>
-              <a:rPr lang="ko-KR" altLang="en-US" dirty="0"/>
-              <a:t>텍스트 출력</a:t>
-            </a:r>
-            <a:endParaRPr lang="en-US" altLang="ko-KR" dirty="0"/>
-          </a:p>
-          <a:p>
-            <a:pPr marL="285750" indent="-285750">
-              <a:buFont typeface="Wingdings" panose="05000000000000000000" pitchFamily="2" charset="2"/>
-              <a:buChar char="ü"/>
-            </a:pPr>
-            <a:endParaRPr lang="en-US" altLang="ko-KR" dirty="0"/>
-          </a:p>
-          <a:p>
-            <a:pPr marL="285750" indent="-285750">
-              <a:buFont typeface="Wingdings" panose="05000000000000000000" pitchFamily="2" charset="2"/>
-              <a:buChar char="ü"/>
-            </a:pPr>
-            <a:r>
-              <a:rPr lang="ko-KR" altLang="en-US" dirty="0"/>
-              <a:t>텍스트 입력</a:t>
-            </a:r>
-            <a:endParaRPr lang="en-US" altLang="ko-KR" dirty="0"/>
-          </a:p>
-          <a:p>
-            <a:pPr marL="285750" indent="-285750">
-              <a:buFont typeface="Wingdings" panose="05000000000000000000" pitchFamily="2" charset="2"/>
-              <a:buChar char="ü"/>
-            </a:pPr>
-            <a:endParaRPr lang="en-US" altLang="ko-KR" dirty="0"/>
-          </a:p>
-          <a:p>
-            <a:pPr marL="285750" indent="-285750">
-              <a:buFont typeface="Wingdings" panose="05000000000000000000" pitchFamily="2" charset="2"/>
-              <a:buChar char="ü"/>
-            </a:pPr>
-            <a:endParaRPr lang="ko-KR" altLang="en-US" dirty="0"/>
-          </a:p>
-        </p:txBody>
-      </p:sp>
-    </p:spTree>
-    <p:extLst>
-      <p:ext uri="{BB962C8B-B14F-4D97-AF65-F5344CB8AC3E}">
-        <p14:creationId xmlns:p14="http://schemas.microsoft.com/office/powerpoint/2010/main" val="3329744169"/>
-      </p:ext>
-    </p:extLst>
-  </p:cSld>
-  <p:clrMapOvr>
-    <a:masterClrMapping/>
-  </p:clrMapOvr>
-</p:sld>
-</file>
-
-<file path=ppt/slides/slide3.xml><?xml version="1.0" encoding="utf-8"?>
-<p:sld xmlns:a="http://schemas.openxmlformats.org/drawingml/2006/main" xmlns:r="http://schemas.openxmlformats.org/officeDocument/2006/relationships" xmlns:p="http://schemas.openxmlformats.org/presentationml/2006/main">
-  <p:cSld>
-    <p:spTree>
-      <p:nvGrpSpPr>
-        <p:cNvPr id="1" name=""/>
-        <p:cNvGrpSpPr/>
-        <p:nvPr/>
-      </p:nvGrpSpPr>
-      <p:grpSpPr>
-        <a:xfrm>
-          <a:off x="0" y="0"/>
-          <a:ext cx="0" cy="0"/>
-          <a:chOff x="0" y="0"/>
-          <a:chExt cx="0" cy="0"/>
-        </a:xfrm>
-      </p:grpSpPr>
-      <p:sp>
-        <p:nvSpPr>
-          <p:cNvPr id="2" name="제목 1">
-            <a:extLst>
-              <a:ext uri="{FF2B5EF4-FFF2-40B4-BE49-F238E27FC236}">
-                <a16:creationId xmlns:a16="http://schemas.microsoft.com/office/drawing/2014/main" id="{C4E861CB-7D10-E7EF-48E9-58C1808238A2}"/>
-              </a:ext>
-            </a:extLst>
-          </p:cNvPr>
-          <p:cNvSpPr>
-            <a:spLocks noGrp="1"/>
-          </p:cNvSpPr>
-          <p:nvPr>
-            <p:ph type="title"/>
-          </p:nvPr>
-        </p:nvSpPr>
-        <p:spPr/>
-        <p:txBody>
-          <a:bodyPr/>
-          <a:lstStyle/>
-          <a:p>
-            <a:r>
-              <a:rPr lang="en-US" altLang="ko-KR" dirty="0">
-                <a:latin typeface="Cambria" panose="02040503050406030204" pitchFamily="18" charset="0"/>
-                <a:ea typeface="Cambria" panose="02040503050406030204" pitchFamily="18" charset="0"/>
-              </a:rPr>
-              <a:t>IDEAs</a:t>
-            </a:r>
-            <a:endParaRPr lang="ko-KR" altLang="en-US" dirty="0">
-              <a:latin typeface="Cambria" panose="02040503050406030204" pitchFamily="18" charset="0"/>
-            </a:endParaRPr>
-          </a:p>
-        </p:txBody>
-      </p:sp>
-      <p:pic>
-        <p:nvPicPr>
-          <p:cNvPr id="4" name="Picture 4">
-            <a:extLst>
-              <a:ext uri="{FF2B5EF4-FFF2-40B4-BE49-F238E27FC236}">
-                <a16:creationId xmlns:a16="http://schemas.microsoft.com/office/drawing/2014/main" id="{61C7FFF6-B59E-D571-0DDE-A4930E39FCAC}"/>
-              </a:ext>
-            </a:extLst>
-          </p:cNvPr>
-          <p:cNvPicPr>
-            <a:picLocks noGrp="1" noChangeAspect="1" noChangeArrowheads="1"/>
-          </p:cNvPicPr>
-          <p:nvPr>
-            <p:ph idx="1"/>
-          </p:nvPr>
-        </p:nvPicPr>
-        <p:blipFill>
-          <a:blip r:embed="rId2">
-            <a:extLst>
-              <a:ext uri="{28A0092B-C50C-407E-A947-70E740481C1C}">
-                <a14:useLocalDpi xmlns:a14="http://schemas.microsoft.com/office/drawing/2010/main" val="0"/>
-              </a:ext>
-            </a:extLst>
-          </a:blip>
-          <a:srcRect/>
-          <a:stretch>
-            <a:fillRect/>
-          </a:stretch>
-        </p:blipFill>
-        <p:spPr bwMode="auto">
-          <a:xfrm>
-            <a:off x="4263513" y="1690688"/>
-            <a:ext cx="3664974" cy="2314730"/>
-          </a:xfrm>
-          <a:prstGeom prst="rect">
-            <a:avLst/>
-          </a:prstGeom>
-          <a:noFill/>
-          <a:extLst>
-            <a:ext uri="{909E8E84-426E-40DD-AFC4-6F175D3DCCD1}">
-              <a14:hiddenFill xmlns:a14="http://schemas.microsoft.com/office/drawing/2010/main">
-                <a:solidFill>
-                  <a:srgbClr val="FFFFFF"/>
-                </a:solidFill>
-              </a14:hiddenFill>
-            </a:ext>
-          </a:extLst>
-        </p:spPr>
-      </p:pic>
-      <p:pic>
-        <p:nvPicPr>
-          <p:cNvPr id="5" name="Picture 6" descr="24b0d121e09270f427f1c6bb11f11a39a843b73d58441c2fb4">
-            <a:extLst>
-              <a:ext uri="{FF2B5EF4-FFF2-40B4-BE49-F238E27FC236}">
-                <a16:creationId xmlns:a16="http://schemas.microsoft.com/office/drawing/2014/main" id="{3B801886-836A-64C2-3EC2-52B3989947A2}"/>
-              </a:ext>
-            </a:extLst>
-          </p:cNvPr>
-          <p:cNvPicPr>
-            <a:picLocks noChangeAspect="1" noChangeArrowheads="1"/>
-          </p:cNvPicPr>
-          <p:nvPr/>
-        </p:nvPicPr>
-        <p:blipFill>
-          <a:blip r:embed="rId3">
-            <a:extLst>
-              <a:ext uri="{28A0092B-C50C-407E-A947-70E740481C1C}">
-                <a14:useLocalDpi xmlns:a14="http://schemas.microsoft.com/office/drawing/2010/main" val="0"/>
-              </a:ext>
-            </a:extLst>
-          </a:blip>
-          <a:srcRect/>
-          <a:stretch>
-            <a:fillRect/>
-          </a:stretch>
-        </p:blipFill>
-        <p:spPr bwMode="auto">
-          <a:xfrm>
-            <a:off x="454742" y="1690688"/>
-            <a:ext cx="3457575" cy="2314730"/>
-          </a:xfrm>
-          <a:prstGeom prst="rect">
-            <a:avLst/>
-          </a:prstGeom>
-          <a:noFill/>
-          <a:extLst>
-            <a:ext uri="{909E8E84-426E-40DD-AFC4-6F175D3DCCD1}">
-              <a14:hiddenFill xmlns:a14="http://schemas.microsoft.com/office/drawing/2010/main">
-                <a:solidFill>
-                  <a:srgbClr val="FFFFFF"/>
-                </a:solidFill>
-              </a14:hiddenFill>
-            </a:ext>
-          </a:extLst>
-        </p:spPr>
-      </p:pic>
-      <p:pic>
-        <p:nvPicPr>
-          <p:cNvPr id="3074" name="Picture 2" descr="24b0d121e09270f127f1c6bb11f11a39aee8bcc99742d5da">
-            <a:extLst>
-              <a:ext uri="{FF2B5EF4-FFF2-40B4-BE49-F238E27FC236}">
-                <a16:creationId xmlns:a16="http://schemas.microsoft.com/office/drawing/2014/main" id="{7BE92006-50B7-2BB3-00CE-CE4772B6D9BC}"/>
-              </a:ext>
-            </a:extLst>
-          </p:cNvPr>
-          <p:cNvPicPr>
-            <a:picLocks noChangeAspect="1" noChangeArrowheads="1"/>
-          </p:cNvPicPr>
-          <p:nvPr/>
-        </p:nvPicPr>
-        <p:blipFill>
-          <a:blip r:embed="rId4">
-            <a:extLst>
-              <a:ext uri="{28A0092B-C50C-407E-A947-70E740481C1C}">
-                <a14:useLocalDpi xmlns:a14="http://schemas.microsoft.com/office/drawing/2010/main" val="0"/>
-              </a:ext>
-            </a:extLst>
-          </a:blip>
-          <a:srcRect/>
-          <a:stretch>
-            <a:fillRect/>
-          </a:stretch>
-        </p:blipFill>
-        <p:spPr bwMode="auto">
-          <a:xfrm>
-            <a:off x="8311945" y="1690688"/>
-            <a:ext cx="2853506" cy="2314730"/>
-          </a:xfrm>
-          <a:prstGeom prst="rect">
-            <a:avLst/>
-          </a:prstGeom>
-          <a:noFill/>
-          <a:extLst>
-            <a:ext uri="{909E8E84-426E-40DD-AFC4-6F175D3DCCD1}">
-              <a14:hiddenFill xmlns:a14="http://schemas.microsoft.com/office/drawing/2010/main">
-                <a:solidFill>
-                  <a:srgbClr val="FFFFFF"/>
-                </a:solidFill>
-              </a14:hiddenFill>
-            </a:ext>
-          </a:extLst>
-        </p:spPr>
-      </p:pic>
-      <p:sp>
-        <p:nvSpPr>
-          <p:cNvPr id="6" name="TextBox 5">
-            <a:extLst>
-              <a:ext uri="{FF2B5EF4-FFF2-40B4-BE49-F238E27FC236}">
-                <a16:creationId xmlns:a16="http://schemas.microsoft.com/office/drawing/2014/main" id="{AD57E6F5-72AD-74A9-2357-2D6C7A8D4643}"/>
-              </a:ext>
-            </a:extLst>
-          </p:cNvPr>
-          <p:cNvSpPr txBox="1"/>
-          <p:nvPr/>
-        </p:nvSpPr>
-        <p:spPr>
-          <a:xfrm>
-            <a:off x="454743" y="4428648"/>
-            <a:ext cx="3664974" cy="1754326"/>
-          </a:xfrm>
-          <a:prstGeom prst="rect">
-            <a:avLst/>
-          </a:prstGeom>
-          <a:noFill/>
-        </p:spPr>
-        <p:txBody>
-          <a:bodyPr wrap="square" rtlCol="0">
-            <a:spAutoFit/>
-          </a:bodyPr>
-          <a:lstStyle/>
-          <a:p>
-            <a:pPr marL="285750" indent="-285750">
-              <a:buFont typeface="Wingdings" panose="05000000000000000000" pitchFamily="2" charset="2"/>
-              <a:buChar char="ü"/>
-            </a:pPr>
-            <a:r>
-              <a:rPr lang="ko-KR" altLang="en-US" dirty="0"/>
-              <a:t>캐릭터와 </a:t>
-            </a:r>
-            <a:r>
-              <a:rPr lang="ko-KR" altLang="en-US" dirty="0" err="1"/>
-              <a:t>관련있는</a:t>
-            </a:r>
-            <a:r>
-              <a:rPr lang="ko-KR" altLang="en-US" dirty="0"/>
-              <a:t> 공간으로 설정</a:t>
-            </a:r>
-            <a:endParaRPr lang="en-US" altLang="ko-KR" dirty="0"/>
-          </a:p>
-          <a:p>
-            <a:pPr marL="285750" indent="-285750">
-              <a:buFont typeface="Wingdings" panose="05000000000000000000" pitchFamily="2" charset="2"/>
-              <a:buChar char="ü"/>
-            </a:pPr>
-            <a:endParaRPr lang="en-US" altLang="ko-KR" dirty="0"/>
-          </a:p>
-          <a:p>
-            <a:pPr marL="285750" indent="-285750">
-              <a:buFont typeface="Wingdings" panose="05000000000000000000" pitchFamily="2" charset="2"/>
-              <a:buChar char="ü"/>
-            </a:pPr>
-            <a:r>
-              <a:rPr lang="ko-KR" altLang="en-US" dirty="0"/>
-              <a:t>사람 </a:t>
-            </a:r>
-            <a:r>
-              <a:rPr lang="en-US" altLang="ko-KR" dirty="0"/>
-              <a:t>/ </a:t>
-            </a:r>
-            <a:r>
-              <a:rPr lang="ko-KR" altLang="en-US" dirty="0"/>
-              <a:t>사물과의 상호작용</a:t>
-            </a:r>
-            <a:endParaRPr lang="en-US" altLang="ko-KR" dirty="0"/>
-          </a:p>
-          <a:p>
-            <a:pPr marL="285750" indent="-285750">
-              <a:buFont typeface="Wingdings" panose="05000000000000000000" pitchFamily="2" charset="2"/>
-              <a:buChar char="ü"/>
-            </a:pPr>
-            <a:endParaRPr lang="en-US" altLang="ko-KR" dirty="0"/>
-          </a:p>
-          <a:p>
-            <a:pPr marL="285750" indent="-285750">
-              <a:buFont typeface="Wingdings" panose="05000000000000000000" pitchFamily="2" charset="2"/>
-              <a:buChar char="ü"/>
-            </a:pPr>
-            <a:r>
-              <a:rPr lang="ko-KR" altLang="en-US" dirty="0"/>
-              <a:t>자유로운 이동</a:t>
-            </a:r>
-            <a:endParaRPr lang="en-US" altLang="ko-KR" dirty="0"/>
-          </a:p>
-        </p:txBody>
-      </p:sp>
-      <p:sp>
-        <p:nvSpPr>
-          <p:cNvPr id="7" name="TextBox 6">
-            <a:extLst>
-              <a:ext uri="{FF2B5EF4-FFF2-40B4-BE49-F238E27FC236}">
-                <a16:creationId xmlns:a16="http://schemas.microsoft.com/office/drawing/2014/main" id="{8A006C72-A8C9-668E-21FB-42520012E214}"/>
-              </a:ext>
-            </a:extLst>
-          </p:cNvPr>
-          <p:cNvSpPr txBox="1"/>
-          <p:nvPr/>
-        </p:nvSpPr>
-        <p:spPr>
-          <a:xfrm>
-            <a:off x="4119717" y="4428648"/>
-            <a:ext cx="3719288" cy="1477328"/>
-          </a:xfrm>
-          <a:prstGeom prst="rect">
-            <a:avLst/>
-          </a:prstGeom>
-          <a:noFill/>
-        </p:spPr>
-        <p:txBody>
-          <a:bodyPr wrap="none" rtlCol="0">
-            <a:spAutoFit/>
-          </a:bodyPr>
-          <a:lstStyle/>
-          <a:p>
-            <a:pPr marL="285750" indent="-285750">
-              <a:buFont typeface="Wingdings" panose="05000000000000000000" pitchFamily="2" charset="2"/>
-              <a:buChar char="ü"/>
-            </a:pPr>
-            <a:r>
-              <a:rPr lang="ko-KR" altLang="en-US" dirty="0"/>
-              <a:t>텍스트의 입출력을 위한 컨텐츠</a:t>
-            </a:r>
-            <a:endParaRPr lang="en-US" altLang="ko-KR" dirty="0"/>
-          </a:p>
-          <a:p>
-            <a:pPr marL="285750" indent="-285750">
-              <a:buFont typeface="Wingdings" panose="05000000000000000000" pitchFamily="2" charset="2"/>
-              <a:buChar char="ü"/>
-            </a:pPr>
-            <a:endParaRPr lang="en-US" altLang="ko-KR" dirty="0"/>
-          </a:p>
-          <a:p>
-            <a:pPr marL="285750" indent="-285750">
-              <a:buFont typeface="Wingdings" panose="05000000000000000000" pitchFamily="2" charset="2"/>
-              <a:buChar char="ü"/>
-            </a:pPr>
-            <a:r>
-              <a:rPr lang="ko-KR" altLang="en-US" dirty="0"/>
-              <a:t>직접 입력이 가능하도록 구현</a:t>
-            </a:r>
-            <a:endParaRPr lang="en-US" altLang="ko-KR" dirty="0"/>
-          </a:p>
-          <a:p>
-            <a:pPr marL="285750" indent="-285750">
-              <a:buFont typeface="Wingdings" panose="05000000000000000000" pitchFamily="2" charset="2"/>
-              <a:buChar char="ü"/>
-            </a:pPr>
-            <a:endParaRPr lang="en-US" altLang="ko-KR" dirty="0"/>
-          </a:p>
-          <a:p>
-            <a:pPr marL="285750" indent="-285750">
-              <a:buFont typeface="Wingdings" panose="05000000000000000000" pitchFamily="2" charset="2"/>
-              <a:buChar char="ü"/>
-            </a:pPr>
-            <a:r>
-              <a:rPr lang="ko-KR" altLang="en-US" dirty="0"/>
-              <a:t>선택도 할 수 있도록 구현</a:t>
-            </a:r>
-          </a:p>
-        </p:txBody>
-      </p:sp>
-      <p:sp>
-        <p:nvSpPr>
-          <p:cNvPr id="8" name="TextBox 7">
-            <a:extLst>
-              <a:ext uri="{FF2B5EF4-FFF2-40B4-BE49-F238E27FC236}">
-                <a16:creationId xmlns:a16="http://schemas.microsoft.com/office/drawing/2014/main" id="{CE1399B4-6A08-473B-C2D4-0B64A608AE29}"/>
-              </a:ext>
-            </a:extLst>
-          </p:cNvPr>
-          <p:cNvSpPr txBox="1"/>
-          <p:nvPr/>
-        </p:nvSpPr>
-        <p:spPr>
-          <a:xfrm>
-            <a:off x="8311945" y="4422948"/>
-            <a:ext cx="3565423" cy="2031325"/>
-          </a:xfrm>
-          <a:prstGeom prst="rect">
-            <a:avLst/>
-          </a:prstGeom>
-          <a:noFill/>
-        </p:spPr>
-        <p:txBody>
-          <a:bodyPr wrap="square" rtlCol="0">
-            <a:spAutoFit/>
-          </a:bodyPr>
-          <a:lstStyle/>
-          <a:p>
-            <a:pPr marL="285750" indent="-285750">
-              <a:buFont typeface="Wingdings" panose="05000000000000000000" pitchFamily="2" charset="2"/>
-              <a:buChar char="ü"/>
-            </a:pPr>
-            <a:r>
-              <a:rPr lang="ko-KR" altLang="en-US" dirty="0"/>
-              <a:t>간단히 구현할 수 있는 미니 게임 제작</a:t>
-            </a:r>
-            <a:endParaRPr lang="en-US" altLang="ko-KR" dirty="0"/>
-          </a:p>
-          <a:p>
-            <a:pPr marL="285750" indent="-285750">
-              <a:buFont typeface="Wingdings" panose="05000000000000000000" pitchFamily="2" charset="2"/>
-              <a:buChar char="ü"/>
-            </a:pPr>
-            <a:endParaRPr lang="en-US" altLang="ko-KR" dirty="0"/>
-          </a:p>
-          <a:p>
-            <a:pPr marL="285750" indent="-285750">
-              <a:buFont typeface="Wingdings" panose="05000000000000000000" pitchFamily="2" charset="2"/>
-              <a:buChar char="ü"/>
-            </a:pPr>
-            <a:r>
-              <a:rPr lang="ko-KR" altLang="en-US" dirty="0"/>
-              <a:t>선수의 기량 증감과 관련되도록 구현</a:t>
-            </a:r>
-            <a:endParaRPr lang="en-US" altLang="ko-KR" dirty="0"/>
-          </a:p>
-          <a:p>
-            <a:pPr marL="285750" indent="-285750">
-              <a:buFont typeface="Wingdings" panose="05000000000000000000" pitchFamily="2" charset="2"/>
-              <a:buChar char="ü"/>
-            </a:pPr>
-            <a:endParaRPr lang="en-US" altLang="ko-KR" dirty="0"/>
-          </a:p>
-          <a:p>
-            <a:pPr marL="285750" indent="-285750">
-              <a:buFont typeface="Wingdings" panose="05000000000000000000" pitchFamily="2" charset="2"/>
-              <a:buChar char="ü"/>
-            </a:pPr>
-            <a:r>
-              <a:rPr lang="ko-KR" altLang="en-US" dirty="0"/>
-              <a:t>시간 설정</a:t>
-            </a:r>
-          </a:p>
-        </p:txBody>
-      </p:sp>
-    </p:spTree>
-    <p:extLst>
-      <p:ext uri="{BB962C8B-B14F-4D97-AF65-F5344CB8AC3E}">
-        <p14:creationId xmlns:p14="http://schemas.microsoft.com/office/powerpoint/2010/main" val="3097055040"/>
-      </p:ext>
-    </p:extLst>
-  </p:cSld>
-  <p:clrMapOvr>
-    <a:masterClrMapping/>
-  </p:clrMapOvr>
-</p:sld>
-</file>
-
-<file path=ppt/slides/slide4.xml><?xml version="1.0" encoding="utf-8"?>
-<p:sld xmlns:a="http://schemas.openxmlformats.org/drawingml/2006/main" xmlns:r="http://schemas.openxmlformats.org/officeDocument/2006/relationships" xmlns:p="http://schemas.openxmlformats.org/presentationml/2006/main">
-  <p:cSld>
-    <p:spTree>
-      <p:nvGrpSpPr>
-        <p:cNvPr id="1" name=""/>
-        <p:cNvGrpSpPr/>
-        <p:nvPr/>
-      </p:nvGrpSpPr>
-      <p:grpSpPr>
-        <a:xfrm>
-          <a:off x="0" y="0"/>
-          <a:ext cx="0" cy="0"/>
-          <a:chOff x="0" y="0"/>
-          <a:chExt cx="0" cy="0"/>
-        </a:xfrm>
-      </p:grpSpPr>
       <p:graphicFrame>
         <p:nvGraphicFramePr>
-          <p:cNvPr id="5" name="표 4">
-            <a:extLst>
-              <a:ext uri="{FF2B5EF4-FFF2-40B4-BE49-F238E27FC236}">
-                <a16:creationId xmlns:a16="http://schemas.microsoft.com/office/drawing/2014/main" id="{5D1F13AB-1D27-FF38-82AB-580069F105A6}"/>
+          <p:cNvPr id="6" name="표 5">
+            <a:extLst>
+              <a:ext uri="{FF2B5EF4-FFF2-40B4-BE49-F238E27FC236}">
+                <a16:creationId xmlns:a16="http://schemas.microsoft.com/office/drawing/2014/main" id="{E9C69AAB-CACD-4E72-CBFC-D2F19AC5DE67}"/>
               </a:ext>
             </a:extLst>
           </p:cNvPr>
@@ -4549,1354 +3575,14 @@
           <p:nvPr>
             <p:extLst>
               <p:ext uri="{D42A27DB-BD31-4B8C-83A1-F6EECF244321}">
-                <p14:modId xmlns:p14="http://schemas.microsoft.com/office/powerpoint/2010/main" val="2421400893"/>
+                <p14:modId xmlns:p14="http://schemas.microsoft.com/office/powerpoint/2010/main" val="4099260411"/>
               </p:ext>
             </p:extLst>
           </p:nvPr>
         </p:nvGraphicFramePr>
         <p:xfrm>
-          <a:off x="2032000" y="1219200"/>
-          <a:ext cx="8128000" cy="4998720"/>
-        </p:xfrm>
-        <a:graphic>
-          <a:graphicData uri="http://schemas.openxmlformats.org/drawingml/2006/table">
-            <a:tbl>
-              <a:tblPr firstRow="1" bandRow="1">
-                <a:tableStyleId>{F5AB1C69-6EDB-4FF4-983F-18BD219EF322}</a:tableStyleId>
-              </a:tblPr>
-              <a:tblGrid>
-                <a:gridCol w="1497781">
-                  <a:extLst>
-                    <a:ext uri="{9D8B030D-6E8A-4147-A177-3AD203B41FA5}">
-                      <a16:colId xmlns:a16="http://schemas.microsoft.com/office/drawing/2014/main" val="2077610663"/>
-                    </a:ext>
-                  </a:extLst>
-                </a:gridCol>
-                <a:gridCol w="6630219">
-                  <a:extLst>
-                    <a:ext uri="{9D8B030D-6E8A-4147-A177-3AD203B41FA5}">
-                      <a16:colId xmlns:a16="http://schemas.microsoft.com/office/drawing/2014/main" val="3591744664"/>
-                    </a:ext>
-                  </a:extLst>
-                </a:gridCol>
-              </a:tblGrid>
-              <a:tr h="0">
-                <a:tc>
-                  <a:txBody>
-                    <a:bodyPr/>
-                    <a:lstStyle/>
-                    <a:p>
-                      <a:pPr algn="ctr" latinLnBrk="1"/>
-                      <a:r>
-                        <a:rPr lang="en-US" altLang="ko-KR" dirty="0"/>
-                        <a:t>WEEK</a:t>
-                      </a:r>
-                      <a:endParaRPr lang="ko-KR" altLang="en-US" dirty="0"/>
-                    </a:p>
-                  </a:txBody>
-                  <a:tcPr/>
-                </a:tc>
-                <a:tc>
-                  <a:txBody>
-                    <a:bodyPr/>
-                    <a:lstStyle/>
-                    <a:p>
-                      <a:pPr algn="ctr" latinLnBrk="1"/>
-                      <a:r>
-                        <a:rPr lang="en-US" altLang="ko-KR" dirty="0"/>
-                        <a:t>CONTENTS</a:t>
-                      </a:r>
-                      <a:endParaRPr lang="ko-KR" altLang="en-US" dirty="0"/>
-                    </a:p>
-                  </a:txBody>
-                  <a:tcPr/>
-                </a:tc>
-                <a:extLst>
-                  <a:ext uri="{0D108BD9-81ED-4DB2-BD59-A6C34878D82A}">
-                    <a16:rowId xmlns:a16="http://schemas.microsoft.com/office/drawing/2014/main" val="1560695971"/>
-                  </a:ext>
-                </a:extLst>
-              </a:tr>
-              <a:tr h="575733">
-                <a:tc>
-                  <a:txBody>
-                    <a:bodyPr/>
-                    <a:lstStyle/>
-                    <a:p>
-                      <a:pPr algn="ctr" latinLnBrk="1"/>
-                      <a:r>
-                        <a:rPr lang="en-US" altLang="ko-KR" dirty="0">
-                          <a:latin typeface="Stencil" panose="040409050D0802020404" pitchFamily="82" charset="0"/>
-                        </a:rPr>
-                        <a:t>1</a:t>
-                      </a:r>
-                      <a:r>
-                        <a:rPr lang="ko-KR" altLang="en-US" dirty="0">
-                          <a:latin typeface="Stencil" panose="040409050D0802020404" pitchFamily="82" charset="0"/>
-                        </a:rPr>
-                        <a:t>주차</a:t>
-                      </a:r>
-                      <a:endParaRPr lang="en-US" altLang="ko-KR" dirty="0">
-                        <a:latin typeface="Stencil" panose="040409050D0802020404" pitchFamily="82" charset="0"/>
-                      </a:endParaRPr>
-                    </a:p>
-                    <a:p>
-                      <a:pPr algn="ctr" latinLnBrk="1"/>
-                      <a:r>
-                        <a:rPr lang="en-US" altLang="ko-KR" sz="1400" dirty="0">
-                          <a:latin typeface="Stencil" panose="040409050D0802020404" pitchFamily="82" charset="0"/>
-                        </a:rPr>
-                        <a:t>(10.14)</a:t>
-                      </a:r>
-                    </a:p>
-                  </a:txBody>
-                  <a:tcPr/>
-                </a:tc>
-                <a:tc>
-                  <a:txBody>
-                    <a:bodyPr/>
-                    <a:lstStyle/>
-                    <a:p>
-                      <a:pPr latinLnBrk="1"/>
-                      <a:r>
-                        <a:rPr lang="ko-KR" altLang="en-US" b="0" dirty="0">
-                          <a:effectLst>
-                            <a:outerShdw blurRad="38100" dist="38100" dir="2700000" algn="tl">
-                              <a:srgbClr val="000000">
-                                <a:alpha val="43137"/>
-                              </a:srgbClr>
-                            </a:outerShdw>
-                          </a:effectLst>
-                          <a:latin typeface="굴림" panose="020B0600000101010101" pitchFamily="50" charset="-127"/>
-                          <a:ea typeface="굴림" panose="020B0600000101010101" pitchFamily="50" charset="-127"/>
-                        </a:rPr>
-                        <a:t>캐릭터</a:t>
-                      </a:r>
-                      <a:r>
-                        <a:rPr lang="en-US" altLang="ko-KR" b="0" dirty="0">
-                          <a:effectLst>
-                            <a:outerShdw blurRad="38100" dist="38100" dir="2700000" algn="tl">
-                              <a:srgbClr val="000000">
-                                <a:alpha val="43137"/>
-                              </a:srgbClr>
-                            </a:outerShdw>
-                          </a:effectLst>
-                          <a:latin typeface="굴림" panose="020B0600000101010101" pitchFamily="50" charset="-127"/>
-                          <a:ea typeface="굴림" panose="020B0600000101010101" pitchFamily="50" charset="-127"/>
-                        </a:rPr>
-                        <a:t>, </a:t>
-                      </a:r>
-                      <a:r>
-                        <a:rPr lang="ko-KR" altLang="en-US" b="0" dirty="0">
-                          <a:effectLst>
-                            <a:outerShdw blurRad="38100" dist="38100" dir="2700000" algn="tl">
-                              <a:srgbClr val="000000">
-                                <a:alpha val="43137"/>
-                              </a:srgbClr>
-                            </a:outerShdw>
-                          </a:effectLst>
-                          <a:latin typeface="굴림" panose="020B0600000101010101" pitchFamily="50" charset="-127"/>
-                          <a:ea typeface="굴림" panose="020B0600000101010101" pitchFamily="50" charset="-127"/>
-                        </a:rPr>
-                        <a:t>맵 리소스 적용 및 캐릭터 이동 구현</a:t>
-                      </a:r>
-                    </a:p>
-                  </a:txBody>
-                  <a:tcPr/>
-                </a:tc>
-                <a:extLst>
-                  <a:ext uri="{0D108BD9-81ED-4DB2-BD59-A6C34878D82A}">
-                    <a16:rowId xmlns:a16="http://schemas.microsoft.com/office/drawing/2014/main" val="960025325"/>
-                  </a:ext>
-                </a:extLst>
-              </a:tr>
-              <a:tr h="575733">
-                <a:tc>
-                  <a:txBody>
-                    <a:bodyPr/>
-                    <a:lstStyle/>
-                    <a:p>
-                      <a:pPr marL="0" marR="0" lvl="0" indent="0" algn="ctr" defTabSz="914400" rtl="0" eaLnBrk="1" fontAlgn="auto" latinLnBrk="1" hangingPunct="1">
-                        <a:lnSpc>
-                          <a:spcPct val="100000"/>
-                        </a:lnSpc>
-                        <a:spcBef>
-                          <a:spcPts val="0"/>
-                        </a:spcBef>
-                        <a:spcAft>
-                          <a:spcPts val="0"/>
-                        </a:spcAft>
-                        <a:buClrTx/>
-                        <a:buSzTx/>
-                        <a:buFontTx/>
-                        <a:buNone/>
-                        <a:tabLst/>
-                        <a:defRPr/>
-                      </a:pPr>
-                      <a:r>
-                        <a:rPr lang="en-US" altLang="ko-KR" dirty="0">
-                          <a:latin typeface="Stencil" panose="040409050D0802020404" pitchFamily="82" charset="0"/>
-                        </a:rPr>
-                        <a:t>2</a:t>
-                      </a:r>
-                      <a:r>
-                        <a:rPr lang="ko-KR" altLang="en-US" dirty="0">
-                          <a:latin typeface="Stencil" panose="040409050D0802020404" pitchFamily="82" charset="0"/>
-                        </a:rPr>
-                        <a:t>주차</a:t>
-                      </a:r>
-                      <a:endParaRPr lang="en-US" altLang="ko-KR" dirty="0">
-                        <a:latin typeface="Stencil" panose="040409050D0802020404" pitchFamily="82" charset="0"/>
-                      </a:endParaRPr>
-                    </a:p>
-                    <a:p>
-                      <a:pPr marL="0" marR="0" lvl="0" indent="0" algn="ctr" defTabSz="914400" rtl="0" eaLnBrk="1" fontAlgn="auto" latinLnBrk="1" hangingPunct="1">
-                        <a:lnSpc>
-                          <a:spcPct val="100000"/>
-                        </a:lnSpc>
-                        <a:spcBef>
-                          <a:spcPts val="0"/>
-                        </a:spcBef>
-                        <a:spcAft>
-                          <a:spcPts val="0"/>
-                        </a:spcAft>
-                        <a:buClrTx/>
-                        <a:buSzTx/>
-                        <a:buFontTx/>
-                        <a:buNone/>
-                        <a:tabLst/>
-                        <a:defRPr/>
-                      </a:pPr>
-                      <a:r>
-                        <a:rPr lang="en-US" altLang="ko-KR" sz="1400" dirty="0">
-                          <a:latin typeface="Stencil" panose="040409050D0802020404" pitchFamily="82" charset="0"/>
-                        </a:rPr>
-                        <a:t>(10.21)</a:t>
-                      </a:r>
-                    </a:p>
-                  </a:txBody>
-                  <a:tcPr/>
-                </a:tc>
-                <a:tc>
-                  <a:txBody>
-                    <a:bodyPr/>
-                    <a:lstStyle/>
-                    <a:p>
-                      <a:pPr latinLnBrk="1"/>
-                      <a:r>
-                        <a:rPr lang="ko-KR" altLang="en-US" b="0" dirty="0">
-                          <a:effectLst>
-                            <a:outerShdw blurRad="38100" dist="38100" dir="2700000" algn="tl">
-                              <a:srgbClr val="000000">
-                                <a:alpha val="43137"/>
-                              </a:srgbClr>
-                            </a:outerShdw>
-                          </a:effectLst>
-                          <a:latin typeface="굴림" panose="020B0600000101010101" pitchFamily="50" charset="-127"/>
-                          <a:ea typeface="굴림" panose="020B0600000101010101" pitchFamily="50" charset="-127"/>
-                        </a:rPr>
-                        <a:t>캐릭터 속성 추가 구현 </a:t>
-                      </a:r>
-                      <a:r>
-                        <a:rPr lang="en-US" altLang="ko-KR" b="0" dirty="0">
-                          <a:effectLst>
-                            <a:outerShdw blurRad="38100" dist="38100" dir="2700000" algn="tl">
-                              <a:srgbClr val="000000">
-                                <a:alpha val="43137"/>
-                              </a:srgbClr>
-                            </a:outerShdw>
-                          </a:effectLst>
-                          <a:latin typeface="굴림" panose="020B0600000101010101" pitchFamily="50" charset="-127"/>
-                          <a:ea typeface="굴림" panose="020B0600000101010101" pitchFamily="50" charset="-127"/>
-                        </a:rPr>
-                        <a:t>+</a:t>
-                      </a:r>
-                      <a:r>
-                        <a:rPr lang="ko-KR" altLang="en-US" b="0" dirty="0">
-                          <a:effectLst>
-                            <a:outerShdw blurRad="38100" dist="38100" dir="2700000" algn="tl">
-                              <a:srgbClr val="000000">
-                                <a:alpha val="43137"/>
-                              </a:srgbClr>
-                            </a:outerShdw>
-                          </a:effectLst>
-                          <a:latin typeface="굴림" panose="020B0600000101010101" pitchFamily="50" charset="-127"/>
-                          <a:ea typeface="굴림" panose="020B0600000101010101" pitchFamily="50" charset="-127"/>
-                        </a:rPr>
-                        <a:t> 화면 전환과 상호작용 대상들 구현</a:t>
-                      </a:r>
-                    </a:p>
-                  </a:txBody>
-                  <a:tcPr/>
-                </a:tc>
-                <a:extLst>
-                  <a:ext uri="{0D108BD9-81ED-4DB2-BD59-A6C34878D82A}">
-                    <a16:rowId xmlns:a16="http://schemas.microsoft.com/office/drawing/2014/main" val="1379970148"/>
-                  </a:ext>
-                </a:extLst>
-              </a:tr>
-              <a:tr h="575733">
-                <a:tc>
-                  <a:txBody>
-                    <a:bodyPr/>
-                    <a:lstStyle/>
-                    <a:p>
-                      <a:pPr marL="0" marR="0" lvl="0" indent="0" algn="ctr" defTabSz="914400" rtl="0" eaLnBrk="1" fontAlgn="auto" latinLnBrk="1" hangingPunct="1">
-                        <a:lnSpc>
-                          <a:spcPct val="100000"/>
-                        </a:lnSpc>
-                        <a:spcBef>
-                          <a:spcPts val="0"/>
-                        </a:spcBef>
-                        <a:spcAft>
-                          <a:spcPts val="0"/>
-                        </a:spcAft>
-                        <a:buClrTx/>
-                        <a:buSzTx/>
-                        <a:buFontTx/>
-                        <a:buNone/>
-                        <a:tabLst/>
-                        <a:defRPr/>
-                      </a:pPr>
-                      <a:r>
-                        <a:rPr lang="en-US" altLang="ko-KR" dirty="0">
-                          <a:latin typeface="Stencil" panose="040409050D0802020404" pitchFamily="82" charset="0"/>
-                        </a:rPr>
-                        <a:t>3</a:t>
-                      </a:r>
-                      <a:r>
-                        <a:rPr lang="ko-KR" altLang="en-US" dirty="0">
-                          <a:latin typeface="Stencil" panose="040409050D0802020404" pitchFamily="82" charset="0"/>
-                        </a:rPr>
-                        <a:t>주차</a:t>
-                      </a:r>
-                      <a:endParaRPr lang="en-US" altLang="ko-KR" dirty="0">
-                        <a:latin typeface="Stencil" panose="040409050D0802020404" pitchFamily="82" charset="0"/>
-                      </a:endParaRPr>
-                    </a:p>
-                    <a:p>
-                      <a:pPr algn="ctr" latinLnBrk="1"/>
-                      <a:r>
-                        <a:rPr lang="en-US" altLang="ko-KR" sz="1400" dirty="0">
-                          <a:latin typeface="Stencil" panose="040409050D0802020404" pitchFamily="82" charset="0"/>
-                        </a:rPr>
-                        <a:t>(10.28)</a:t>
-                      </a:r>
-                      <a:endParaRPr lang="ko-KR" altLang="en-US" sz="1400" dirty="0">
-                        <a:latin typeface="Stencil" panose="040409050D0802020404" pitchFamily="82" charset="0"/>
-                      </a:endParaRPr>
-                    </a:p>
-                  </a:txBody>
-                  <a:tcPr/>
-                </a:tc>
-                <a:tc>
-                  <a:txBody>
-                    <a:bodyPr/>
-                    <a:lstStyle/>
-                    <a:p>
-                      <a:pPr latinLnBrk="1"/>
-                      <a:r>
-                        <a:rPr lang="ko-KR" altLang="en-US" b="0" dirty="0">
-                          <a:effectLst>
-                            <a:outerShdw blurRad="38100" dist="38100" dir="2700000" algn="tl">
-                              <a:srgbClr val="000000">
-                                <a:alpha val="43137"/>
-                              </a:srgbClr>
-                            </a:outerShdw>
-                          </a:effectLst>
-                          <a:latin typeface="굴림" panose="020B0600000101010101" pitchFamily="50" charset="-127"/>
-                          <a:ea typeface="굴림" panose="020B0600000101010101" pitchFamily="50" charset="-127"/>
-                        </a:rPr>
-                        <a:t>캐릭터 숙소 구현 </a:t>
-                      </a:r>
-                      <a:r>
-                        <a:rPr lang="en-US" altLang="ko-KR" b="0" dirty="0">
-                          <a:effectLst>
-                            <a:outerShdw blurRad="38100" dist="38100" dir="2700000" algn="tl">
-                              <a:srgbClr val="000000">
-                                <a:alpha val="43137"/>
-                              </a:srgbClr>
-                            </a:outerShdw>
-                          </a:effectLst>
-                          <a:latin typeface="굴림" panose="020B0600000101010101" pitchFamily="50" charset="-127"/>
-                          <a:ea typeface="굴림" panose="020B0600000101010101" pitchFamily="50" charset="-127"/>
-                        </a:rPr>
-                        <a:t>(</a:t>
-                      </a:r>
-                      <a:r>
-                        <a:rPr lang="ko-KR" altLang="en-US" b="0" dirty="0">
-                          <a:effectLst>
-                            <a:outerShdw blurRad="38100" dist="38100" dir="2700000" algn="tl">
-                              <a:srgbClr val="000000">
-                                <a:alpha val="43137"/>
-                              </a:srgbClr>
-                            </a:outerShdw>
-                          </a:effectLst>
-                          <a:latin typeface="굴림" panose="020B0600000101010101" pitchFamily="50" charset="-127"/>
-                          <a:ea typeface="굴림" panose="020B0600000101010101" pitchFamily="50" charset="-127"/>
-                        </a:rPr>
-                        <a:t>캐릭터 컨디션 회복</a:t>
-                      </a:r>
-                      <a:r>
-                        <a:rPr lang="en-US" altLang="ko-KR" b="0" dirty="0">
-                          <a:effectLst>
-                            <a:outerShdw blurRad="38100" dist="38100" dir="2700000" algn="tl">
-                              <a:srgbClr val="000000">
-                                <a:alpha val="43137"/>
-                              </a:srgbClr>
-                            </a:outerShdw>
-                          </a:effectLst>
-                          <a:latin typeface="굴림" panose="020B0600000101010101" pitchFamily="50" charset="-127"/>
-                          <a:ea typeface="굴림" panose="020B0600000101010101" pitchFamily="50" charset="-127"/>
-                        </a:rPr>
-                        <a:t>)</a:t>
-                      </a:r>
-                      <a:endParaRPr lang="ko-KR" altLang="en-US" b="0" dirty="0">
-                        <a:effectLst>
-                          <a:outerShdw blurRad="38100" dist="38100" dir="2700000" algn="tl">
-                            <a:srgbClr val="000000">
-                              <a:alpha val="43137"/>
-                            </a:srgbClr>
-                          </a:outerShdw>
-                        </a:effectLst>
-                        <a:latin typeface="굴림" panose="020B0600000101010101" pitchFamily="50" charset="-127"/>
-                        <a:ea typeface="굴림" panose="020B0600000101010101" pitchFamily="50" charset="-127"/>
-                      </a:endParaRPr>
-                    </a:p>
-                  </a:txBody>
-                  <a:tcPr/>
-                </a:tc>
-                <a:extLst>
-                  <a:ext uri="{0D108BD9-81ED-4DB2-BD59-A6C34878D82A}">
-                    <a16:rowId xmlns:a16="http://schemas.microsoft.com/office/drawing/2014/main" val="1242039006"/>
-                  </a:ext>
-                </a:extLst>
-              </a:tr>
-              <a:tr h="575733">
-                <a:tc>
-                  <a:txBody>
-                    <a:bodyPr/>
-                    <a:lstStyle/>
-                    <a:p>
-                      <a:pPr marL="0" marR="0" lvl="0" indent="0" algn="ctr" defTabSz="914400" rtl="0" eaLnBrk="1" fontAlgn="auto" latinLnBrk="1" hangingPunct="1">
-                        <a:lnSpc>
-                          <a:spcPct val="100000"/>
-                        </a:lnSpc>
-                        <a:spcBef>
-                          <a:spcPts val="0"/>
-                        </a:spcBef>
-                        <a:spcAft>
-                          <a:spcPts val="0"/>
-                        </a:spcAft>
-                        <a:buClrTx/>
-                        <a:buSzTx/>
-                        <a:buFontTx/>
-                        <a:buNone/>
-                        <a:tabLst/>
-                        <a:defRPr/>
-                      </a:pPr>
-                      <a:r>
-                        <a:rPr lang="en-US" altLang="ko-KR" dirty="0">
-                          <a:latin typeface="Stencil" panose="040409050D0802020404" pitchFamily="82" charset="0"/>
-                        </a:rPr>
-                        <a:t>4</a:t>
-                      </a:r>
-                      <a:r>
-                        <a:rPr lang="ko-KR" altLang="en-US" dirty="0">
-                          <a:latin typeface="Stencil" panose="040409050D0802020404" pitchFamily="82" charset="0"/>
-                        </a:rPr>
-                        <a:t>주차</a:t>
-                      </a:r>
-                      <a:endParaRPr lang="en-US" altLang="ko-KR" dirty="0">
-                        <a:latin typeface="Stencil" panose="040409050D0802020404" pitchFamily="82" charset="0"/>
-                      </a:endParaRPr>
-                    </a:p>
-                    <a:p>
-                      <a:pPr algn="ctr" latinLnBrk="1"/>
-                      <a:r>
-                        <a:rPr lang="en-US" altLang="ko-KR" sz="1400" dirty="0">
-                          <a:latin typeface="Stencil" panose="040409050D0802020404" pitchFamily="82" charset="0"/>
-                        </a:rPr>
-                        <a:t>(11.04)</a:t>
-                      </a:r>
-                      <a:endParaRPr lang="ko-KR" altLang="en-US" sz="1400" dirty="0">
-                        <a:latin typeface="Stencil" panose="040409050D0802020404" pitchFamily="82" charset="0"/>
-                      </a:endParaRPr>
-                    </a:p>
-                  </a:txBody>
-                  <a:tcPr/>
-                </a:tc>
-                <a:tc>
-                  <a:txBody>
-                    <a:bodyPr/>
-                    <a:lstStyle/>
-                    <a:p>
-                      <a:pPr latinLnBrk="1"/>
-                      <a:r>
-                        <a:rPr lang="ko-KR" altLang="en-US" b="0" dirty="0">
-                          <a:effectLst>
-                            <a:outerShdw blurRad="38100" dist="38100" dir="2700000" algn="tl">
-                              <a:srgbClr val="000000">
-                                <a:alpha val="43137"/>
-                              </a:srgbClr>
-                            </a:outerShdw>
-                          </a:effectLst>
-                          <a:latin typeface="굴림" panose="020B0600000101010101" pitchFamily="50" charset="-127"/>
-                          <a:ea typeface="굴림" panose="020B0600000101010101" pitchFamily="50" charset="-127"/>
-                        </a:rPr>
-                        <a:t>트레이닝 센터 컨텐츠 구현 </a:t>
-                      </a:r>
-                      <a:r>
-                        <a:rPr lang="en-US" altLang="ko-KR" b="0" dirty="0">
-                          <a:effectLst>
-                            <a:outerShdw blurRad="38100" dist="38100" dir="2700000" algn="tl">
-                              <a:srgbClr val="000000">
-                                <a:alpha val="43137"/>
-                              </a:srgbClr>
-                            </a:outerShdw>
-                          </a:effectLst>
-                          <a:latin typeface="굴림" panose="020B0600000101010101" pitchFamily="50" charset="-127"/>
-                          <a:ea typeface="굴림" panose="020B0600000101010101" pitchFamily="50" charset="-127"/>
-                        </a:rPr>
-                        <a:t>(</a:t>
-                      </a:r>
-                      <a:r>
-                        <a:rPr lang="ko-KR" altLang="en-US" b="0" dirty="0">
-                          <a:effectLst>
-                            <a:outerShdw blurRad="38100" dist="38100" dir="2700000" algn="tl">
-                              <a:srgbClr val="000000">
-                                <a:alpha val="43137"/>
-                              </a:srgbClr>
-                            </a:outerShdw>
-                          </a:effectLst>
-                          <a:latin typeface="굴림" panose="020B0600000101010101" pitchFamily="50" charset="-127"/>
-                          <a:ea typeface="굴림" panose="020B0600000101010101" pitchFamily="50" charset="-127"/>
-                        </a:rPr>
-                        <a:t>캐릭터 능력치 상승</a:t>
-                      </a:r>
-                      <a:r>
-                        <a:rPr lang="en-US" altLang="ko-KR" b="0" dirty="0">
-                          <a:effectLst>
-                            <a:outerShdw blurRad="38100" dist="38100" dir="2700000" algn="tl">
-                              <a:srgbClr val="000000">
-                                <a:alpha val="43137"/>
-                              </a:srgbClr>
-                            </a:outerShdw>
-                          </a:effectLst>
-                          <a:latin typeface="굴림" panose="020B0600000101010101" pitchFamily="50" charset="-127"/>
-                          <a:ea typeface="굴림" panose="020B0600000101010101" pitchFamily="50" charset="-127"/>
-                        </a:rPr>
-                        <a:t>)</a:t>
-                      </a:r>
-                      <a:endParaRPr lang="ko-KR" altLang="en-US" b="0" dirty="0">
-                        <a:effectLst>
-                          <a:outerShdw blurRad="38100" dist="38100" dir="2700000" algn="tl">
-                            <a:srgbClr val="000000">
-                              <a:alpha val="43137"/>
-                            </a:srgbClr>
-                          </a:outerShdw>
-                        </a:effectLst>
-                        <a:latin typeface="굴림" panose="020B0600000101010101" pitchFamily="50" charset="-127"/>
-                        <a:ea typeface="굴림" panose="020B0600000101010101" pitchFamily="50" charset="-127"/>
-                      </a:endParaRPr>
-                    </a:p>
-                  </a:txBody>
-                  <a:tcPr/>
-                </a:tc>
-                <a:extLst>
-                  <a:ext uri="{0D108BD9-81ED-4DB2-BD59-A6C34878D82A}">
-                    <a16:rowId xmlns:a16="http://schemas.microsoft.com/office/drawing/2014/main" val="749856164"/>
-                  </a:ext>
-                </a:extLst>
-              </a:tr>
-              <a:tr h="575733">
-                <a:tc>
-                  <a:txBody>
-                    <a:bodyPr/>
-                    <a:lstStyle/>
-                    <a:p>
-                      <a:pPr marL="0" marR="0" lvl="0" indent="0" algn="ctr" defTabSz="914400" rtl="0" eaLnBrk="1" fontAlgn="auto" latinLnBrk="1" hangingPunct="1">
-                        <a:lnSpc>
-                          <a:spcPct val="100000"/>
-                        </a:lnSpc>
-                        <a:spcBef>
-                          <a:spcPts val="0"/>
-                        </a:spcBef>
-                        <a:spcAft>
-                          <a:spcPts val="0"/>
-                        </a:spcAft>
-                        <a:buClrTx/>
-                        <a:buSzTx/>
-                        <a:buFontTx/>
-                        <a:buNone/>
-                        <a:tabLst/>
-                        <a:defRPr/>
-                      </a:pPr>
-                      <a:r>
-                        <a:rPr lang="en-US" altLang="ko-KR" dirty="0">
-                          <a:latin typeface="Stencil" panose="040409050D0802020404" pitchFamily="82" charset="0"/>
-                        </a:rPr>
-                        <a:t>5</a:t>
-                      </a:r>
-                      <a:r>
-                        <a:rPr lang="ko-KR" altLang="en-US" dirty="0">
-                          <a:latin typeface="Stencil" panose="040409050D0802020404" pitchFamily="82" charset="0"/>
-                        </a:rPr>
-                        <a:t>주차</a:t>
-                      </a:r>
-                      <a:endParaRPr lang="en-US" altLang="ko-KR" dirty="0">
-                        <a:latin typeface="Stencil" panose="040409050D0802020404" pitchFamily="82" charset="0"/>
-                      </a:endParaRPr>
-                    </a:p>
-                    <a:p>
-                      <a:pPr algn="ctr" latinLnBrk="1"/>
-                      <a:r>
-                        <a:rPr lang="en-US" altLang="ko-KR" sz="1400" dirty="0">
-                          <a:latin typeface="Stencil" panose="040409050D0802020404" pitchFamily="82" charset="0"/>
-                        </a:rPr>
-                        <a:t>(11.11)</a:t>
-                      </a:r>
-                      <a:endParaRPr lang="ko-KR" altLang="en-US" sz="1400" dirty="0">
-                        <a:latin typeface="Stencil" panose="040409050D0802020404" pitchFamily="82" charset="0"/>
-                      </a:endParaRPr>
-                    </a:p>
-                  </a:txBody>
-                  <a:tcPr/>
-                </a:tc>
-                <a:tc>
-                  <a:txBody>
-                    <a:bodyPr/>
-                    <a:lstStyle/>
-                    <a:p>
-                      <a:pPr latinLnBrk="1"/>
-                      <a:r>
-                        <a:rPr lang="ko-KR" altLang="en-US" b="0" dirty="0">
-                          <a:effectLst>
-                            <a:outerShdw blurRad="38100" dist="38100" dir="2700000" algn="tl">
-                              <a:srgbClr val="000000">
-                                <a:alpha val="43137"/>
-                              </a:srgbClr>
-                            </a:outerShdw>
-                          </a:effectLst>
-                          <a:latin typeface="굴림" panose="020B0600000101010101" pitchFamily="50" charset="-127"/>
-                          <a:ea typeface="굴림" panose="020B0600000101010101" pitchFamily="50" charset="-127"/>
-                        </a:rPr>
-                        <a:t>경기장 컨텐츠 구현 </a:t>
-                      </a:r>
-                      <a:r>
-                        <a:rPr lang="en-US" altLang="ko-KR" b="0" dirty="0">
-                          <a:effectLst>
-                            <a:outerShdw blurRad="38100" dist="38100" dir="2700000" algn="tl">
-                              <a:srgbClr val="000000">
-                                <a:alpha val="43137"/>
-                              </a:srgbClr>
-                            </a:outerShdw>
-                          </a:effectLst>
-                          <a:latin typeface="굴림" panose="020B0600000101010101" pitchFamily="50" charset="-127"/>
-                          <a:ea typeface="굴림" panose="020B0600000101010101" pitchFamily="50" charset="-127"/>
-                        </a:rPr>
-                        <a:t>(</a:t>
-                      </a:r>
-                      <a:r>
-                        <a:rPr lang="ko-KR" altLang="en-US" b="0" dirty="0">
-                          <a:effectLst>
-                            <a:outerShdw blurRad="38100" dist="38100" dir="2700000" algn="tl">
-                              <a:srgbClr val="000000">
-                                <a:alpha val="43137"/>
-                              </a:srgbClr>
-                            </a:outerShdw>
-                          </a:effectLst>
-                          <a:latin typeface="굴림" panose="020B0600000101010101" pitchFamily="50" charset="-127"/>
-                          <a:ea typeface="굴림" panose="020B0600000101010101" pitchFamily="50" charset="-127"/>
-                        </a:rPr>
-                        <a:t>미니게임 구현</a:t>
-                      </a:r>
-                      <a:r>
-                        <a:rPr lang="en-US" altLang="ko-KR" b="0" dirty="0">
-                          <a:effectLst>
-                            <a:outerShdw blurRad="38100" dist="38100" dir="2700000" algn="tl">
-                              <a:srgbClr val="000000">
-                                <a:alpha val="43137"/>
-                              </a:srgbClr>
-                            </a:outerShdw>
-                          </a:effectLst>
-                          <a:latin typeface="굴림" panose="020B0600000101010101" pitchFamily="50" charset="-127"/>
-                          <a:ea typeface="굴림" panose="020B0600000101010101" pitchFamily="50" charset="-127"/>
-                        </a:rPr>
-                        <a:t>)</a:t>
-                      </a:r>
-                      <a:endParaRPr lang="ko-KR" altLang="en-US" b="0" dirty="0">
-                        <a:effectLst>
-                          <a:outerShdw blurRad="38100" dist="38100" dir="2700000" algn="tl">
-                            <a:srgbClr val="000000">
-                              <a:alpha val="43137"/>
-                            </a:srgbClr>
-                          </a:outerShdw>
-                        </a:effectLst>
-                        <a:latin typeface="굴림" panose="020B0600000101010101" pitchFamily="50" charset="-127"/>
-                        <a:ea typeface="굴림" panose="020B0600000101010101" pitchFamily="50" charset="-127"/>
-                      </a:endParaRPr>
-                    </a:p>
-                  </a:txBody>
-                  <a:tcPr/>
-                </a:tc>
-                <a:extLst>
-                  <a:ext uri="{0D108BD9-81ED-4DB2-BD59-A6C34878D82A}">
-                    <a16:rowId xmlns:a16="http://schemas.microsoft.com/office/drawing/2014/main" val="402811064"/>
-                  </a:ext>
-                </a:extLst>
-              </a:tr>
-              <a:tr h="575733">
-                <a:tc>
-                  <a:txBody>
-                    <a:bodyPr/>
-                    <a:lstStyle/>
-                    <a:p>
-                      <a:pPr marL="0" marR="0" lvl="0" indent="0" algn="ctr" defTabSz="914400" rtl="0" eaLnBrk="1" fontAlgn="auto" latinLnBrk="1" hangingPunct="1">
-                        <a:lnSpc>
-                          <a:spcPct val="100000"/>
-                        </a:lnSpc>
-                        <a:spcBef>
-                          <a:spcPts val="0"/>
-                        </a:spcBef>
-                        <a:spcAft>
-                          <a:spcPts val="0"/>
-                        </a:spcAft>
-                        <a:buClrTx/>
-                        <a:buSzTx/>
-                        <a:buFontTx/>
-                        <a:buNone/>
-                        <a:tabLst/>
-                        <a:defRPr/>
-                      </a:pPr>
-                      <a:r>
-                        <a:rPr lang="en-US" altLang="ko-KR" dirty="0">
-                          <a:latin typeface="Stencil" panose="040409050D0802020404" pitchFamily="82" charset="0"/>
-                        </a:rPr>
-                        <a:t>6</a:t>
-                      </a:r>
-                      <a:r>
-                        <a:rPr lang="ko-KR" altLang="en-US" dirty="0">
-                          <a:latin typeface="Stencil" panose="040409050D0802020404" pitchFamily="82" charset="0"/>
-                        </a:rPr>
-                        <a:t>주차</a:t>
-                      </a:r>
-                      <a:endParaRPr lang="en-US" altLang="ko-KR" dirty="0">
-                        <a:latin typeface="Stencil" panose="040409050D0802020404" pitchFamily="82" charset="0"/>
-                      </a:endParaRPr>
-                    </a:p>
-                    <a:p>
-                      <a:pPr algn="ctr" latinLnBrk="1"/>
-                      <a:r>
-                        <a:rPr lang="en-US" altLang="ko-KR" sz="1400" dirty="0">
-                          <a:latin typeface="Stencil" panose="040409050D0802020404" pitchFamily="82" charset="0"/>
-                        </a:rPr>
-                        <a:t>(11.18)</a:t>
-                      </a:r>
-                      <a:endParaRPr lang="ko-KR" altLang="en-US" sz="1400" dirty="0">
-                        <a:latin typeface="Stencil" panose="040409050D0802020404" pitchFamily="82" charset="0"/>
-                      </a:endParaRPr>
-                    </a:p>
-                  </a:txBody>
-                  <a:tcPr/>
-                </a:tc>
-                <a:tc>
-                  <a:txBody>
-                    <a:bodyPr/>
-                    <a:lstStyle/>
-                    <a:p>
-                      <a:pPr latinLnBrk="1"/>
-                      <a:r>
-                        <a:rPr lang="ko-KR" altLang="en-US" b="0" dirty="0">
-                          <a:effectLst>
-                            <a:outerShdw blurRad="38100" dist="38100" dir="2700000" algn="tl">
-                              <a:srgbClr val="000000">
-                                <a:alpha val="43137"/>
-                              </a:srgbClr>
-                            </a:outerShdw>
-                          </a:effectLst>
-                          <a:latin typeface="굴림" panose="020B0600000101010101" pitchFamily="50" charset="-127"/>
-                          <a:ea typeface="굴림" panose="020B0600000101010101" pitchFamily="50" charset="-127"/>
-                        </a:rPr>
-                        <a:t>기자회견 컨텐츠 구현 </a:t>
-                      </a:r>
-                      <a:r>
-                        <a:rPr lang="en-US" altLang="ko-KR" b="0" dirty="0">
-                          <a:effectLst>
-                            <a:outerShdw blurRad="38100" dist="38100" dir="2700000" algn="tl">
-                              <a:srgbClr val="000000">
-                                <a:alpha val="43137"/>
-                              </a:srgbClr>
-                            </a:outerShdw>
-                          </a:effectLst>
-                          <a:latin typeface="굴림" panose="020B0600000101010101" pitchFamily="50" charset="-127"/>
-                          <a:ea typeface="굴림" panose="020B0600000101010101" pitchFamily="50" charset="-127"/>
-                        </a:rPr>
-                        <a:t>(Ex.</a:t>
-                      </a:r>
-                      <a:r>
-                        <a:rPr lang="ko-KR" altLang="en-US" b="0" dirty="0">
-                          <a:effectLst>
-                            <a:outerShdw blurRad="38100" dist="38100" dir="2700000" algn="tl">
-                              <a:srgbClr val="000000">
-                                <a:alpha val="43137"/>
-                              </a:srgbClr>
-                            </a:outerShdw>
-                          </a:effectLst>
-                          <a:latin typeface="굴림" panose="020B0600000101010101" pitchFamily="50" charset="-127"/>
-                          <a:ea typeface="굴림" panose="020B0600000101010101" pitchFamily="50" charset="-127"/>
-                        </a:rPr>
-                        <a:t> 퀴즈와 같은 객관식 </a:t>
-                      </a:r>
-                      <a:r>
-                        <a:rPr lang="en-US" altLang="ko-KR" b="0" dirty="0">
-                          <a:effectLst>
-                            <a:outerShdw blurRad="38100" dist="38100" dir="2700000" algn="tl">
-                              <a:srgbClr val="000000">
-                                <a:alpha val="43137"/>
-                              </a:srgbClr>
-                            </a:outerShdw>
-                          </a:effectLst>
-                          <a:latin typeface="굴림" panose="020B0600000101010101" pitchFamily="50" charset="-127"/>
-                          <a:ea typeface="굴림" panose="020B0600000101010101" pitchFamily="50" charset="-127"/>
-                        </a:rPr>
-                        <a:t>/ </a:t>
-                      </a:r>
-                      <a:r>
-                        <a:rPr lang="ko-KR" altLang="en-US" b="0" dirty="0">
-                          <a:effectLst>
-                            <a:outerShdw blurRad="38100" dist="38100" dir="2700000" algn="tl">
-                              <a:srgbClr val="000000">
-                                <a:alpha val="43137"/>
-                              </a:srgbClr>
-                            </a:outerShdw>
-                          </a:effectLst>
-                          <a:latin typeface="굴림" panose="020B0600000101010101" pitchFamily="50" charset="-127"/>
-                          <a:ea typeface="굴림" panose="020B0600000101010101" pitchFamily="50" charset="-127"/>
-                        </a:rPr>
-                        <a:t>주관식</a:t>
-                      </a:r>
-                      <a:r>
-                        <a:rPr lang="en-US" altLang="ko-KR" b="0" dirty="0">
-                          <a:effectLst>
-                            <a:outerShdw blurRad="38100" dist="38100" dir="2700000" algn="tl">
-                              <a:srgbClr val="000000">
-                                <a:alpha val="43137"/>
-                              </a:srgbClr>
-                            </a:outerShdw>
-                          </a:effectLst>
-                          <a:latin typeface="굴림" panose="020B0600000101010101" pitchFamily="50" charset="-127"/>
-                          <a:ea typeface="굴림" panose="020B0600000101010101" pitchFamily="50" charset="-127"/>
-                        </a:rPr>
-                        <a:t>)</a:t>
-                      </a:r>
-                      <a:endParaRPr lang="ko-KR" altLang="en-US" b="0" dirty="0">
-                        <a:effectLst>
-                          <a:outerShdw blurRad="38100" dist="38100" dir="2700000" algn="tl">
-                            <a:srgbClr val="000000">
-                              <a:alpha val="43137"/>
-                            </a:srgbClr>
-                          </a:outerShdw>
-                        </a:effectLst>
-                        <a:latin typeface="굴림" panose="020B0600000101010101" pitchFamily="50" charset="-127"/>
-                        <a:ea typeface="굴림" panose="020B0600000101010101" pitchFamily="50" charset="-127"/>
-                      </a:endParaRPr>
-                    </a:p>
-                  </a:txBody>
-                  <a:tcPr/>
-                </a:tc>
-                <a:extLst>
-                  <a:ext uri="{0D108BD9-81ED-4DB2-BD59-A6C34878D82A}">
-                    <a16:rowId xmlns:a16="http://schemas.microsoft.com/office/drawing/2014/main" val="3365505821"/>
-                  </a:ext>
-                </a:extLst>
-              </a:tr>
-              <a:tr h="575733">
-                <a:tc>
-                  <a:txBody>
-                    <a:bodyPr/>
-                    <a:lstStyle/>
-                    <a:p>
-                      <a:pPr marL="0" marR="0" lvl="0" indent="0" algn="ctr" defTabSz="914400" rtl="0" eaLnBrk="1" fontAlgn="auto" latinLnBrk="1" hangingPunct="1">
-                        <a:lnSpc>
-                          <a:spcPct val="100000"/>
-                        </a:lnSpc>
-                        <a:spcBef>
-                          <a:spcPts val="0"/>
-                        </a:spcBef>
-                        <a:spcAft>
-                          <a:spcPts val="0"/>
-                        </a:spcAft>
-                        <a:buClrTx/>
-                        <a:buSzTx/>
-                        <a:buFontTx/>
-                        <a:buNone/>
-                        <a:tabLst/>
-                        <a:defRPr/>
-                      </a:pPr>
-                      <a:r>
-                        <a:rPr lang="en-US" altLang="ko-KR" dirty="0">
-                          <a:latin typeface="Stencil" panose="040409050D0802020404" pitchFamily="82" charset="0"/>
-                        </a:rPr>
-                        <a:t>7</a:t>
-                      </a:r>
-                      <a:r>
-                        <a:rPr lang="ko-KR" altLang="en-US" dirty="0">
-                          <a:latin typeface="Stencil" panose="040409050D0802020404" pitchFamily="82" charset="0"/>
-                        </a:rPr>
-                        <a:t>주차</a:t>
-                      </a:r>
-                      <a:endParaRPr lang="en-US" altLang="ko-KR" dirty="0">
-                        <a:latin typeface="Stencil" panose="040409050D0802020404" pitchFamily="82" charset="0"/>
-                      </a:endParaRPr>
-                    </a:p>
-                    <a:p>
-                      <a:pPr algn="ctr" latinLnBrk="1"/>
-                      <a:r>
-                        <a:rPr lang="en-US" altLang="ko-KR" sz="1400" dirty="0">
-                          <a:latin typeface="Stencil" panose="040409050D0802020404" pitchFamily="82" charset="0"/>
-                        </a:rPr>
-                        <a:t>(11.25)</a:t>
-                      </a:r>
-                      <a:endParaRPr lang="ko-KR" altLang="en-US" sz="1400" dirty="0">
-                        <a:latin typeface="Stencil" panose="040409050D0802020404" pitchFamily="82" charset="0"/>
-                      </a:endParaRPr>
-                    </a:p>
-                  </a:txBody>
-                  <a:tcPr/>
-                </a:tc>
-                <a:tc>
-                  <a:txBody>
-                    <a:bodyPr/>
-                    <a:lstStyle/>
-                    <a:p>
-                      <a:pPr latinLnBrk="1"/>
-                      <a:r>
-                        <a:rPr lang="ko-KR" altLang="en-US" b="0" dirty="0">
-                          <a:effectLst>
-                            <a:outerShdw blurRad="38100" dist="38100" dir="2700000" algn="tl">
-                              <a:srgbClr val="000000">
-                                <a:alpha val="43137"/>
-                              </a:srgbClr>
-                            </a:outerShdw>
-                          </a:effectLst>
-                          <a:latin typeface="굴림" panose="020B0600000101010101" pitchFamily="50" charset="-127"/>
-                          <a:ea typeface="굴림" panose="020B0600000101010101" pitchFamily="50" charset="-127"/>
-                        </a:rPr>
-                        <a:t>상호작용 컨텐츠 추가 여부 결정 및 점검</a:t>
-                      </a:r>
-                    </a:p>
-                  </a:txBody>
-                  <a:tcPr/>
-                </a:tc>
-                <a:extLst>
-                  <a:ext uri="{0D108BD9-81ED-4DB2-BD59-A6C34878D82A}">
-                    <a16:rowId xmlns:a16="http://schemas.microsoft.com/office/drawing/2014/main" val="1465247700"/>
-                  </a:ext>
-                </a:extLst>
-              </a:tr>
-              <a:tr h="575733">
-                <a:tc>
-                  <a:txBody>
-                    <a:bodyPr/>
-                    <a:lstStyle/>
-                    <a:p>
-                      <a:pPr marL="0" marR="0" lvl="0" indent="0" algn="ctr" defTabSz="914400" rtl="0" eaLnBrk="1" fontAlgn="auto" latinLnBrk="1" hangingPunct="1">
-                        <a:lnSpc>
-                          <a:spcPct val="100000"/>
-                        </a:lnSpc>
-                        <a:spcBef>
-                          <a:spcPts val="0"/>
-                        </a:spcBef>
-                        <a:spcAft>
-                          <a:spcPts val="0"/>
-                        </a:spcAft>
-                        <a:buClrTx/>
-                        <a:buSzTx/>
-                        <a:buFontTx/>
-                        <a:buNone/>
-                        <a:tabLst/>
-                        <a:defRPr/>
-                      </a:pPr>
-                      <a:r>
-                        <a:rPr lang="en-US" altLang="ko-KR" dirty="0">
-                          <a:latin typeface="Stencil" panose="040409050D0802020404" pitchFamily="82" charset="0"/>
-                        </a:rPr>
-                        <a:t>8</a:t>
-                      </a:r>
-                      <a:r>
-                        <a:rPr lang="ko-KR" altLang="en-US" dirty="0">
-                          <a:latin typeface="Stencil" panose="040409050D0802020404" pitchFamily="82" charset="0"/>
-                        </a:rPr>
-                        <a:t>주차</a:t>
-                      </a:r>
-                      <a:endParaRPr lang="en-US" altLang="ko-KR" dirty="0">
-                        <a:latin typeface="Stencil" panose="040409050D0802020404" pitchFamily="82" charset="0"/>
-                      </a:endParaRPr>
-                    </a:p>
-                    <a:p>
-                      <a:pPr algn="ctr" latinLnBrk="1"/>
-                      <a:r>
-                        <a:rPr lang="en-US" altLang="ko-KR" sz="1400" dirty="0">
-                          <a:latin typeface="Stencil" panose="040409050D0802020404" pitchFamily="82" charset="0"/>
-                        </a:rPr>
-                        <a:t>(12.02)</a:t>
-                      </a:r>
-                      <a:endParaRPr lang="ko-KR" altLang="en-US" sz="1400" dirty="0">
-                        <a:latin typeface="Stencil" panose="040409050D0802020404" pitchFamily="82" charset="0"/>
-                      </a:endParaRPr>
-                    </a:p>
-                  </a:txBody>
-                  <a:tcPr/>
-                </a:tc>
-                <a:tc>
-                  <a:txBody>
-                    <a:bodyPr/>
-                    <a:lstStyle/>
-                    <a:p>
-                      <a:pPr latinLnBrk="1"/>
-                      <a:r>
-                        <a:rPr lang="ko-KR" altLang="en-US" b="0" dirty="0">
-                          <a:effectLst>
-                            <a:outerShdw blurRad="38100" dist="38100" dir="2700000" algn="tl">
-                              <a:srgbClr val="000000">
-                                <a:alpha val="43137"/>
-                              </a:srgbClr>
-                            </a:outerShdw>
-                          </a:effectLst>
-                          <a:latin typeface="굴림" panose="020B0600000101010101" pitchFamily="50" charset="-127"/>
-                          <a:ea typeface="굴림" panose="020B0600000101010101" pitchFamily="50" charset="-127"/>
-                        </a:rPr>
-                        <a:t>구현 내용 다듬기 및 마무리</a:t>
-                      </a:r>
-                    </a:p>
-                  </a:txBody>
-                  <a:tcPr/>
-                </a:tc>
-                <a:extLst>
-                  <a:ext uri="{0D108BD9-81ED-4DB2-BD59-A6C34878D82A}">
-                    <a16:rowId xmlns:a16="http://schemas.microsoft.com/office/drawing/2014/main" val="729768210"/>
-                  </a:ext>
-                </a:extLst>
-              </a:tr>
-            </a:tbl>
-          </a:graphicData>
-        </a:graphic>
-      </p:graphicFrame>
-      <p:sp>
-        <p:nvSpPr>
-          <p:cNvPr id="6" name="TextBox 5">
-            <a:extLst>
-              <a:ext uri="{FF2B5EF4-FFF2-40B4-BE49-F238E27FC236}">
-                <a16:creationId xmlns:a16="http://schemas.microsoft.com/office/drawing/2014/main" id="{3D668D32-AEA5-584B-6A77-0C921660361A}"/>
-              </a:ext>
-            </a:extLst>
-          </p:cNvPr>
-          <p:cNvSpPr txBox="1"/>
-          <p:nvPr/>
-        </p:nvSpPr>
-        <p:spPr>
-          <a:xfrm>
-            <a:off x="4901602" y="409247"/>
-            <a:ext cx="2388795" cy="461665"/>
-          </a:xfrm>
-          <a:prstGeom prst="rect">
-            <a:avLst/>
-          </a:prstGeom>
-          <a:noFill/>
-        </p:spPr>
-        <p:txBody>
-          <a:bodyPr wrap="none" rtlCol="0">
-            <a:spAutoFit/>
-          </a:bodyPr>
-          <a:lstStyle/>
-          <a:p>
-            <a:r>
-              <a:rPr lang="en-US" altLang="ko-KR" sz="2400" dirty="0">
-                <a:latin typeface="Stencil" panose="040409050D0802020404" pitchFamily="82" charset="0"/>
-              </a:rPr>
-              <a:t>WEEKLEY PLAN</a:t>
-            </a:r>
-            <a:endParaRPr lang="ko-KR" altLang="en-US" sz="2400" dirty="0">
-              <a:latin typeface="Stencil" panose="040409050D0802020404" pitchFamily="82" charset="0"/>
-            </a:endParaRPr>
-          </a:p>
-        </p:txBody>
-      </p:sp>
-    </p:spTree>
-    <p:extLst>
-      <p:ext uri="{BB962C8B-B14F-4D97-AF65-F5344CB8AC3E}">
-        <p14:creationId xmlns:p14="http://schemas.microsoft.com/office/powerpoint/2010/main" val="1276824456"/>
-      </p:ext>
-    </p:extLst>
-  </p:cSld>
-  <p:clrMapOvr>
-    <a:masterClrMapping/>
-  </p:clrMapOvr>
-</p:sld>
-</file>
-
-<file path=ppt/slides/slide5.xml><?xml version="1.0" encoding="utf-8"?>
-<p:sld xmlns:a="http://schemas.openxmlformats.org/drawingml/2006/main" xmlns:r="http://schemas.openxmlformats.org/officeDocument/2006/relationships" xmlns:p="http://schemas.openxmlformats.org/presentationml/2006/main">
-  <p:cSld>
-    <p:spTree>
-      <p:nvGrpSpPr>
-        <p:cNvPr id="1" name=""/>
-        <p:cNvGrpSpPr/>
-        <p:nvPr/>
-      </p:nvGrpSpPr>
-      <p:grpSpPr>
-        <a:xfrm>
-          <a:off x="0" y="0"/>
-          <a:ext cx="0" cy="0"/>
-          <a:chOff x="0" y="0"/>
-          <a:chExt cx="0" cy="0"/>
-        </a:xfrm>
-      </p:grpSpPr>
-      <p:sp>
-        <p:nvSpPr>
-          <p:cNvPr id="2" name="제목 1">
-            <a:extLst>
-              <a:ext uri="{FF2B5EF4-FFF2-40B4-BE49-F238E27FC236}">
-                <a16:creationId xmlns:a16="http://schemas.microsoft.com/office/drawing/2014/main" id="{E32F4D06-2CF5-219E-DF89-AD58B8B75F10}"/>
-              </a:ext>
-            </a:extLst>
-          </p:cNvPr>
-          <p:cNvSpPr>
-            <a:spLocks noGrp="1"/>
-          </p:cNvSpPr>
-          <p:nvPr>
-            <p:ph type="ctrTitle"/>
-          </p:nvPr>
-        </p:nvSpPr>
-        <p:spPr>
-          <a:xfrm>
-            <a:off x="3973938" y="1711841"/>
-            <a:ext cx="3972233" cy="992905"/>
-          </a:xfrm>
-        </p:spPr>
-        <p:txBody>
-          <a:bodyPr/>
-          <a:lstStyle/>
-          <a:p>
-            <a:r>
-              <a:rPr lang="en-US" altLang="ko-KR" dirty="0">
-                <a:latin typeface="Eras Bold ITC" panose="020B0907030504020204" pitchFamily="34" charset="0"/>
-              </a:rPr>
-              <a:t>TU 24</a:t>
-            </a:r>
-            <a:endParaRPr lang="ko-KR" altLang="en-US" dirty="0">
-              <a:latin typeface="Eras Bold ITC" panose="020B0907030504020204" pitchFamily="34" charset="0"/>
-            </a:endParaRPr>
-          </a:p>
-        </p:txBody>
-      </p:sp>
-      <p:sp>
-        <p:nvSpPr>
-          <p:cNvPr id="6" name="TextBox 5">
-            <a:extLst>
-              <a:ext uri="{FF2B5EF4-FFF2-40B4-BE49-F238E27FC236}">
-                <a16:creationId xmlns:a16="http://schemas.microsoft.com/office/drawing/2014/main" id="{A59155A9-BE27-6A3E-1BB1-395555EA83A7}"/>
-              </a:ext>
-            </a:extLst>
-          </p:cNvPr>
-          <p:cNvSpPr txBox="1"/>
-          <p:nvPr/>
-        </p:nvSpPr>
-        <p:spPr>
-          <a:xfrm>
-            <a:off x="9252154" y="5025034"/>
-            <a:ext cx="1883849" cy="1200329"/>
-          </a:xfrm>
-          <a:prstGeom prst="rect">
-            <a:avLst/>
-          </a:prstGeom>
-          <a:noFill/>
-        </p:spPr>
-        <p:txBody>
-          <a:bodyPr wrap="none" rtlCol="0">
-            <a:spAutoFit/>
-          </a:bodyPr>
-          <a:lstStyle/>
-          <a:p>
-            <a:r>
-              <a:rPr lang="en-US" altLang="ko-KR" sz="2400"/>
-              <a:t>2020180007</a:t>
-            </a:r>
-          </a:p>
-          <a:p>
-            <a:endParaRPr lang="en-US" altLang="ko-KR" sz="2400"/>
-          </a:p>
-          <a:p>
-            <a:r>
-              <a:rPr lang="ko-KR" altLang="en-US" sz="2400"/>
-              <a:t>   김성현</a:t>
-            </a:r>
-            <a:endParaRPr lang="ko-KR" altLang="en-US" sz="2400" dirty="0"/>
-          </a:p>
-        </p:txBody>
-      </p:sp>
-      <p:pic>
-        <p:nvPicPr>
-          <p:cNvPr id="8" name="그림 7">
-            <a:extLst>
-              <a:ext uri="{FF2B5EF4-FFF2-40B4-BE49-F238E27FC236}">
-                <a16:creationId xmlns:a16="http://schemas.microsoft.com/office/drawing/2014/main" id="{D8C0C2C8-C592-7F32-74F9-EDA12D7E8E2E}"/>
-              </a:ext>
-            </a:extLst>
-          </p:cNvPr>
-          <p:cNvPicPr>
-            <a:picLocks noChangeAspect="1"/>
-          </p:cNvPicPr>
-          <p:nvPr/>
-        </p:nvPicPr>
-        <p:blipFill>
-          <a:blip r:embed="rId2">
-            <a:extLst>
-              <a:ext uri="{28A0092B-C50C-407E-A947-70E740481C1C}">
-                <a14:useLocalDpi xmlns:a14="http://schemas.microsoft.com/office/drawing/2010/main" val="0"/>
-              </a:ext>
-            </a:extLst>
-          </a:blip>
-          <a:stretch>
-            <a:fillRect/>
-          </a:stretch>
-        </p:blipFill>
-        <p:spPr>
-          <a:xfrm>
-            <a:off x="5360055" y="3429000"/>
-            <a:ext cx="600000" cy="1314286"/>
-          </a:xfrm>
-          <a:prstGeom prst="rect">
-            <a:avLst/>
-          </a:prstGeom>
-        </p:spPr>
-      </p:pic>
-      <p:pic>
-        <p:nvPicPr>
-          <p:cNvPr id="10" name="그림 9">
-            <a:extLst>
-              <a:ext uri="{FF2B5EF4-FFF2-40B4-BE49-F238E27FC236}">
-                <a16:creationId xmlns:a16="http://schemas.microsoft.com/office/drawing/2014/main" id="{826DC9A8-0AF2-DF4E-6E04-FDB71C413FD4}"/>
-              </a:ext>
-            </a:extLst>
-          </p:cNvPr>
-          <p:cNvPicPr>
-            <a:picLocks noChangeAspect="1"/>
-          </p:cNvPicPr>
-          <p:nvPr/>
-        </p:nvPicPr>
-        <p:blipFill>
-          <a:blip r:embed="rId3">
-            <a:extLst>
-              <a:ext uri="{28A0092B-C50C-407E-A947-70E740481C1C}">
-                <a14:useLocalDpi xmlns:a14="http://schemas.microsoft.com/office/drawing/2010/main" val="0"/>
-              </a:ext>
-            </a:extLst>
-          </a:blip>
-          <a:stretch>
-            <a:fillRect/>
-          </a:stretch>
-        </p:blipFill>
-        <p:spPr>
-          <a:xfrm>
-            <a:off x="6095999" y="4153254"/>
-            <a:ext cx="328571" cy="328571"/>
-          </a:xfrm>
-          <a:prstGeom prst="rect">
-            <a:avLst/>
-          </a:prstGeom>
-        </p:spPr>
-      </p:pic>
-      <p:pic>
-        <p:nvPicPr>
-          <p:cNvPr id="12" name="그림 11" descr="스크린샷, 그린, 다채로움이(가) 표시된 사진&#10;&#10;자동 생성된 설명">
-            <a:extLst>
-              <a:ext uri="{FF2B5EF4-FFF2-40B4-BE49-F238E27FC236}">
-                <a16:creationId xmlns:a16="http://schemas.microsoft.com/office/drawing/2014/main" id="{C3DF21A7-BF8E-7F5F-FB61-A96E01D7FAF2}"/>
-              </a:ext>
-            </a:extLst>
-          </p:cNvPr>
-          <p:cNvPicPr>
-            <a:picLocks noChangeAspect="1"/>
-          </p:cNvPicPr>
-          <p:nvPr/>
-        </p:nvPicPr>
-        <p:blipFill>
-          <a:blip r:embed="rId4">
-            <a:extLst>
-              <a:ext uri="{28A0092B-C50C-407E-A947-70E740481C1C}">
-                <a14:useLocalDpi xmlns:a14="http://schemas.microsoft.com/office/drawing/2010/main" val="0"/>
-              </a:ext>
-            </a:extLst>
-          </a:blip>
-          <a:stretch>
-            <a:fillRect/>
-          </a:stretch>
-        </p:blipFill>
-        <p:spPr>
-          <a:xfrm>
-            <a:off x="4431249" y="4547126"/>
-            <a:ext cx="3329500" cy="575011"/>
-          </a:xfrm>
-          <a:prstGeom prst="rect">
-            <a:avLst/>
-          </a:prstGeom>
-        </p:spPr>
-      </p:pic>
-    </p:spTree>
-    <p:extLst>
-      <p:ext uri="{BB962C8B-B14F-4D97-AF65-F5344CB8AC3E}">
-        <p14:creationId xmlns:p14="http://schemas.microsoft.com/office/powerpoint/2010/main" val="1802055334"/>
-      </p:ext>
-    </p:extLst>
-  </p:cSld>
-  <p:clrMapOvr>
-    <a:masterClrMapping/>
-  </p:clrMapOvr>
-</p:sld>
-</file>
-
-<file path=ppt/slides/slide6.xml><?xml version="1.0" encoding="utf-8"?>
-<p:sld xmlns:a="http://schemas.openxmlformats.org/drawingml/2006/main" xmlns:r="http://schemas.openxmlformats.org/officeDocument/2006/relationships" xmlns:p="http://schemas.openxmlformats.org/presentationml/2006/main">
-  <p:cSld>
-    <p:spTree>
-      <p:nvGrpSpPr>
-        <p:cNvPr id="1" name=""/>
-        <p:cNvGrpSpPr/>
-        <p:nvPr/>
-      </p:nvGrpSpPr>
-      <p:grpSpPr>
-        <a:xfrm>
-          <a:off x="0" y="0"/>
-          <a:ext cx="0" cy="0"/>
-          <a:chOff x="0" y="0"/>
-          <a:chExt cx="0" cy="0"/>
-        </a:xfrm>
-      </p:grpSpPr>
-      <p:graphicFrame>
-        <p:nvGraphicFramePr>
-          <p:cNvPr id="6" name="표 5">
-            <a:extLst>
-              <a:ext uri="{FF2B5EF4-FFF2-40B4-BE49-F238E27FC236}">
-                <a16:creationId xmlns:a16="http://schemas.microsoft.com/office/drawing/2014/main" id="{E9C69AAB-CACD-4E72-CBFC-D2F19AC5DE67}"/>
-              </a:ext>
-            </a:extLst>
-          </p:cNvPr>
-          <p:cNvGraphicFramePr>
-            <a:graphicFrameLocks noGrp="1"/>
-          </p:cNvGraphicFramePr>
-          <p:nvPr>
-            <p:extLst>
-              <p:ext uri="{D42A27DB-BD31-4B8C-83A1-F6EECF244321}">
-                <p14:modId xmlns:p14="http://schemas.microsoft.com/office/powerpoint/2010/main" val="1549514045"/>
-              </p:ext>
-            </p:extLst>
-          </p:nvPr>
-        </p:nvGraphicFramePr>
-        <p:xfrm>
-          <a:off x="698090" y="98323"/>
-          <a:ext cx="10884311" cy="6607275"/>
+          <a:off x="653844" y="353961"/>
+          <a:ext cx="10884311" cy="6037330"/>
         </p:xfrm>
         <a:graphic>
           <a:graphicData uri="http://schemas.openxmlformats.org/drawingml/2006/table">
@@ -5927,7 +3613,7 @@
                   </a:extLst>
                 </a:gridCol>
               </a:tblGrid>
-              <a:tr h="483459">
+              <a:tr h="459346">
                 <a:tc>
                   <a:txBody>
                     <a:bodyPr/>
@@ -5975,7 +3661,7 @@
                   </a:ext>
                 </a:extLst>
               </a:tr>
-              <a:tr h="765477">
+              <a:tr h="727298">
                 <a:tc>
                   <a:txBody>
                     <a:bodyPr/>
@@ -6103,7 +3789,7 @@
                   </a:ext>
                 </a:extLst>
               </a:tr>
-              <a:tr h="765477">
+              <a:tr h="727298">
                 <a:tc>
                   <a:txBody>
                     <a:bodyPr/>
@@ -6219,6 +3905,142 @@
                         <a:t> 화면 전환과 상호작용 대상들 구현</a:t>
                       </a:r>
                     </a:p>
+                    <a:p>
+                      <a:pPr latinLnBrk="1"/>
+                      <a:r>
+                        <a:rPr lang="en-US" altLang="ko-KR" b="0" dirty="0">
+                          <a:solidFill>
+                            <a:srgbClr val="FF0000"/>
+                          </a:solidFill>
+                          <a:effectLst>
+                            <a:outerShdw blurRad="38100" dist="38100" dir="2700000" algn="tl">
+                              <a:srgbClr val="000000">
+                                <a:alpha val="43137"/>
+                              </a:srgbClr>
+                            </a:outerShdw>
+                          </a:effectLst>
+                          <a:latin typeface="굴림" panose="020B0600000101010101" pitchFamily="50" charset="-127"/>
+                          <a:ea typeface="굴림" panose="020B0600000101010101" pitchFamily="50" charset="-127"/>
+                        </a:rPr>
+                        <a:t>-&gt; </a:t>
+                      </a:r>
+                      <a:r>
+                        <a:rPr lang="ko-KR" altLang="en-US" b="0" dirty="0">
+                          <a:solidFill>
+                            <a:srgbClr val="FF0000"/>
+                          </a:solidFill>
+                          <a:effectLst>
+                            <a:outerShdw blurRad="38100" dist="38100" dir="2700000" algn="tl">
+                              <a:srgbClr val="000000">
+                                <a:alpha val="43137"/>
+                              </a:srgbClr>
+                            </a:outerShdw>
+                          </a:effectLst>
+                          <a:latin typeface="굴림" panose="020B0600000101010101" pitchFamily="50" charset="-127"/>
+                          <a:ea typeface="굴림" panose="020B0600000101010101" pitchFamily="50" charset="-127"/>
+                        </a:rPr>
+                        <a:t>캐릭터 </a:t>
+                      </a:r>
+                      <a:r>
+                        <a:rPr lang="en-US" altLang="ko-KR" b="0" dirty="0">
+                          <a:solidFill>
+                            <a:srgbClr val="FF0000"/>
+                          </a:solidFill>
+                          <a:effectLst>
+                            <a:outerShdw blurRad="38100" dist="38100" dir="2700000" algn="tl">
+                              <a:srgbClr val="000000">
+                                <a:alpha val="43137"/>
+                              </a:srgbClr>
+                            </a:outerShdw>
+                          </a:effectLst>
+                          <a:latin typeface="굴림" panose="020B0600000101010101" pitchFamily="50" charset="-127"/>
+                          <a:ea typeface="굴림" panose="020B0600000101010101" pitchFamily="50" charset="-127"/>
+                        </a:rPr>
+                        <a:t>fame </a:t>
+                      </a:r>
+                      <a:r>
+                        <a:rPr lang="ko-KR" altLang="en-US" b="0" dirty="0">
+                          <a:solidFill>
+                            <a:srgbClr val="FF0000"/>
+                          </a:solidFill>
+                          <a:effectLst>
+                            <a:outerShdw blurRad="38100" dist="38100" dir="2700000" algn="tl">
+                              <a:srgbClr val="000000">
+                                <a:alpha val="43137"/>
+                              </a:srgbClr>
+                            </a:outerShdw>
+                          </a:effectLst>
+                          <a:latin typeface="굴림" panose="020B0600000101010101" pitchFamily="50" charset="-127"/>
+                          <a:ea typeface="굴림" panose="020B0600000101010101" pitchFamily="50" charset="-127"/>
+                        </a:rPr>
+                        <a:t>속성 추가 예정 </a:t>
+                      </a:r>
+                      <a:r>
+                        <a:rPr lang="en-US" altLang="ko-KR" b="0" dirty="0">
+                          <a:solidFill>
+                            <a:srgbClr val="FF0000"/>
+                          </a:solidFill>
+                          <a:effectLst>
+                            <a:outerShdw blurRad="38100" dist="38100" dir="2700000" algn="tl">
+                              <a:srgbClr val="000000">
+                                <a:alpha val="43137"/>
+                              </a:srgbClr>
+                            </a:outerShdw>
+                          </a:effectLst>
+                          <a:latin typeface="굴림" panose="020B0600000101010101" pitchFamily="50" charset="-127"/>
+                          <a:ea typeface="굴림" panose="020B0600000101010101" pitchFamily="50" charset="-127"/>
+                        </a:rPr>
+                        <a:t>(</a:t>
+                      </a:r>
+                      <a:r>
+                        <a:rPr lang="ko-KR" altLang="en-US" b="0" dirty="0">
+                          <a:solidFill>
+                            <a:srgbClr val="FF0000"/>
+                          </a:solidFill>
+                          <a:effectLst>
+                            <a:outerShdw blurRad="38100" dist="38100" dir="2700000" algn="tl">
+                              <a:srgbClr val="000000">
+                                <a:alpha val="43137"/>
+                              </a:srgbClr>
+                            </a:outerShdw>
+                          </a:effectLst>
+                          <a:latin typeface="굴림" panose="020B0600000101010101" pitchFamily="50" charset="-127"/>
+                          <a:ea typeface="굴림" panose="020B0600000101010101" pitchFamily="50" charset="-127"/>
+                        </a:rPr>
+                        <a:t>속성 값 합산에 따라 결정</a:t>
+                      </a:r>
+                      <a:r>
+                        <a:rPr lang="en-US" altLang="ko-KR" b="0" dirty="0">
+                          <a:solidFill>
+                            <a:srgbClr val="FF0000"/>
+                          </a:solidFill>
+                          <a:effectLst>
+                            <a:outerShdw blurRad="38100" dist="38100" dir="2700000" algn="tl">
+                              <a:srgbClr val="000000">
+                                <a:alpha val="43137"/>
+                              </a:srgbClr>
+                            </a:outerShdw>
+                          </a:effectLst>
+                          <a:latin typeface="굴림" panose="020B0600000101010101" pitchFamily="50" charset="-127"/>
+                          <a:ea typeface="굴림" panose="020B0600000101010101" pitchFamily="50" charset="-127"/>
+                        </a:rPr>
+                        <a:t>)</a:t>
+                      </a:r>
+                      <a:endParaRPr lang="ko-KR" altLang="en-US" b="0" dirty="0">
+                        <a:solidFill>
+                          <a:srgbClr val="FF0000"/>
+                        </a:solidFill>
+                        <a:effectLst>
+                          <a:outerShdw blurRad="38100" dist="38100" dir="2700000" algn="tl">
+                            <a:srgbClr val="000000">
+                              <a:alpha val="43137"/>
+                            </a:srgbClr>
+                          </a:outerShdw>
+                        </a:effectLst>
+                        <a:latin typeface="굴림" panose="020B0600000101010101" pitchFamily="50" charset="-127"/>
+                        <a:ea typeface="굴림" panose="020B0600000101010101" pitchFamily="50" charset="-127"/>
+                      </a:endParaRPr>
+                    </a:p>
                   </a:txBody>
                   <a:tcPr/>
                 </a:tc>
@@ -6263,7 +4085,7 @@
                   </a:ext>
                 </a:extLst>
               </a:tr>
-              <a:tr h="765477">
+              <a:tr h="727298">
                 <a:tc>
                   <a:txBody>
                     <a:bodyPr/>
@@ -6363,7 +4185,35 @@
                           <a:latin typeface="굴림" panose="020B0600000101010101" pitchFamily="50" charset="-127"/>
                           <a:ea typeface="굴림" panose="020B0600000101010101" pitchFamily="50" charset="-127"/>
                         </a:rPr>
-                        <a:t>캐릭터 </a:t>
+                        <a:t>침대</a:t>
+                      </a:r>
+                      <a:r>
+                        <a:rPr lang="en-US" altLang="ko-KR" b="0" dirty="0">
+                          <a:effectLst>
+                            <a:outerShdw blurRad="38100" dist="38100" dir="2700000" algn="tl">
+                              <a:srgbClr val="000000">
+                                <a:alpha val="43137"/>
+                              </a:srgbClr>
+                            </a:outerShdw>
+                          </a:effectLst>
+                          <a:latin typeface="굴림" panose="020B0600000101010101" pitchFamily="50" charset="-127"/>
+                          <a:ea typeface="굴림" panose="020B0600000101010101" pitchFamily="50" charset="-127"/>
+                        </a:rPr>
+                        <a:t>, </a:t>
+                      </a:r>
+                      <a:r>
+                        <a:rPr lang="ko-KR" altLang="en-US" b="0" dirty="0">
+                          <a:effectLst>
+                            <a:outerShdw blurRad="38100" dist="38100" dir="2700000" algn="tl">
+                              <a:srgbClr val="000000">
+                                <a:alpha val="43137"/>
+                              </a:srgbClr>
+                            </a:outerShdw>
+                          </a:effectLst>
+                          <a:latin typeface="굴림" panose="020B0600000101010101" pitchFamily="50" charset="-127"/>
+                          <a:ea typeface="굴림" panose="020B0600000101010101" pitchFamily="50" charset="-127"/>
+                        </a:rPr>
+                        <a:t>냉장고를 통한 </a:t>
                       </a:r>
                       <a:r>
                         <a:rPr lang="en-US" altLang="ko-KR" b="0" dirty="0">
@@ -6452,7 +4302,7 @@
                   </a:ext>
                 </a:extLst>
               </a:tr>
-              <a:tr h="765477">
+              <a:tr h="727298">
                 <a:tc>
                   <a:txBody>
                     <a:bodyPr/>
@@ -6524,7 +4374,7 @@
                           <a:latin typeface="굴림" panose="020B0600000101010101" pitchFamily="50" charset="-127"/>
                           <a:ea typeface="굴림" panose="020B0600000101010101" pitchFamily="50" charset="-127"/>
                         </a:rPr>
-                        <a:t>트레이닝 센터 컨텐츠 구현 </a:t>
+                        <a:t>트레이닝 센터 구현</a:t>
                       </a:r>
                       <a:r>
                         <a:rPr lang="en-US" altLang="ko-KR" b="0" dirty="0">
@@ -6538,7 +4388,7 @@
                           <a:latin typeface="굴림" panose="020B0600000101010101" pitchFamily="50" charset="-127"/>
                           <a:ea typeface="굴림" panose="020B0600000101010101" pitchFamily="50" charset="-127"/>
                         </a:rPr>
-                        <a:t>(</a:t>
+                        <a:t>(Ball, Cone </a:t>
                       </a:r>
                       <a:r>
                         <a:rPr lang="ko-KR" altLang="en-US" b="0" dirty="0">
@@ -6552,7 +4402,7 @@
                           <a:latin typeface="굴림" panose="020B0600000101010101" pitchFamily="50" charset="-127"/>
                           <a:ea typeface="굴림" panose="020B0600000101010101" pitchFamily="50" charset="-127"/>
                         </a:rPr>
-                        <a:t>캐릭터 능력치 상승</a:t>
+                        <a:t>충돌 </a:t>
                       </a:r>
                       <a:r>
                         <a:rPr lang="en-US" altLang="ko-KR" b="0" dirty="0">
@@ -6566,19 +4416,197 @@
                           <a:latin typeface="굴림" panose="020B0600000101010101" pitchFamily="50" charset="-127"/>
                           <a:ea typeface="굴림" panose="020B0600000101010101" pitchFamily="50" charset="-127"/>
                         </a:rPr>
+                        <a:t>-&gt; Mini Game</a:t>
+                      </a:r>
+                      <a:r>
+                        <a:rPr lang="ko-KR" altLang="en-US" b="0" dirty="0">
+                          <a:effectLst>
+                            <a:outerShdw blurRad="38100" dist="38100" dir="2700000" algn="tl">
+                              <a:srgbClr val="000000">
+                                <a:alpha val="43137"/>
+                              </a:srgbClr>
+                            </a:outerShdw>
+                          </a:effectLst>
+                          <a:latin typeface="굴림" panose="020B0600000101010101" pitchFamily="50" charset="-127"/>
+                          <a:ea typeface="굴림" panose="020B0600000101010101" pitchFamily="50" charset="-127"/>
+                        </a:rPr>
+                        <a:t> </a:t>
+                      </a:r>
+                      <a:r>
+                        <a:rPr lang="en-US" altLang="ko-KR" b="0" dirty="0">
+                          <a:effectLst>
+                            <a:outerShdw blurRad="38100" dist="38100" dir="2700000" algn="tl">
+                              <a:srgbClr val="000000">
+                                <a:alpha val="43137"/>
+                              </a:srgbClr>
+                            </a:outerShdw>
+                          </a:effectLst>
+                          <a:latin typeface="굴림" panose="020B0600000101010101" pitchFamily="50" charset="-127"/>
+                          <a:ea typeface="굴림" panose="020B0600000101010101" pitchFamily="50" charset="-127"/>
+                        </a:rPr>
+                        <a:t>/</a:t>
+                      </a:r>
+                      <a:r>
+                        <a:rPr lang="ko-KR" altLang="en-US" b="0" dirty="0">
+                          <a:effectLst>
+                            <a:outerShdw blurRad="38100" dist="38100" dir="2700000" algn="tl">
+                              <a:srgbClr val="000000">
+                                <a:alpha val="43137"/>
+                              </a:srgbClr>
+                            </a:outerShdw>
+                          </a:effectLst>
+                          <a:latin typeface="굴림" panose="020B0600000101010101" pitchFamily="50" charset="-127"/>
+                          <a:ea typeface="굴림" panose="020B0600000101010101" pitchFamily="50" charset="-127"/>
+                        </a:rPr>
+                        <a:t> </a:t>
+                      </a:r>
+                      <a:r>
+                        <a:rPr lang="en-US" altLang="ko-KR" b="0" dirty="0">
+                          <a:effectLst>
+                            <a:outerShdw blurRad="38100" dist="38100" dir="2700000" algn="tl">
+                              <a:srgbClr val="000000">
+                                <a:alpha val="43137"/>
+                              </a:srgbClr>
+                            </a:outerShdw>
+                          </a:effectLst>
+                          <a:latin typeface="굴림" panose="020B0600000101010101" pitchFamily="50" charset="-127"/>
+                          <a:ea typeface="굴림" panose="020B0600000101010101" pitchFamily="50" charset="-127"/>
+                        </a:rPr>
+                        <a:t>OVR </a:t>
+                      </a:r>
+                      <a:r>
+                        <a:rPr lang="ko-KR" altLang="en-US" b="0" dirty="0">
+                          <a:effectLst>
+                            <a:outerShdw blurRad="38100" dist="38100" dir="2700000" algn="tl">
+                              <a:srgbClr val="000000">
+                                <a:alpha val="43137"/>
+                              </a:srgbClr>
+                            </a:outerShdw>
+                          </a:effectLst>
+                          <a:latin typeface="굴림" panose="020B0600000101010101" pitchFamily="50" charset="-127"/>
+                          <a:ea typeface="굴림" panose="020B0600000101010101" pitchFamily="50" charset="-127"/>
+                        </a:rPr>
+                        <a:t>조절</a:t>
+                      </a:r>
+                      <a:r>
+                        <a:rPr lang="en-US" altLang="ko-KR" b="0" dirty="0">
+                          <a:effectLst>
+                            <a:outerShdw blurRad="38100" dist="38100" dir="2700000" algn="tl">
+                              <a:srgbClr val="000000">
+                                <a:alpha val="43137"/>
+                              </a:srgbClr>
+                            </a:outerShdw>
+                          </a:effectLst>
+                          <a:latin typeface="굴림" panose="020B0600000101010101" pitchFamily="50" charset="-127"/>
+                          <a:ea typeface="굴림" panose="020B0600000101010101" pitchFamily="50" charset="-127"/>
+                        </a:rPr>
                         <a:t>)</a:t>
                       </a:r>
-                      <a:endParaRPr lang="ko-KR" altLang="en-US" b="0" dirty="0">
-                        <a:effectLst>
-                          <a:outerShdw blurRad="38100" dist="38100" dir="2700000" algn="tl">
-                            <a:srgbClr val="000000">
-                              <a:alpha val="43137"/>
-                            </a:srgbClr>
-                          </a:outerShdw>
-                        </a:effectLst>
-                        <a:latin typeface="굴림" panose="020B0600000101010101" pitchFamily="50" charset="-127"/>
-                        <a:ea typeface="굴림" panose="020B0600000101010101" pitchFamily="50" charset="-127"/>
-                      </a:endParaRPr>
+                    </a:p>
+                    <a:p>
+                      <a:pPr latinLnBrk="1"/>
+                      <a:r>
+                        <a:rPr lang="en-US" altLang="ko-KR" b="0" dirty="0">
+                          <a:solidFill>
+                            <a:srgbClr val="FF0000"/>
+                          </a:solidFill>
+                          <a:effectLst>
+                            <a:outerShdw blurRad="38100" dist="38100" dir="2700000" algn="tl">
+                              <a:srgbClr val="000000">
+                                <a:alpha val="43137"/>
+                              </a:srgbClr>
+                            </a:outerShdw>
+                          </a:effectLst>
+                          <a:latin typeface="굴림" panose="020B0600000101010101" pitchFamily="50" charset="-127"/>
+                          <a:ea typeface="굴림" panose="020B0600000101010101" pitchFamily="50" charset="-127"/>
+                        </a:rPr>
+                        <a:t>-&gt; M.G</a:t>
+                      </a:r>
+                      <a:r>
+                        <a:rPr lang="ko-KR" altLang="en-US" b="0" dirty="0">
+                          <a:solidFill>
+                            <a:srgbClr val="FF0000"/>
+                          </a:solidFill>
+                          <a:effectLst>
+                            <a:outerShdw blurRad="38100" dist="38100" dir="2700000" algn="tl">
+                              <a:srgbClr val="000000">
+                                <a:alpha val="43137"/>
+                              </a:srgbClr>
+                            </a:outerShdw>
+                          </a:effectLst>
+                          <a:latin typeface="굴림" panose="020B0600000101010101" pitchFamily="50" charset="-127"/>
+                          <a:ea typeface="굴림" panose="020B0600000101010101" pitchFamily="50" charset="-127"/>
+                        </a:rPr>
+                        <a:t>은 떨어지는 공 받기</a:t>
+                      </a:r>
+                      <a:r>
+                        <a:rPr lang="en-US" altLang="ko-KR" b="0" dirty="0">
+                          <a:solidFill>
+                            <a:srgbClr val="FF0000"/>
+                          </a:solidFill>
+                          <a:effectLst>
+                            <a:outerShdw blurRad="38100" dist="38100" dir="2700000" algn="tl">
+                              <a:srgbClr val="000000">
+                                <a:alpha val="43137"/>
+                              </a:srgbClr>
+                            </a:outerShdw>
+                          </a:effectLst>
+                          <a:latin typeface="굴림" panose="020B0600000101010101" pitchFamily="50" charset="-127"/>
+                          <a:ea typeface="굴림" panose="020B0600000101010101" pitchFamily="50" charset="-127"/>
+                        </a:rPr>
+                        <a:t>, </a:t>
+                      </a:r>
+                      <a:r>
+                        <a:rPr lang="ko-KR" altLang="en-US" b="0" dirty="0">
+                          <a:solidFill>
+                            <a:srgbClr val="FF0000"/>
+                          </a:solidFill>
+                          <a:effectLst>
+                            <a:outerShdw blurRad="38100" dist="38100" dir="2700000" algn="tl">
+                              <a:srgbClr val="000000">
+                                <a:alpha val="43137"/>
+                              </a:srgbClr>
+                            </a:outerShdw>
+                          </a:effectLst>
+                          <a:latin typeface="굴림" panose="020B0600000101010101" pitchFamily="50" charset="-127"/>
+                          <a:ea typeface="굴림" panose="020B0600000101010101" pitchFamily="50" charset="-127"/>
+                        </a:rPr>
+                        <a:t>날라오는 </a:t>
+                      </a:r>
+                      <a:r>
+                        <a:rPr lang="en-US" altLang="ko-KR" b="0" dirty="0">
+                          <a:solidFill>
+                            <a:srgbClr val="FF0000"/>
+                          </a:solidFill>
+                          <a:effectLst>
+                            <a:outerShdw blurRad="38100" dist="38100" dir="2700000" algn="tl">
+                              <a:srgbClr val="000000">
+                                <a:alpha val="43137"/>
+                              </a:srgbClr>
+                            </a:outerShdw>
+                          </a:effectLst>
+                          <a:latin typeface="굴림" panose="020B0600000101010101" pitchFamily="50" charset="-127"/>
+                          <a:ea typeface="굴림" panose="020B0600000101010101" pitchFamily="50" charset="-127"/>
+                        </a:rPr>
+                        <a:t>cone</a:t>
+                      </a:r>
+                      <a:r>
+                        <a:rPr lang="ko-KR" altLang="en-US" b="0" dirty="0">
+                          <a:solidFill>
+                            <a:srgbClr val="FF0000"/>
+                          </a:solidFill>
+                          <a:effectLst>
+                            <a:outerShdw blurRad="38100" dist="38100" dir="2700000" algn="tl">
+                              <a:srgbClr val="000000">
+                                <a:alpha val="43137"/>
+                              </a:srgbClr>
+                            </a:outerShdw>
+                          </a:effectLst>
+                          <a:latin typeface="굴림" panose="020B0600000101010101" pitchFamily="50" charset="-127"/>
+                          <a:ea typeface="굴림" panose="020B0600000101010101" pitchFamily="50" charset="-127"/>
+                        </a:rPr>
+                        <a:t> 피하기</a:t>
+                      </a:r>
                     </a:p>
                   </a:txBody>
                   <a:tcPr/>
@@ -6589,6 +4617,20 @@
                     <a:lstStyle/>
                     <a:p>
                       <a:pPr algn="ctr" latinLnBrk="1"/>
+                      <a:r>
+                        <a:rPr lang="en-US" altLang="ko-KR" b="0" dirty="0">
+                          <a:effectLst>
+                            <a:outerShdw blurRad="38100" dist="38100" dir="2700000" algn="tl">
+                              <a:srgbClr val="000000">
+                                <a:alpha val="43137"/>
+                              </a:srgbClr>
+                            </a:outerShdw>
+                          </a:effectLst>
+                          <a:latin typeface="굴림" panose="020B0600000101010101" pitchFamily="50" charset="-127"/>
+                          <a:ea typeface="굴림" panose="020B0600000101010101" pitchFamily="50" charset="-127"/>
+                        </a:rPr>
+                        <a:t>50%</a:t>
+                      </a:r>
                       <a:endParaRPr lang="ko-KR" altLang="en-US" b="0" dirty="0">
                         <a:effectLst>
                           <a:outerShdw blurRad="38100" dist="38100" dir="2700000" algn="tl">
@@ -6610,7 +4652,7 @@
                   </a:ext>
                 </a:extLst>
               </a:tr>
-              <a:tr h="765477">
+              <a:tr h="732540">
                 <a:tc>
                   <a:txBody>
                     <a:bodyPr/>
@@ -6682,7 +4724,7 @@
                           <a:latin typeface="굴림" panose="020B0600000101010101" pitchFamily="50" charset="-127"/>
                           <a:ea typeface="굴림" panose="020B0600000101010101" pitchFamily="50" charset="-127"/>
                         </a:rPr>
-                        <a:t>경기장 컨텐츠 구현 </a:t>
+                        <a:t>경기장 구현 </a:t>
                       </a:r>
                       <a:r>
                         <a:rPr lang="en-US" altLang="ko-KR" b="0" dirty="0">
@@ -6696,7 +4738,7 @@
                           <a:latin typeface="굴림" panose="020B0600000101010101" pitchFamily="50" charset="-127"/>
                           <a:ea typeface="굴림" panose="020B0600000101010101" pitchFamily="50" charset="-127"/>
                         </a:rPr>
-                        <a:t>(</a:t>
+                        <a:t>(Player, Coach </a:t>
                       </a:r>
                       <a:r>
                         <a:rPr lang="ko-KR" altLang="en-US" b="0" dirty="0">
@@ -6710,7 +4752,7 @@
                           <a:latin typeface="굴림" panose="020B0600000101010101" pitchFamily="50" charset="-127"/>
                           <a:ea typeface="굴림" panose="020B0600000101010101" pitchFamily="50" charset="-127"/>
                         </a:rPr>
-                        <a:t>미니게임 구현</a:t>
+                        <a:t>상호작용 </a:t>
                       </a:r>
                       <a:r>
                         <a:rPr lang="en-US" altLang="ko-KR" b="0" dirty="0">
@@ -6724,19 +4766,135 @@
                           <a:latin typeface="굴림" panose="020B0600000101010101" pitchFamily="50" charset="-127"/>
                           <a:ea typeface="굴림" panose="020B0600000101010101" pitchFamily="50" charset="-127"/>
                         </a:rPr>
+                        <a:t>-&gt; Mini Game</a:t>
+                      </a:r>
+                      <a:r>
+                        <a:rPr lang="ko-KR" altLang="en-US" b="0" dirty="0">
+                          <a:effectLst>
+                            <a:outerShdw blurRad="38100" dist="38100" dir="2700000" algn="tl">
+                              <a:srgbClr val="000000">
+                                <a:alpha val="43137"/>
+                              </a:srgbClr>
+                            </a:outerShdw>
+                          </a:effectLst>
+                          <a:latin typeface="굴림" panose="020B0600000101010101" pitchFamily="50" charset="-127"/>
+                          <a:ea typeface="굴림" panose="020B0600000101010101" pitchFamily="50" charset="-127"/>
+                        </a:rPr>
+                        <a:t> </a:t>
+                      </a:r>
+                      <a:r>
+                        <a:rPr lang="en-US" altLang="ko-KR" b="0" dirty="0">
+                          <a:effectLst>
+                            <a:outerShdw blurRad="38100" dist="38100" dir="2700000" algn="tl">
+                              <a:srgbClr val="000000">
+                                <a:alpha val="43137"/>
+                              </a:srgbClr>
+                            </a:outerShdw>
+                          </a:effectLst>
+                          <a:latin typeface="굴림" panose="020B0600000101010101" pitchFamily="50" charset="-127"/>
+                          <a:ea typeface="굴림" panose="020B0600000101010101" pitchFamily="50" charset="-127"/>
+                        </a:rPr>
+                        <a:t>/</a:t>
+                      </a:r>
+                      <a:r>
+                        <a:rPr lang="ko-KR" altLang="en-US" b="0" dirty="0">
+                          <a:effectLst>
+                            <a:outerShdw blurRad="38100" dist="38100" dir="2700000" algn="tl">
+                              <a:srgbClr val="000000">
+                                <a:alpha val="43137"/>
+                              </a:srgbClr>
+                            </a:outerShdw>
+                          </a:effectLst>
+                          <a:latin typeface="굴림" panose="020B0600000101010101" pitchFamily="50" charset="-127"/>
+                          <a:ea typeface="굴림" panose="020B0600000101010101" pitchFamily="50" charset="-127"/>
+                        </a:rPr>
+                        <a:t> 호감도 조절</a:t>
+                      </a:r>
+                      <a:r>
+                        <a:rPr lang="en-US" altLang="ko-KR" b="0" dirty="0">
+                          <a:effectLst>
+                            <a:outerShdw blurRad="38100" dist="38100" dir="2700000" algn="tl">
+                              <a:srgbClr val="000000">
+                                <a:alpha val="43137"/>
+                              </a:srgbClr>
+                            </a:outerShdw>
+                          </a:effectLst>
+                          <a:latin typeface="굴림" panose="020B0600000101010101" pitchFamily="50" charset="-127"/>
+                          <a:ea typeface="굴림" panose="020B0600000101010101" pitchFamily="50" charset="-127"/>
+                        </a:rPr>
                         <a:t>)</a:t>
                       </a:r>
-                      <a:endParaRPr lang="ko-KR" altLang="en-US" b="0" dirty="0">
-                        <a:effectLst>
-                          <a:outerShdw blurRad="38100" dist="38100" dir="2700000" algn="tl">
-                            <a:srgbClr val="000000">
-                              <a:alpha val="43137"/>
-                            </a:srgbClr>
-                          </a:outerShdw>
-                        </a:effectLst>
-                        <a:latin typeface="굴림" panose="020B0600000101010101" pitchFamily="50" charset="-127"/>
-                        <a:ea typeface="굴림" panose="020B0600000101010101" pitchFamily="50" charset="-127"/>
-                      </a:endParaRPr>
+                    </a:p>
+                    <a:p>
+                      <a:pPr latinLnBrk="1"/>
+                      <a:r>
+                        <a:rPr lang="en-US" altLang="ko-KR" b="0" dirty="0">
+                          <a:solidFill>
+                            <a:srgbClr val="FF0000"/>
+                          </a:solidFill>
+                          <a:effectLst>
+                            <a:outerShdw blurRad="38100" dist="38100" dir="2700000" algn="tl">
+                              <a:srgbClr val="000000">
+                                <a:alpha val="43137"/>
+                              </a:srgbClr>
+                            </a:outerShdw>
+                          </a:effectLst>
+                          <a:latin typeface="굴림" panose="020B0600000101010101" pitchFamily="50" charset="-127"/>
+                          <a:ea typeface="굴림" panose="020B0600000101010101" pitchFamily="50" charset="-127"/>
+                        </a:rPr>
+                        <a:t>-&gt; </a:t>
+                      </a:r>
+                      <a:r>
+                        <a:rPr lang="ko-KR" altLang="en-US" b="0" dirty="0">
+                          <a:solidFill>
+                            <a:srgbClr val="FF0000"/>
+                          </a:solidFill>
+                          <a:effectLst>
+                            <a:outerShdw blurRad="38100" dist="38100" dir="2700000" algn="tl">
+                              <a:srgbClr val="000000">
+                                <a:alpha val="43137"/>
+                              </a:srgbClr>
+                            </a:outerShdw>
+                          </a:effectLst>
+                          <a:latin typeface="굴림" panose="020B0600000101010101" pitchFamily="50" charset="-127"/>
+                          <a:ea typeface="굴림" panose="020B0600000101010101" pitchFamily="50" charset="-127"/>
+                        </a:rPr>
+                        <a:t>호감도 속성 추가</a:t>
+                      </a:r>
+                      <a:r>
+                        <a:rPr lang="en-US" altLang="ko-KR" b="0" dirty="0">
+                          <a:solidFill>
+                            <a:srgbClr val="FF0000"/>
+                          </a:solidFill>
+                          <a:effectLst>
+                            <a:outerShdw blurRad="38100" dist="38100" dir="2700000" algn="tl">
+                              <a:srgbClr val="000000">
+                                <a:alpha val="43137"/>
+                              </a:srgbClr>
+                            </a:outerShdw>
+                          </a:effectLst>
+                          <a:latin typeface="굴림" panose="020B0600000101010101" pitchFamily="50" charset="-127"/>
+                          <a:ea typeface="굴림" panose="020B0600000101010101" pitchFamily="50" charset="-127"/>
+                        </a:rPr>
+                        <a:t>, M.G</a:t>
+                      </a:r>
+                      <a:r>
+                        <a:rPr lang="ko-KR" altLang="en-US" b="0" dirty="0">
+                          <a:solidFill>
+                            <a:srgbClr val="FF0000"/>
+                          </a:solidFill>
+                          <a:effectLst>
+                            <a:outerShdw blurRad="38100" dist="38100" dir="2700000" algn="tl">
+                              <a:srgbClr val="000000">
+                                <a:alpha val="43137"/>
+                              </a:srgbClr>
+                            </a:outerShdw>
+                          </a:effectLst>
+                          <a:latin typeface="굴림" panose="020B0600000101010101" pitchFamily="50" charset="-127"/>
+                          <a:ea typeface="굴림" panose="020B0600000101010101" pitchFamily="50" charset="-127"/>
+                        </a:rPr>
+                        <a:t>은 움직이는 표적에 공 넣기</a:t>
+                      </a:r>
                     </a:p>
                   </a:txBody>
                   <a:tcPr/>
@@ -6747,6 +4905,20 @@
                     <a:lstStyle/>
                     <a:p>
                       <a:pPr algn="ctr" latinLnBrk="1"/>
+                      <a:r>
+                        <a:rPr lang="en-US" altLang="ko-KR" b="0" dirty="0">
+                          <a:effectLst>
+                            <a:outerShdw blurRad="38100" dist="38100" dir="2700000" algn="tl">
+                              <a:srgbClr val="000000">
+                                <a:alpha val="43137"/>
+                              </a:srgbClr>
+                            </a:outerShdw>
+                          </a:effectLst>
+                          <a:latin typeface="굴림" panose="020B0600000101010101" pitchFamily="50" charset="-127"/>
+                          <a:ea typeface="굴림" panose="020B0600000101010101" pitchFamily="50" charset="-127"/>
+                        </a:rPr>
+                        <a:t>50%</a:t>
+                      </a:r>
                       <a:endParaRPr lang="ko-KR" altLang="en-US" b="0" dirty="0">
                         <a:effectLst>
                           <a:outerShdw blurRad="38100" dist="38100" dir="2700000" algn="tl">
@@ -6768,7 +4940,7 @@
                   </a:ext>
                 </a:extLst>
               </a:tr>
-              <a:tr h="765477">
+              <a:tr h="550236">
                 <a:tc>
                   <a:txBody>
                     <a:bodyPr/>
@@ -6854,7 +5026,7 @@
                           <a:latin typeface="굴림" panose="020B0600000101010101" pitchFamily="50" charset="-127"/>
                           <a:ea typeface="굴림" panose="020B0600000101010101" pitchFamily="50" charset="-127"/>
                         </a:rPr>
-                        <a:t>(Ex.</a:t>
+                        <a:t>(</a:t>
                       </a:r>
                       <a:r>
                         <a:rPr lang="ko-KR" altLang="en-US" b="0" dirty="0">
@@ -6868,35 +5040,7 @@
                           <a:latin typeface="굴림" panose="020B0600000101010101" pitchFamily="50" charset="-127"/>
                           <a:ea typeface="굴림" panose="020B0600000101010101" pitchFamily="50" charset="-127"/>
                         </a:rPr>
-                        <a:t> 퀴즈와 같은 객관식 </a:t>
-                      </a:r>
-                      <a:r>
-                        <a:rPr lang="en-US" altLang="ko-KR" b="0" dirty="0">
-                          <a:effectLst>
-                            <a:outerShdw blurRad="38100" dist="38100" dir="2700000" algn="tl">
-                              <a:srgbClr val="000000">
-                                <a:alpha val="43137"/>
-                              </a:srgbClr>
-                            </a:outerShdw>
-                          </a:effectLst>
-                          <a:latin typeface="굴림" panose="020B0600000101010101" pitchFamily="50" charset="-127"/>
-                          <a:ea typeface="굴림" panose="020B0600000101010101" pitchFamily="50" charset="-127"/>
-                        </a:rPr>
-                        <a:t>/ </a:t>
-                      </a:r>
-                      <a:r>
-                        <a:rPr lang="ko-KR" altLang="en-US" b="0" dirty="0">
-                          <a:effectLst>
-                            <a:outerShdw blurRad="38100" dist="38100" dir="2700000" algn="tl">
-                              <a:srgbClr val="000000">
-                                <a:alpha val="43137"/>
-                              </a:srgbClr>
-                            </a:outerShdw>
-                          </a:effectLst>
-                          <a:latin typeface="굴림" panose="020B0600000101010101" pitchFamily="50" charset="-127"/>
-                          <a:ea typeface="굴림" panose="020B0600000101010101" pitchFamily="50" charset="-127"/>
-                        </a:rPr>
-                        <a:t>주관식</a:t>
+                        <a:t>캐릭터 없이 마우스 클릭으로 상호작용</a:t>
                       </a:r>
                       <a:r>
                         <a:rPr lang="en-US" altLang="ko-KR" b="0" dirty="0">
@@ -6954,7 +5098,7 @@
                   </a:ext>
                 </a:extLst>
               </a:tr>
-              <a:tr h="765477">
+              <a:tr h="629834">
                 <a:tc>
                   <a:txBody>
                     <a:bodyPr/>
@@ -7026,7 +5170,63 @@
                           <a:latin typeface="굴림" panose="020B0600000101010101" pitchFamily="50" charset="-127"/>
                           <a:ea typeface="굴림" panose="020B0600000101010101" pitchFamily="50" charset="-127"/>
                         </a:rPr>
-                        <a:t>상호작용 컨텐츠 추가 여부 결정 및 점검</a:t>
+                        <a:t>각 </a:t>
+                      </a:r>
+                      <a:r>
+                        <a:rPr lang="ko-KR" altLang="en-US" b="0" dirty="0" err="1">
+                          <a:effectLst>
+                            <a:outerShdw blurRad="38100" dist="38100" dir="2700000" algn="tl">
+                              <a:srgbClr val="000000">
+                                <a:alpha val="43137"/>
+                              </a:srgbClr>
+                            </a:outerShdw>
+                          </a:effectLst>
+                          <a:latin typeface="굴림" panose="020B0600000101010101" pitchFamily="50" charset="-127"/>
+                          <a:ea typeface="굴림" panose="020B0600000101010101" pitchFamily="50" charset="-127"/>
+                        </a:rPr>
+                        <a:t>맵의</a:t>
+                      </a:r>
+                      <a:r>
+                        <a:rPr lang="ko-KR" altLang="en-US" b="0" dirty="0">
+                          <a:effectLst>
+                            <a:outerShdw blurRad="38100" dist="38100" dir="2700000" algn="tl">
+                              <a:srgbClr val="000000">
+                                <a:alpha val="43137"/>
+                              </a:srgbClr>
+                            </a:outerShdw>
+                          </a:effectLst>
+                          <a:latin typeface="굴림" panose="020B0600000101010101" pitchFamily="50" charset="-127"/>
+                          <a:ea typeface="굴림" panose="020B0600000101010101" pitchFamily="50" charset="-127"/>
+                        </a:rPr>
+                        <a:t> 객체 추가 여부 결정 및 </a:t>
+                      </a:r>
+                      <a:r>
+                        <a:rPr lang="en-US" altLang="ko-KR" b="0" dirty="0">
+                          <a:effectLst>
+                            <a:outerShdw blurRad="38100" dist="38100" dir="2700000" algn="tl">
+                              <a:srgbClr val="000000">
+                                <a:alpha val="43137"/>
+                              </a:srgbClr>
+                            </a:outerShdw>
+                          </a:effectLst>
+                          <a:latin typeface="굴림" panose="020B0600000101010101" pitchFamily="50" charset="-127"/>
+                          <a:ea typeface="굴림" panose="020B0600000101010101" pitchFamily="50" charset="-127"/>
+                        </a:rPr>
+                        <a:t>UI </a:t>
+                      </a:r>
+                      <a:r>
+                        <a:rPr lang="ko-KR" altLang="en-US" b="0" dirty="0">
+                          <a:effectLst>
+                            <a:outerShdw blurRad="38100" dist="38100" dir="2700000" algn="tl">
+                              <a:srgbClr val="000000">
+                                <a:alpha val="43137"/>
+                              </a:srgbClr>
+                            </a:outerShdw>
+                          </a:effectLst>
+                          <a:latin typeface="굴림" panose="020B0600000101010101" pitchFamily="50" charset="-127"/>
+                          <a:ea typeface="굴림" panose="020B0600000101010101" pitchFamily="50" charset="-127"/>
+                        </a:rPr>
+                        <a:t>개선</a:t>
                       </a:r>
                     </a:p>
                   </a:txBody>
@@ -7059,7 +5259,7 @@
                   </a:ext>
                 </a:extLst>
               </a:tr>
-              <a:tr h="765477">
+              <a:tr h="727298">
                 <a:tc>
                   <a:txBody>
                     <a:bodyPr/>
@@ -7181,7 +5381,7 @@
 </p:sld>
 </file>
 
-<file path=ppt/slides/slide7.xml><?xml version="1.0" encoding="utf-8"?>
+<file path=ppt/slides/slide3.xml><?xml version="1.0" encoding="utf-8"?>
 <p:sld xmlns:a="http://schemas.openxmlformats.org/drawingml/2006/main" xmlns:r="http://schemas.openxmlformats.org/officeDocument/2006/relationships" xmlns:p="http://schemas.openxmlformats.org/presentationml/2006/main">
   <p:cSld>
     <p:spTree>
@@ -7198,56 +5398,42 @@
           <a:chExt cx="0" cy="0"/>
         </a:xfrm>
       </p:grpSpPr>
-      <p:sp>
-        <p:nvSpPr>
-          <p:cNvPr id="2" name="제목 1">
-            <a:extLst>
-              <a:ext uri="{FF2B5EF4-FFF2-40B4-BE49-F238E27FC236}">
-                <a16:creationId xmlns:a16="http://schemas.microsoft.com/office/drawing/2014/main" id="{0DB78B94-7F99-0A3D-6DA9-B1B2D472FA16}"/>
-              </a:ext>
-            </a:extLst>
-          </p:cNvPr>
-          <p:cNvSpPr>
-            <a:spLocks noGrp="1"/>
-          </p:cNvSpPr>
-          <p:nvPr>
-            <p:ph type="title"/>
-          </p:nvPr>
-        </p:nvSpPr>
-        <p:spPr/>
-        <p:txBody>
-          <a:bodyPr/>
-          <a:lstStyle/>
-          <a:p>
-            <a:endParaRPr lang="ko-KR" altLang="en-US"/>
-          </a:p>
-        </p:txBody>
-      </p:sp>
-      <p:sp>
-        <p:nvSpPr>
-          <p:cNvPr id="3" name="내용 개체 틀 2">
-            <a:extLst>
-              <a:ext uri="{FF2B5EF4-FFF2-40B4-BE49-F238E27FC236}">
-                <a16:creationId xmlns:a16="http://schemas.microsoft.com/office/drawing/2014/main" id="{84A06CFA-17B6-7D63-C024-AA0B2AEDF5E1}"/>
-              </a:ext>
-            </a:extLst>
-          </p:cNvPr>
-          <p:cNvSpPr>
-            <a:spLocks noGrp="1"/>
-          </p:cNvSpPr>
-          <p:nvPr>
-            <p:ph idx="1"/>
-          </p:nvPr>
-        </p:nvSpPr>
-        <p:spPr/>
-        <p:txBody>
-          <a:bodyPr/>
-          <a:lstStyle/>
-          <a:p>
-            <a:endParaRPr lang="ko-KR" altLang="en-US"/>
-          </a:p>
-        </p:txBody>
-      </p:sp>
+      <p:pic>
+        <p:nvPicPr>
+          <p:cNvPr id="5" name="그림 4" descr="스크린샷, 텍스트, 멀티미디어 소프트웨어, 소프트웨어이(가) 표시된 사진&#10;&#10;자동 생성된 설명">
+            <a:extLst>
+              <a:ext uri="{FF2B5EF4-FFF2-40B4-BE49-F238E27FC236}">
+                <a16:creationId xmlns:a16="http://schemas.microsoft.com/office/drawing/2014/main" id="{18C35ABF-6E7A-428E-17A5-89A52433EDA3}"/>
+              </a:ext>
+            </a:extLst>
+          </p:cNvPr>
+          <p:cNvPicPr>
+            <a:picLocks noChangeAspect="1"/>
+          </p:cNvPicPr>
+          <p:nvPr/>
+        </p:nvPicPr>
+        <p:blipFill>
+          <a:blip r:embed="rId2">
+            <a:extLst>
+              <a:ext uri="{28A0092B-C50C-407E-A947-70E740481C1C}">
+                <a14:useLocalDpi xmlns:a14="http://schemas.microsoft.com/office/drawing/2010/main" val="0"/>
+              </a:ext>
+            </a:extLst>
+          </a:blip>
+          <a:stretch>
+            <a:fillRect/>
+          </a:stretch>
+        </p:blipFill>
+        <p:spPr>
+          <a:xfrm>
+            <a:off x="836537" y="921486"/>
+            <a:ext cx="10518926" cy="5015028"/>
+          </a:xfrm>
+          <a:prstGeom prst="rect">
+            <a:avLst/>
+          </a:prstGeom>
+        </p:spPr>
+      </p:pic>
     </p:spTree>
     <p:extLst>
       <p:ext uri="{BB962C8B-B14F-4D97-AF65-F5344CB8AC3E}">
@@ -7261,7 +5447,7 @@
 </p:sld>
 </file>
 
-<file path=ppt/slides/slide8.xml><?xml version="1.0" encoding="utf-8"?>
+<file path=ppt/slides/slide4.xml><?xml version="1.0" encoding="utf-8"?>
 <p:sld xmlns:a="http://schemas.openxmlformats.org/drawingml/2006/main" xmlns:r="http://schemas.openxmlformats.org/officeDocument/2006/relationships" xmlns:p="http://schemas.openxmlformats.org/presentationml/2006/main">
   <p:cSld>
     <p:spTree>

</xml_diff>